<commit_message>
Creacion de pagina inicio de sesion e inicio de sesion al sistema
</commit_message>
<xml_diff>
--- a/views/img/Presentación de iconos.pptx
+++ b/views/img/Presentación de iconos.pptx
@@ -2,11 +2,14 @@
 <file path=ppt/presentation.xml><?xml version="1.0" encoding="utf-8"?>
 <p:presentation xmlns:a="http://schemas.openxmlformats.org/drawingml/2006/main" xmlns:r="http://schemas.openxmlformats.org/officeDocument/2006/relationships" xmlns:p="http://schemas.openxmlformats.org/presentationml/2006/main" saveSubsetFonts="1">
   <p:sldMasterIdLst>
-    <p:sldMasterId id="2147483714" r:id="rId1"/>
+    <p:sldMasterId id="2147483738" r:id="rId1"/>
   </p:sldMasterIdLst>
   <p:sldIdLst>
     <p:sldId id="256" r:id="rId2"/>
-    <p:sldId id="257" r:id="rId3"/>
+    <p:sldId id="259" r:id="rId3"/>
+    <p:sldId id="260" r:id="rId4"/>
+    <p:sldId id="257" r:id="rId5"/>
+    <p:sldId id="258" r:id="rId6"/>
   </p:sldIdLst>
   <p:sldSz cx="12192000" cy="6858000"/>
   <p:notesSz cx="6858000" cy="9144000"/>
@@ -105,6 +108,11 @@
       </a:defRPr>
     </a:lvl9pPr>
   </p:defaultTextStyle>
+  <p:extLst>
+    <p:ext uri="{EFAFB233-063F-42B5-8137-9DF3F51BA10A}">
+      <p15:sldGuideLst xmlns:p15="http://schemas.microsoft.com/office/powerpoint/2012/main"/>
+    </p:ext>
+  </p:extLst>
 </p:presentation>
 </file>
 
@@ -130,7 +138,7 @@
           <p:cNvPr id="2" name="Título 1">
             <a:extLst>
               <a:ext uri="{FF2B5EF4-FFF2-40B4-BE49-F238E27FC236}">
-                <a16:creationId xmlns:a16="http://schemas.microsoft.com/office/drawing/2014/main" id="{50E873AD-FDBC-43A0-AD4F-51C7F2DB26C3}"/>
+                <a16:creationId xmlns:a16="http://schemas.microsoft.com/office/drawing/2014/main" id="{273C5089-BC10-4A18-870F-4E928B851574}"/>
               </a:ext>
             </a:extLst>
           </p:cNvPr>
@@ -168,7 +176,7 @@
           <p:cNvPr id="3" name="Subtítulo 2">
             <a:extLst>
               <a:ext uri="{FF2B5EF4-FFF2-40B4-BE49-F238E27FC236}">
-                <a16:creationId xmlns:a16="http://schemas.microsoft.com/office/drawing/2014/main" id="{9827768B-9508-4B7F-AB56-D8D6B9600BD3}"/>
+                <a16:creationId xmlns:a16="http://schemas.microsoft.com/office/drawing/2014/main" id="{EC6C9E08-744C-4E7B-87A6-6D1021E2E2D2}"/>
               </a:ext>
             </a:extLst>
           </p:cNvPr>
@@ -239,7 +247,7 @@
           <p:cNvPr id="4" name="Marcador de fecha 3">
             <a:extLst>
               <a:ext uri="{FF2B5EF4-FFF2-40B4-BE49-F238E27FC236}">
-                <a16:creationId xmlns:a16="http://schemas.microsoft.com/office/drawing/2014/main" id="{58986B2E-8E48-42FF-9FDC-D15121AC6E1E}"/>
+                <a16:creationId xmlns:a16="http://schemas.microsoft.com/office/drawing/2014/main" id="{6654A673-DCE1-406C-A69C-ADD5E0E75808}"/>
               </a:ext>
             </a:extLst>
           </p:cNvPr>
@@ -269,7 +277,7 @@
           <p:cNvPr id="5" name="Marcador de pie de página 4">
             <a:extLst>
               <a:ext uri="{FF2B5EF4-FFF2-40B4-BE49-F238E27FC236}">
-                <a16:creationId xmlns:a16="http://schemas.microsoft.com/office/drawing/2014/main" id="{9619B3C3-707B-441F-950A-7969FB2725E1}"/>
+                <a16:creationId xmlns:a16="http://schemas.microsoft.com/office/drawing/2014/main" id="{8E7DFD21-E289-42BE-A684-A886CA367FEF}"/>
               </a:ext>
             </a:extLst>
           </p:cNvPr>
@@ -294,7 +302,7 @@
           <p:cNvPr id="6" name="Marcador de número de diapositiva 5">
             <a:extLst>
               <a:ext uri="{FF2B5EF4-FFF2-40B4-BE49-F238E27FC236}">
-                <a16:creationId xmlns:a16="http://schemas.microsoft.com/office/drawing/2014/main" id="{BAF19199-288D-4886-AEE5-52245F1425A6}"/>
+                <a16:creationId xmlns:a16="http://schemas.microsoft.com/office/drawing/2014/main" id="{88B98704-30D5-4CFE-826B-8B7389A4A7BF}"/>
               </a:ext>
             </a:extLst>
           </p:cNvPr>
@@ -322,7 +330,7 @@
     </p:spTree>
     <p:extLst>
       <p:ext uri="{BB962C8B-B14F-4D97-AF65-F5344CB8AC3E}">
-        <p14:creationId xmlns:p14="http://schemas.microsoft.com/office/powerpoint/2010/main" val="453017348"/>
+        <p14:creationId xmlns:p14="http://schemas.microsoft.com/office/powerpoint/2010/main" val="847484849"/>
       </p:ext>
     </p:extLst>
   </p:cSld>
@@ -354,7 +362,7 @@
           <p:cNvPr id="2" name="Título 1">
             <a:extLst>
               <a:ext uri="{FF2B5EF4-FFF2-40B4-BE49-F238E27FC236}">
-                <a16:creationId xmlns:a16="http://schemas.microsoft.com/office/drawing/2014/main" id="{99B3A4AA-2E4B-4B75-99B5-96B9C541456E}"/>
+                <a16:creationId xmlns:a16="http://schemas.microsoft.com/office/drawing/2014/main" id="{F6C28529-2B7D-4351-9D5E-271464C8D6F9}"/>
               </a:ext>
             </a:extLst>
           </p:cNvPr>
@@ -383,7 +391,7 @@
           <p:cNvPr id="3" name="Marcador de texto vertical 2">
             <a:extLst>
               <a:ext uri="{FF2B5EF4-FFF2-40B4-BE49-F238E27FC236}">
-                <a16:creationId xmlns:a16="http://schemas.microsoft.com/office/drawing/2014/main" id="{0D64E3C2-14F8-4AEE-9082-160E8B197FD8}"/>
+                <a16:creationId xmlns:a16="http://schemas.microsoft.com/office/drawing/2014/main" id="{8E3B9102-41FC-4F92-947D-00D6EFABD537}"/>
               </a:ext>
             </a:extLst>
           </p:cNvPr>
@@ -441,7 +449,7 @@
           <p:cNvPr id="4" name="Marcador de fecha 3">
             <a:extLst>
               <a:ext uri="{FF2B5EF4-FFF2-40B4-BE49-F238E27FC236}">
-                <a16:creationId xmlns:a16="http://schemas.microsoft.com/office/drawing/2014/main" id="{CFF7B56E-20C0-4151-B72E-3E14B030F8AE}"/>
+                <a16:creationId xmlns:a16="http://schemas.microsoft.com/office/drawing/2014/main" id="{98B93B45-5625-4236-B678-6DBD132039D6}"/>
               </a:ext>
             </a:extLst>
           </p:cNvPr>
@@ -471,7 +479,7 @@
           <p:cNvPr id="5" name="Marcador de pie de página 4">
             <a:extLst>
               <a:ext uri="{FF2B5EF4-FFF2-40B4-BE49-F238E27FC236}">
-                <a16:creationId xmlns:a16="http://schemas.microsoft.com/office/drawing/2014/main" id="{3340E9A7-37E0-49F1-9D7D-36EF69136BF5}"/>
+                <a16:creationId xmlns:a16="http://schemas.microsoft.com/office/drawing/2014/main" id="{430EEDA4-14E8-4D7E-83E3-5D164529E1F8}"/>
               </a:ext>
             </a:extLst>
           </p:cNvPr>
@@ -496,7 +504,7 @@
           <p:cNvPr id="6" name="Marcador de número de diapositiva 5">
             <a:extLst>
               <a:ext uri="{FF2B5EF4-FFF2-40B4-BE49-F238E27FC236}">
-                <a16:creationId xmlns:a16="http://schemas.microsoft.com/office/drawing/2014/main" id="{C82B2865-E114-4F54-950E-14C28AA756A8}"/>
+                <a16:creationId xmlns:a16="http://schemas.microsoft.com/office/drawing/2014/main" id="{91B52CA1-F1A3-451C-BDDF-2AE742363859}"/>
               </a:ext>
             </a:extLst>
           </p:cNvPr>
@@ -524,7 +532,7 @@
     </p:spTree>
     <p:extLst>
       <p:ext uri="{BB962C8B-B14F-4D97-AF65-F5344CB8AC3E}">
-        <p14:creationId xmlns:p14="http://schemas.microsoft.com/office/powerpoint/2010/main" val="1160057470"/>
+        <p14:creationId xmlns:p14="http://schemas.microsoft.com/office/powerpoint/2010/main" val="749949174"/>
       </p:ext>
     </p:extLst>
   </p:cSld>
@@ -556,7 +564,7 @@
           <p:cNvPr id="2" name="Título vertical 1">
             <a:extLst>
               <a:ext uri="{FF2B5EF4-FFF2-40B4-BE49-F238E27FC236}">
-                <a16:creationId xmlns:a16="http://schemas.microsoft.com/office/drawing/2014/main" id="{4A7EB128-69D1-4348-814E-63EAE34826B4}"/>
+                <a16:creationId xmlns:a16="http://schemas.microsoft.com/office/drawing/2014/main" id="{4B3E520B-0B61-4161-847E-78D00D6C9655}"/>
               </a:ext>
             </a:extLst>
           </p:cNvPr>
@@ -590,7 +598,7 @@
           <p:cNvPr id="3" name="Marcador de texto vertical 2">
             <a:extLst>
               <a:ext uri="{FF2B5EF4-FFF2-40B4-BE49-F238E27FC236}">
-                <a16:creationId xmlns:a16="http://schemas.microsoft.com/office/drawing/2014/main" id="{0ED62B9F-1FC0-49B4-8E3A-809DE8F94BA6}"/>
+                <a16:creationId xmlns:a16="http://schemas.microsoft.com/office/drawing/2014/main" id="{121B3A23-C846-4DD7-99AE-D4C769540E84}"/>
               </a:ext>
             </a:extLst>
           </p:cNvPr>
@@ -653,7 +661,7 @@
           <p:cNvPr id="4" name="Marcador de fecha 3">
             <a:extLst>
               <a:ext uri="{FF2B5EF4-FFF2-40B4-BE49-F238E27FC236}">
-                <a16:creationId xmlns:a16="http://schemas.microsoft.com/office/drawing/2014/main" id="{5BDEE438-27DE-49FD-AC19-2DE5F5345FD3}"/>
+                <a16:creationId xmlns:a16="http://schemas.microsoft.com/office/drawing/2014/main" id="{FC683547-B1D2-47E7-A478-BE0CA9AC4A3F}"/>
               </a:ext>
             </a:extLst>
           </p:cNvPr>
@@ -683,7 +691,7 @@
           <p:cNvPr id="5" name="Marcador de pie de página 4">
             <a:extLst>
               <a:ext uri="{FF2B5EF4-FFF2-40B4-BE49-F238E27FC236}">
-                <a16:creationId xmlns:a16="http://schemas.microsoft.com/office/drawing/2014/main" id="{7C2D6E05-30D2-4C02-A0E1-0BF74DF273A0}"/>
+                <a16:creationId xmlns:a16="http://schemas.microsoft.com/office/drawing/2014/main" id="{4F75AB2E-BE9D-4DB9-BEB3-83B18AFC2700}"/>
               </a:ext>
             </a:extLst>
           </p:cNvPr>
@@ -708,7 +716,7 @@
           <p:cNvPr id="6" name="Marcador de número de diapositiva 5">
             <a:extLst>
               <a:ext uri="{FF2B5EF4-FFF2-40B4-BE49-F238E27FC236}">
-                <a16:creationId xmlns:a16="http://schemas.microsoft.com/office/drawing/2014/main" id="{0FF1A520-8454-4211-8E58-6EE73F1568BF}"/>
+                <a16:creationId xmlns:a16="http://schemas.microsoft.com/office/drawing/2014/main" id="{CD0980C4-3178-49D3-B1E8-8DF2DC937106}"/>
               </a:ext>
             </a:extLst>
           </p:cNvPr>
@@ -736,7 +744,7 @@
     </p:spTree>
     <p:extLst>
       <p:ext uri="{BB962C8B-B14F-4D97-AF65-F5344CB8AC3E}">
-        <p14:creationId xmlns:p14="http://schemas.microsoft.com/office/powerpoint/2010/main" val="663719055"/>
+        <p14:creationId xmlns:p14="http://schemas.microsoft.com/office/powerpoint/2010/main" val="2316488405"/>
       </p:ext>
     </p:extLst>
   </p:cSld>
@@ -768,7 +776,7 @@
           <p:cNvPr id="2" name="Título 1">
             <a:extLst>
               <a:ext uri="{FF2B5EF4-FFF2-40B4-BE49-F238E27FC236}">
-                <a16:creationId xmlns:a16="http://schemas.microsoft.com/office/drawing/2014/main" id="{C50A4141-EBEF-434C-9627-C78756A51F76}"/>
+                <a16:creationId xmlns:a16="http://schemas.microsoft.com/office/drawing/2014/main" id="{E8529A90-392D-4FFC-B2E2-8A2216162FCE}"/>
               </a:ext>
             </a:extLst>
           </p:cNvPr>
@@ -797,7 +805,7 @@
           <p:cNvPr id="3" name="Marcador de contenido 2">
             <a:extLst>
               <a:ext uri="{FF2B5EF4-FFF2-40B4-BE49-F238E27FC236}">
-                <a16:creationId xmlns:a16="http://schemas.microsoft.com/office/drawing/2014/main" id="{4230CBB5-5CB8-4A66-942C-4C8F21ABCECF}"/>
+                <a16:creationId xmlns:a16="http://schemas.microsoft.com/office/drawing/2014/main" id="{36B224D4-1268-43BB-9F89-4A4322FC74FE}"/>
               </a:ext>
             </a:extLst>
           </p:cNvPr>
@@ -855,7 +863,7 @@
           <p:cNvPr id="4" name="Marcador de fecha 3">
             <a:extLst>
               <a:ext uri="{FF2B5EF4-FFF2-40B4-BE49-F238E27FC236}">
-                <a16:creationId xmlns:a16="http://schemas.microsoft.com/office/drawing/2014/main" id="{3DEADFF5-0468-48AE-8A3F-2820C83C1126}"/>
+                <a16:creationId xmlns:a16="http://schemas.microsoft.com/office/drawing/2014/main" id="{5802B4B2-D7F4-4A31-AB62-32B153E3C0C7}"/>
               </a:ext>
             </a:extLst>
           </p:cNvPr>
@@ -885,7 +893,7 @@
           <p:cNvPr id="5" name="Marcador de pie de página 4">
             <a:extLst>
               <a:ext uri="{FF2B5EF4-FFF2-40B4-BE49-F238E27FC236}">
-                <a16:creationId xmlns:a16="http://schemas.microsoft.com/office/drawing/2014/main" id="{8D871D0E-0A58-49F2-AEDD-397B280FE794}"/>
+                <a16:creationId xmlns:a16="http://schemas.microsoft.com/office/drawing/2014/main" id="{273BD85D-AF90-4674-8907-FC74F2A46BDC}"/>
               </a:ext>
             </a:extLst>
           </p:cNvPr>
@@ -910,7 +918,7 @@
           <p:cNvPr id="6" name="Marcador de número de diapositiva 5">
             <a:extLst>
               <a:ext uri="{FF2B5EF4-FFF2-40B4-BE49-F238E27FC236}">
-                <a16:creationId xmlns:a16="http://schemas.microsoft.com/office/drawing/2014/main" id="{AD8B3A37-4B53-416C-85B6-039A98892195}"/>
+                <a16:creationId xmlns:a16="http://schemas.microsoft.com/office/drawing/2014/main" id="{DE7D1E79-9740-48C4-ACFC-D92B3BD1939A}"/>
               </a:ext>
             </a:extLst>
           </p:cNvPr>
@@ -938,7 +946,7 @@
     </p:spTree>
     <p:extLst>
       <p:ext uri="{BB962C8B-B14F-4D97-AF65-F5344CB8AC3E}">
-        <p14:creationId xmlns:p14="http://schemas.microsoft.com/office/powerpoint/2010/main" val="3380208005"/>
+        <p14:creationId xmlns:p14="http://schemas.microsoft.com/office/powerpoint/2010/main" val="1722262659"/>
       </p:ext>
     </p:extLst>
   </p:cSld>
@@ -970,7 +978,7 @@
           <p:cNvPr id="2" name="Título 1">
             <a:extLst>
               <a:ext uri="{FF2B5EF4-FFF2-40B4-BE49-F238E27FC236}">
-                <a16:creationId xmlns:a16="http://schemas.microsoft.com/office/drawing/2014/main" id="{F9A8E5CE-5529-4266-89F1-954280F1A3D4}"/>
+                <a16:creationId xmlns:a16="http://schemas.microsoft.com/office/drawing/2014/main" id="{37E6192A-9EC5-4D1B-8737-15584FB5583A}"/>
               </a:ext>
             </a:extLst>
           </p:cNvPr>
@@ -1008,7 +1016,7 @@
           <p:cNvPr id="3" name="Marcador de texto 2">
             <a:extLst>
               <a:ext uri="{FF2B5EF4-FFF2-40B4-BE49-F238E27FC236}">
-                <a16:creationId xmlns:a16="http://schemas.microsoft.com/office/drawing/2014/main" id="{B515C719-B132-4163-8CF6-1B5550EDFBCC}"/>
+                <a16:creationId xmlns:a16="http://schemas.microsoft.com/office/drawing/2014/main" id="{3F48D125-350D-415D-B719-91FBCE25F358}"/>
               </a:ext>
             </a:extLst>
           </p:cNvPr>
@@ -1133,7 +1141,7 @@
           <p:cNvPr id="4" name="Marcador de fecha 3">
             <a:extLst>
               <a:ext uri="{FF2B5EF4-FFF2-40B4-BE49-F238E27FC236}">
-                <a16:creationId xmlns:a16="http://schemas.microsoft.com/office/drawing/2014/main" id="{644D47E6-DE90-4F34-ACA9-E5497E4BC664}"/>
+                <a16:creationId xmlns:a16="http://schemas.microsoft.com/office/drawing/2014/main" id="{02B17604-00B7-46AC-8CA5-11BFDCEB77CB}"/>
               </a:ext>
             </a:extLst>
           </p:cNvPr>
@@ -1163,7 +1171,7 @@
           <p:cNvPr id="5" name="Marcador de pie de página 4">
             <a:extLst>
               <a:ext uri="{FF2B5EF4-FFF2-40B4-BE49-F238E27FC236}">
-                <a16:creationId xmlns:a16="http://schemas.microsoft.com/office/drawing/2014/main" id="{026CC116-ED73-45B6-8CFC-C2DF834228F3}"/>
+                <a16:creationId xmlns:a16="http://schemas.microsoft.com/office/drawing/2014/main" id="{5FBA6B3B-D6E6-4F15-841F-1458E82C488F}"/>
               </a:ext>
             </a:extLst>
           </p:cNvPr>
@@ -1188,7 +1196,7 @@
           <p:cNvPr id="6" name="Marcador de número de diapositiva 5">
             <a:extLst>
               <a:ext uri="{FF2B5EF4-FFF2-40B4-BE49-F238E27FC236}">
-                <a16:creationId xmlns:a16="http://schemas.microsoft.com/office/drawing/2014/main" id="{684D90DE-A665-48EA-A683-2BADC94228FB}"/>
+                <a16:creationId xmlns:a16="http://schemas.microsoft.com/office/drawing/2014/main" id="{A397AFBE-E694-48D3-AF19-5EC3CBA1DB34}"/>
               </a:ext>
             </a:extLst>
           </p:cNvPr>
@@ -1216,7 +1224,7 @@
     </p:spTree>
     <p:extLst>
       <p:ext uri="{BB962C8B-B14F-4D97-AF65-F5344CB8AC3E}">
-        <p14:creationId xmlns:p14="http://schemas.microsoft.com/office/powerpoint/2010/main" val="1541396672"/>
+        <p14:creationId xmlns:p14="http://schemas.microsoft.com/office/powerpoint/2010/main" val="1933625465"/>
       </p:ext>
     </p:extLst>
   </p:cSld>
@@ -1248,7 +1256,7 @@
           <p:cNvPr id="2" name="Título 1">
             <a:extLst>
               <a:ext uri="{FF2B5EF4-FFF2-40B4-BE49-F238E27FC236}">
-                <a16:creationId xmlns:a16="http://schemas.microsoft.com/office/drawing/2014/main" id="{DF0B2BEE-9AB8-489C-8A4D-3C65841232EC}"/>
+                <a16:creationId xmlns:a16="http://schemas.microsoft.com/office/drawing/2014/main" id="{40FE4444-C508-4A96-9BBF-20474E056E44}"/>
               </a:ext>
             </a:extLst>
           </p:cNvPr>
@@ -1277,7 +1285,7 @@
           <p:cNvPr id="3" name="Marcador de contenido 2">
             <a:extLst>
               <a:ext uri="{FF2B5EF4-FFF2-40B4-BE49-F238E27FC236}">
-                <a16:creationId xmlns:a16="http://schemas.microsoft.com/office/drawing/2014/main" id="{5E53194B-32F3-463A-BC3C-E13DCDA60148}"/>
+                <a16:creationId xmlns:a16="http://schemas.microsoft.com/office/drawing/2014/main" id="{7A9F1FAB-7348-4422-8CCD-DFF116EAD2A6}"/>
               </a:ext>
             </a:extLst>
           </p:cNvPr>
@@ -1340,7 +1348,7 @@
           <p:cNvPr id="4" name="Marcador de contenido 3">
             <a:extLst>
               <a:ext uri="{FF2B5EF4-FFF2-40B4-BE49-F238E27FC236}">
-                <a16:creationId xmlns:a16="http://schemas.microsoft.com/office/drawing/2014/main" id="{8E0947D0-1ECF-4C60-8B6F-62F5226550CE}"/>
+                <a16:creationId xmlns:a16="http://schemas.microsoft.com/office/drawing/2014/main" id="{2E27ABDC-3767-41AE-8994-BE1732CB7E06}"/>
               </a:ext>
             </a:extLst>
           </p:cNvPr>
@@ -1403,7 +1411,7 @@
           <p:cNvPr id="5" name="Marcador de fecha 4">
             <a:extLst>
               <a:ext uri="{FF2B5EF4-FFF2-40B4-BE49-F238E27FC236}">
-                <a16:creationId xmlns:a16="http://schemas.microsoft.com/office/drawing/2014/main" id="{29F98B22-C9D6-435F-9E38-089B82874EEE}"/>
+                <a16:creationId xmlns:a16="http://schemas.microsoft.com/office/drawing/2014/main" id="{3B105CB8-B9E0-42A4-B168-4C6742C7BF82}"/>
               </a:ext>
             </a:extLst>
           </p:cNvPr>
@@ -1433,7 +1441,7 @@
           <p:cNvPr id="6" name="Marcador de pie de página 5">
             <a:extLst>
               <a:ext uri="{FF2B5EF4-FFF2-40B4-BE49-F238E27FC236}">
-                <a16:creationId xmlns:a16="http://schemas.microsoft.com/office/drawing/2014/main" id="{4A4ACBFC-F25D-4D1D-85D0-337166558BD8}"/>
+                <a16:creationId xmlns:a16="http://schemas.microsoft.com/office/drawing/2014/main" id="{1086E435-5148-424A-B5C2-527BE31EC139}"/>
               </a:ext>
             </a:extLst>
           </p:cNvPr>
@@ -1458,7 +1466,7 @@
           <p:cNvPr id="7" name="Marcador de número de diapositiva 6">
             <a:extLst>
               <a:ext uri="{FF2B5EF4-FFF2-40B4-BE49-F238E27FC236}">
-                <a16:creationId xmlns:a16="http://schemas.microsoft.com/office/drawing/2014/main" id="{31340C6D-7274-4351-A7EF-8CED07EADB14}"/>
+                <a16:creationId xmlns:a16="http://schemas.microsoft.com/office/drawing/2014/main" id="{9BA4588F-986F-499C-A21D-D42E74553BE7}"/>
               </a:ext>
             </a:extLst>
           </p:cNvPr>
@@ -1486,7 +1494,7 @@
     </p:spTree>
     <p:extLst>
       <p:ext uri="{BB962C8B-B14F-4D97-AF65-F5344CB8AC3E}">
-        <p14:creationId xmlns:p14="http://schemas.microsoft.com/office/powerpoint/2010/main" val="1096392835"/>
+        <p14:creationId xmlns:p14="http://schemas.microsoft.com/office/powerpoint/2010/main" val="321088874"/>
       </p:ext>
     </p:extLst>
   </p:cSld>
@@ -1518,7 +1526,7 @@
           <p:cNvPr id="2" name="Título 1">
             <a:extLst>
               <a:ext uri="{FF2B5EF4-FFF2-40B4-BE49-F238E27FC236}">
-                <a16:creationId xmlns:a16="http://schemas.microsoft.com/office/drawing/2014/main" id="{5D287F1B-A203-4C97-AB49-ABE7837D7A90}"/>
+                <a16:creationId xmlns:a16="http://schemas.microsoft.com/office/drawing/2014/main" id="{52BC8865-37F4-44CB-9CB9-1B22BFD4E6AE}"/>
               </a:ext>
             </a:extLst>
           </p:cNvPr>
@@ -1552,7 +1560,7 @@
           <p:cNvPr id="3" name="Marcador de texto 2">
             <a:extLst>
               <a:ext uri="{FF2B5EF4-FFF2-40B4-BE49-F238E27FC236}">
-                <a16:creationId xmlns:a16="http://schemas.microsoft.com/office/drawing/2014/main" id="{1CCC289F-070D-4AD5-BCB6-35F1BB317045}"/>
+                <a16:creationId xmlns:a16="http://schemas.microsoft.com/office/drawing/2014/main" id="{D7FB4F01-21CC-4A3C-AE45-AB2D2B80CD6A}"/>
               </a:ext>
             </a:extLst>
           </p:cNvPr>
@@ -1623,7 +1631,7 @@
           <p:cNvPr id="4" name="Marcador de contenido 3">
             <a:extLst>
               <a:ext uri="{FF2B5EF4-FFF2-40B4-BE49-F238E27FC236}">
-                <a16:creationId xmlns:a16="http://schemas.microsoft.com/office/drawing/2014/main" id="{DC892316-B552-4870-99B2-4FD5DDD63512}"/>
+                <a16:creationId xmlns:a16="http://schemas.microsoft.com/office/drawing/2014/main" id="{CC0DC496-E9CE-419F-AA1F-F4656BA3793B}"/>
               </a:ext>
             </a:extLst>
           </p:cNvPr>
@@ -1686,7 +1694,7 @@
           <p:cNvPr id="5" name="Marcador de texto 4">
             <a:extLst>
               <a:ext uri="{FF2B5EF4-FFF2-40B4-BE49-F238E27FC236}">
-                <a16:creationId xmlns:a16="http://schemas.microsoft.com/office/drawing/2014/main" id="{2144D038-5FCF-47DC-9C62-FD72D28729BC}"/>
+                <a16:creationId xmlns:a16="http://schemas.microsoft.com/office/drawing/2014/main" id="{97615E20-3B75-4FD2-8349-4A8F9C34C11F}"/>
               </a:ext>
             </a:extLst>
           </p:cNvPr>
@@ -1757,7 +1765,7 @@
           <p:cNvPr id="6" name="Marcador de contenido 5">
             <a:extLst>
               <a:ext uri="{FF2B5EF4-FFF2-40B4-BE49-F238E27FC236}">
-                <a16:creationId xmlns:a16="http://schemas.microsoft.com/office/drawing/2014/main" id="{635AF7A1-D757-4F45-8406-F815447AA2D6}"/>
+                <a16:creationId xmlns:a16="http://schemas.microsoft.com/office/drawing/2014/main" id="{691E261D-E5F1-45BE-A06C-875E3E6D01ED}"/>
               </a:ext>
             </a:extLst>
           </p:cNvPr>
@@ -1820,7 +1828,7 @@
           <p:cNvPr id="7" name="Marcador de fecha 6">
             <a:extLst>
               <a:ext uri="{FF2B5EF4-FFF2-40B4-BE49-F238E27FC236}">
-                <a16:creationId xmlns:a16="http://schemas.microsoft.com/office/drawing/2014/main" id="{54AA6031-2304-4D6E-9C01-24857FEBA818}"/>
+                <a16:creationId xmlns:a16="http://schemas.microsoft.com/office/drawing/2014/main" id="{4D73EE23-6DC6-4E7E-8DD2-44395B74AD80}"/>
               </a:ext>
             </a:extLst>
           </p:cNvPr>
@@ -1850,7 +1858,7 @@
           <p:cNvPr id="8" name="Marcador de pie de página 7">
             <a:extLst>
               <a:ext uri="{FF2B5EF4-FFF2-40B4-BE49-F238E27FC236}">
-                <a16:creationId xmlns:a16="http://schemas.microsoft.com/office/drawing/2014/main" id="{A081E8C3-B697-4CC2-A148-52D33DEB1E1F}"/>
+                <a16:creationId xmlns:a16="http://schemas.microsoft.com/office/drawing/2014/main" id="{7C47896E-131D-4A1B-8378-042A6C8D49B6}"/>
               </a:ext>
             </a:extLst>
           </p:cNvPr>
@@ -1875,7 +1883,7 @@
           <p:cNvPr id="9" name="Marcador de número de diapositiva 8">
             <a:extLst>
               <a:ext uri="{FF2B5EF4-FFF2-40B4-BE49-F238E27FC236}">
-                <a16:creationId xmlns:a16="http://schemas.microsoft.com/office/drawing/2014/main" id="{ECA2EA38-6356-4301-84A6-CCC52DC1177B}"/>
+                <a16:creationId xmlns:a16="http://schemas.microsoft.com/office/drawing/2014/main" id="{D36C55F1-8A41-42EF-8776-A62659031A5F}"/>
               </a:ext>
             </a:extLst>
           </p:cNvPr>
@@ -1903,7 +1911,7 @@
     </p:spTree>
     <p:extLst>
       <p:ext uri="{BB962C8B-B14F-4D97-AF65-F5344CB8AC3E}">
-        <p14:creationId xmlns:p14="http://schemas.microsoft.com/office/powerpoint/2010/main" val="4146927587"/>
+        <p14:creationId xmlns:p14="http://schemas.microsoft.com/office/powerpoint/2010/main" val="3164200366"/>
       </p:ext>
     </p:extLst>
   </p:cSld>
@@ -1935,7 +1943,7 @@
           <p:cNvPr id="2" name="Título 1">
             <a:extLst>
               <a:ext uri="{FF2B5EF4-FFF2-40B4-BE49-F238E27FC236}">
-                <a16:creationId xmlns:a16="http://schemas.microsoft.com/office/drawing/2014/main" id="{ED97B147-3CEA-409E-BBC5-178CE68F29C5}"/>
+                <a16:creationId xmlns:a16="http://schemas.microsoft.com/office/drawing/2014/main" id="{96CC1863-7C0B-4D37-90E7-42B96CFF1678}"/>
               </a:ext>
             </a:extLst>
           </p:cNvPr>
@@ -1964,7 +1972,7 @@
           <p:cNvPr id="3" name="Marcador de fecha 2">
             <a:extLst>
               <a:ext uri="{FF2B5EF4-FFF2-40B4-BE49-F238E27FC236}">
-                <a16:creationId xmlns:a16="http://schemas.microsoft.com/office/drawing/2014/main" id="{7D9CAE4D-BBC0-4D55-BA66-CEFF5164B836}"/>
+                <a16:creationId xmlns:a16="http://schemas.microsoft.com/office/drawing/2014/main" id="{3A3E5473-6ACE-4665-93FB-8DD90F413B5B}"/>
               </a:ext>
             </a:extLst>
           </p:cNvPr>
@@ -1994,7 +2002,7 @@
           <p:cNvPr id="4" name="Marcador de pie de página 3">
             <a:extLst>
               <a:ext uri="{FF2B5EF4-FFF2-40B4-BE49-F238E27FC236}">
-                <a16:creationId xmlns:a16="http://schemas.microsoft.com/office/drawing/2014/main" id="{FDF45A14-D6B9-4657-88D6-2D78D62B39E4}"/>
+                <a16:creationId xmlns:a16="http://schemas.microsoft.com/office/drawing/2014/main" id="{F8E1159E-012E-4CB8-B45A-A24ADDF4150F}"/>
               </a:ext>
             </a:extLst>
           </p:cNvPr>
@@ -2019,7 +2027,7 @@
           <p:cNvPr id="5" name="Marcador de número de diapositiva 4">
             <a:extLst>
               <a:ext uri="{FF2B5EF4-FFF2-40B4-BE49-F238E27FC236}">
-                <a16:creationId xmlns:a16="http://schemas.microsoft.com/office/drawing/2014/main" id="{1A547840-70C7-4208-AEB7-205E0CC07079}"/>
+                <a16:creationId xmlns:a16="http://schemas.microsoft.com/office/drawing/2014/main" id="{E77A473B-23C9-4036-A180-37563D9A2993}"/>
               </a:ext>
             </a:extLst>
           </p:cNvPr>
@@ -2047,7 +2055,7 @@
     </p:spTree>
     <p:extLst>
       <p:ext uri="{BB962C8B-B14F-4D97-AF65-F5344CB8AC3E}">
-        <p14:creationId xmlns:p14="http://schemas.microsoft.com/office/powerpoint/2010/main" val="818237001"/>
+        <p14:creationId xmlns:p14="http://schemas.microsoft.com/office/powerpoint/2010/main" val="3310507131"/>
       </p:ext>
     </p:extLst>
   </p:cSld>
@@ -2079,7 +2087,7 @@
           <p:cNvPr id="2" name="Marcador de fecha 1">
             <a:extLst>
               <a:ext uri="{FF2B5EF4-FFF2-40B4-BE49-F238E27FC236}">
-                <a16:creationId xmlns:a16="http://schemas.microsoft.com/office/drawing/2014/main" id="{280A87B8-8973-4787-A4D8-F36858FC5DDE}"/>
+                <a16:creationId xmlns:a16="http://schemas.microsoft.com/office/drawing/2014/main" id="{C87C5B59-1963-4A61-BB87-76DC026396F1}"/>
               </a:ext>
             </a:extLst>
           </p:cNvPr>
@@ -2109,7 +2117,7 @@
           <p:cNvPr id="3" name="Marcador de pie de página 2">
             <a:extLst>
               <a:ext uri="{FF2B5EF4-FFF2-40B4-BE49-F238E27FC236}">
-                <a16:creationId xmlns:a16="http://schemas.microsoft.com/office/drawing/2014/main" id="{01F1642F-5773-4782-ABD3-55D216B4FDAE}"/>
+                <a16:creationId xmlns:a16="http://schemas.microsoft.com/office/drawing/2014/main" id="{0F00085D-77BB-4AC1-8A46-A5068D9A1AF1}"/>
               </a:ext>
             </a:extLst>
           </p:cNvPr>
@@ -2134,7 +2142,7 @@
           <p:cNvPr id="4" name="Marcador de número de diapositiva 3">
             <a:extLst>
               <a:ext uri="{FF2B5EF4-FFF2-40B4-BE49-F238E27FC236}">
-                <a16:creationId xmlns:a16="http://schemas.microsoft.com/office/drawing/2014/main" id="{1AB5606F-7305-4188-85BF-F064DDFA2E17}"/>
+                <a16:creationId xmlns:a16="http://schemas.microsoft.com/office/drawing/2014/main" id="{3EA12AE5-8DE8-43CD-A9EB-1F4A14088445}"/>
               </a:ext>
             </a:extLst>
           </p:cNvPr>
@@ -2162,7 +2170,7 @@
     </p:spTree>
     <p:extLst>
       <p:ext uri="{BB962C8B-B14F-4D97-AF65-F5344CB8AC3E}">
-        <p14:creationId xmlns:p14="http://schemas.microsoft.com/office/powerpoint/2010/main" val="537028300"/>
+        <p14:creationId xmlns:p14="http://schemas.microsoft.com/office/powerpoint/2010/main" val="966880925"/>
       </p:ext>
     </p:extLst>
   </p:cSld>
@@ -2194,7 +2202,7 @@
           <p:cNvPr id="2" name="Título 1">
             <a:extLst>
               <a:ext uri="{FF2B5EF4-FFF2-40B4-BE49-F238E27FC236}">
-                <a16:creationId xmlns:a16="http://schemas.microsoft.com/office/drawing/2014/main" id="{41F41707-1164-4B09-BF81-486998FD70E2}"/>
+                <a16:creationId xmlns:a16="http://schemas.microsoft.com/office/drawing/2014/main" id="{3BDDA045-E999-41CC-9BFB-BEFC245227EA}"/>
               </a:ext>
             </a:extLst>
           </p:cNvPr>
@@ -2232,7 +2240,7 @@
           <p:cNvPr id="3" name="Marcador de contenido 2">
             <a:extLst>
               <a:ext uri="{FF2B5EF4-FFF2-40B4-BE49-F238E27FC236}">
-                <a16:creationId xmlns:a16="http://schemas.microsoft.com/office/drawing/2014/main" id="{92C10FB5-C76B-446A-AB91-F045B759B85E}"/>
+                <a16:creationId xmlns:a16="http://schemas.microsoft.com/office/drawing/2014/main" id="{018EEBBE-E5A1-4439-AD01-B08BC679BAA6}"/>
               </a:ext>
             </a:extLst>
           </p:cNvPr>
@@ -2323,7 +2331,7 @@
           <p:cNvPr id="4" name="Marcador de texto 3">
             <a:extLst>
               <a:ext uri="{FF2B5EF4-FFF2-40B4-BE49-F238E27FC236}">
-                <a16:creationId xmlns:a16="http://schemas.microsoft.com/office/drawing/2014/main" id="{0D699A59-41A0-4EF9-84E1-BA40ABFA9604}"/>
+                <a16:creationId xmlns:a16="http://schemas.microsoft.com/office/drawing/2014/main" id="{D909DBB0-CFD9-475B-83BD-570CD78F86AC}"/>
               </a:ext>
             </a:extLst>
           </p:cNvPr>
@@ -2394,7 +2402,7 @@
           <p:cNvPr id="5" name="Marcador de fecha 4">
             <a:extLst>
               <a:ext uri="{FF2B5EF4-FFF2-40B4-BE49-F238E27FC236}">
-                <a16:creationId xmlns:a16="http://schemas.microsoft.com/office/drawing/2014/main" id="{2831FA93-A36E-445E-B67D-6C1F316B6388}"/>
+                <a16:creationId xmlns:a16="http://schemas.microsoft.com/office/drawing/2014/main" id="{AACD468F-1366-4AC5-A617-3E5D74F7129E}"/>
               </a:ext>
             </a:extLst>
           </p:cNvPr>
@@ -2424,7 +2432,7 @@
           <p:cNvPr id="6" name="Marcador de pie de página 5">
             <a:extLst>
               <a:ext uri="{FF2B5EF4-FFF2-40B4-BE49-F238E27FC236}">
-                <a16:creationId xmlns:a16="http://schemas.microsoft.com/office/drawing/2014/main" id="{4959DA73-36FF-47F9-8452-C8359971854A}"/>
+                <a16:creationId xmlns:a16="http://schemas.microsoft.com/office/drawing/2014/main" id="{B03E9AE3-88B2-4249-AC64-32A7F0127D06}"/>
               </a:ext>
             </a:extLst>
           </p:cNvPr>
@@ -2449,7 +2457,7 @@
           <p:cNvPr id="7" name="Marcador de número de diapositiva 6">
             <a:extLst>
               <a:ext uri="{FF2B5EF4-FFF2-40B4-BE49-F238E27FC236}">
-                <a16:creationId xmlns:a16="http://schemas.microsoft.com/office/drawing/2014/main" id="{83564444-290C-4C5E-975B-4D9E1E3744AE}"/>
+                <a16:creationId xmlns:a16="http://schemas.microsoft.com/office/drawing/2014/main" id="{E0BF4C8F-4D11-401D-9D8E-398A184A0AAC}"/>
               </a:ext>
             </a:extLst>
           </p:cNvPr>
@@ -2477,7 +2485,7 @@
     </p:spTree>
     <p:extLst>
       <p:ext uri="{BB962C8B-B14F-4D97-AF65-F5344CB8AC3E}">
-        <p14:creationId xmlns:p14="http://schemas.microsoft.com/office/powerpoint/2010/main" val="206466602"/>
+        <p14:creationId xmlns:p14="http://schemas.microsoft.com/office/powerpoint/2010/main" val="2267833346"/>
       </p:ext>
     </p:extLst>
   </p:cSld>
@@ -2509,7 +2517,7 @@
           <p:cNvPr id="2" name="Título 1">
             <a:extLst>
               <a:ext uri="{FF2B5EF4-FFF2-40B4-BE49-F238E27FC236}">
-                <a16:creationId xmlns:a16="http://schemas.microsoft.com/office/drawing/2014/main" id="{ED7DDCD5-7001-4232-B377-956F11E77130}"/>
+                <a16:creationId xmlns:a16="http://schemas.microsoft.com/office/drawing/2014/main" id="{5F45C4E4-AD5D-4E57-AADC-19B0CD3AD8DA}"/>
               </a:ext>
             </a:extLst>
           </p:cNvPr>
@@ -2547,7 +2555,7 @@
           <p:cNvPr id="3" name="Marcador de posición de imagen 2">
             <a:extLst>
               <a:ext uri="{FF2B5EF4-FFF2-40B4-BE49-F238E27FC236}">
-                <a16:creationId xmlns:a16="http://schemas.microsoft.com/office/drawing/2014/main" id="{C5B4D497-BC01-432E-959A-FC09C9B24F28}"/>
+                <a16:creationId xmlns:a16="http://schemas.microsoft.com/office/drawing/2014/main" id="{D3EE8575-2519-4FDD-B4E2-AFD24B2C67A1}"/>
               </a:ext>
             </a:extLst>
           </p:cNvPr>
@@ -2614,7 +2622,7 @@
           <p:cNvPr id="4" name="Marcador de texto 3">
             <a:extLst>
               <a:ext uri="{FF2B5EF4-FFF2-40B4-BE49-F238E27FC236}">
-                <a16:creationId xmlns:a16="http://schemas.microsoft.com/office/drawing/2014/main" id="{9AF00F07-7B63-49B6-8F71-62BACB2FDAF5}"/>
+                <a16:creationId xmlns:a16="http://schemas.microsoft.com/office/drawing/2014/main" id="{C953E63B-8A8A-42BC-9F93-58F7AB721011}"/>
               </a:ext>
             </a:extLst>
           </p:cNvPr>
@@ -2685,7 +2693,7 @@
           <p:cNvPr id="5" name="Marcador de fecha 4">
             <a:extLst>
               <a:ext uri="{FF2B5EF4-FFF2-40B4-BE49-F238E27FC236}">
-                <a16:creationId xmlns:a16="http://schemas.microsoft.com/office/drawing/2014/main" id="{2D8C28AA-E4EB-406D-9FD4-A96552457970}"/>
+                <a16:creationId xmlns:a16="http://schemas.microsoft.com/office/drawing/2014/main" id="{ABD67654-3F7F-4DF2-B99E-8EDA4228638B}"/>
               </a:ext>
             </a:extLst>
           </p:cNvPr>
@@ -2715,7 +2723,7 @@
           <p:cNvPr id="6" name="Marcador de pie de página 5">
             <a:extLst>
               <a:ext uri="{FF2B5EF4-FFF2-40B4-BE49-F238E27FC236}">
-                <a16:creationId xmlns:a16="http://schemas.microsoft.com/office/drawing/2014/main" id="{D7DFAECC-E6BD-43D1-8316-D04E0545CE0A}"/>
+                <a16:creationId xmlns:a16="http://schemas.microsoft.com/office/drawing/2014/main" id="{52C377C5-A374-4ACE-94D5-2D73140C0E1C}"/>
               </a:ext>
             </a:extLst>
           </p:cNvPr>
@@ -2740,7 +2748,7 @@
           <p:cNvPr id="7" name="Marcador de número de diapositiva 6">
             <a:extLst>
               <a:ext uri="{FF2B5EF4-FFF2-40B4-BE49-F238E27FC236}">
-                <a16:creationId xmlns:a16="http://schemas.microsoft.com/office/drawing/2014/main" id="{7C3C523A-C394-4195-A248-26AEDDF1A60A}"/>
+                <a16:creationId xmlns:a16="http://schemas.microsoft.com/office/drawing/2014/main" id="{028BFB50-0363-4265-968D-191C09255B55}"/>
               </a:ext>
             </a:extLst>
           </p:cNvPr>
@@ -2768,7 +2776,7 @@
     </p:spTree>
     <p:extLst>
       <p:ext uri="{BB962C8B-B14F-4D97-AF65-F5344CB8AC3E}">
-        <p14:creationId xmlns:p14="http://schemas.microsoft.com/office/powerpoint/2010/main" val="1765370969"/>
+        <p14:creationId xmlns:p14="http://schemas.microsoft.com/office/powerpoint/2010/main" val="2778872496"/>
       </p:ext>
     </p:extLst>
   </p:cSld>
@@ -2805,7 +2813,7 @@
           <p:cNvPr id="2" name="Marcador de título 1">
             <a:extLst>
               <a:ext uri="{FF2B5EF4-FFF2-40B4-BE49-F238E27FC236}">
-                <a16:creationId xmlns:a16="http://schemas.microsoft.com/office/drawing/2014/main" id="{48CA4C94-6738-4A8D-AA0E-0A8A82F6C54D}"/>
+                <a16:creationId xmlns:a16="http://schemas.microsoft.com/office/drawing/2014/main" id="{873F296D-3FA0-4D15-8853-BFA1648BBD47}"/>
               </a:ext>
             </a:extLst>
           </p:cNvPr>
@@ -2844,7 +2852,7 @@
           <p:cNvPr id="3" name="Marcador de texto 2">
             <a:extLst>
               <a:ext uri="{FF2B5EF4-FFF2-40B4-BE49-F238E27FC236}">
-                <a16:creationId xmlns:a16="http://schemas.microsoft.com/office/drawing/2014/main" id="{B4951B59-EFAE-47CE-AC56-FF5921D8CEA4}"/>
+                <a16:creationId xmlns:a16="http://schemas.microsoft.com/office/drawing/2014/main" id="{C04611E2-1D54-4910-873B-4872D667E8C9}"/>
               </a:ext>
             </a:extLst>
           </p:cNvPr>
@@ -2912,7 +2920,7 @@
           <p:cNvPr id="4" name="Marcador de fecha 3">
             <a:extLst>
               <a:ext uri="{FF2B5EF4-FFF2-40B4-BE49-F238E27FC236}">
-                <a16:creationId xmlns:a16="http://schemas.microsoft.com/office/drawing/2014/main" id="{221994EE-E549-458E-89B0-132AFE3A266B}"/>
+                <a16:creationId xmlns:a16="http://schemas.microsoft.com/office/drawing/2014/main" id="{71006972-24EE-4EA6-8C71-42CD47A10352}"/>
               </a:ext>
             </a:extLst>
           </p:cNvPr>
@@ -2960,7 +2968,7 @@
           <p:cNvPr id="5" name="Marcador de pie de página 4">
             <a:extLst>
               <a:ext uri="{FF2B5EF4-FFF2-40B4-BE49-F238E27FC236}">
-                <a16:creationId xmlns:a16="http://schemas.microsoft.com/office/drawing/2014/main" id="{8A30BD94-62FC-46EA-ABD1-ACE8BEE31F1A}"/>
+                <a16:creationId xmlns:a16="http://schemas.microsoft.com/office/drawing/2014/main" id="{06C69999-C2AF-4EB3-B9AD-AA5EDB205FC9}"/>
               </a:ext>
             </a:extLst>
           </p:cNvPr>
@@ -3003,7 +3011,7 @@
           <p:cNvPr id="6" name="Marcador de número de diapositiva 5">
             <a:extLst>
               <a:ext uri="{FF2B5EF4-FFF2-40B4-BE49-F238E27FC236}">
-                <a16:creationId xmlns:a16="http://schemas.microsoft.com/office/drawing/2014/main" id="{4EEF8E4B-1D60-4326-82DA-4FFAC0374682}"/>
+                <a16:creationId xmlns:a16="http://schemas.microsoft.com/office/drawing/2014/main" id="{E6E057DE-2D2C-4FA4-ADA1-AB8DB07B0C6F}"/>
               </a:ext>
             </a:extLst>
           </p:cNvPr>
@@ -3049,23 +3057,23 @@
     </p:spTree>
     <p:extLst>
       <p:ext uri="{BB962C8B-B14F-4D97-AF65-F5344CB8AC3E}">
-        <p14:creationId xmlns:p14="http://schemas.microsoft.com/office/powerpoint/2010/main" val="1249793369"/>
+        <p14:creationId xmlns:p14="http://schemas.microsoft.com/office/powerpoint/2010/main" val="3443299162"/>
       </p:ext>
     </p:extLst>
   </p:cSld>
   <p:clrMap bg1="lt1" tx1="dk1" bg2="lt2" tx2="dk2" accent1="accent1" accent2="accent2" accent3="accent3" accent4="accent4" accent5="accent5" accent6="accent6" hlink="hlink" folHlink="folHlink"/>
   <p:sldLayoutIdLst>
-    <p:sldLayoutId id="2147483715" r:id="rId1"/>
-    <p:sldLayoutId id="2147483716" r:id="rId2"/>
-    <p:sldLayoutId id="2147483717" r:id="rId3"/>
-    <p:sldLayoutId id="2147483718" r:id="rId4"/>
-    <p:sldLayoutId id="2147483719" r:id="rId5"/>
-    <p:sldLayoutId id="2147483720" r:id="rId6"/>
-    <p:sldLayoutId id="2147483721" r:id="rId7"/>
-    <p:sldLayoutId id="2147483722" r:id="rId8"/>
-    <p:sldLayoutId id="2147483723" r:id="rId9"/>
-    <p:sldLayoutId id="2147483724" r:id="rId10"/>
-    <p:sldLayoutId id="2147483725" r:id="rId11"/>
+    <p:sldLayoutId id="2147483739" r:id="rId1"/>
+    <p:sldLayoutId id="2147483740" r:id="rId2"/>
+    <p:sldLayoutId id="2147483741" r:id="rId3"/>
+    <p:sldLayoutId id="2147483742" r:id="rId4"/>
+    <p:sldLayoutId id="2147483743" r:id="rId5"/>
+    <p:sldLayoutId id="2147483744" r:id="rId6"/>
+    <p:sldLayoutId id="2147483745" r:id="rId7"/>
+    <p:sldLayoutId id="2147483746" r:id="rId8"/>
+    <p:sldLayoutId id="2147483747" r:id="rId9"/>
+    <p:sldLayoutId id="2147483748" r:id="rId10"/>
+    <p:sldLayoutId id="2147483749" r:id="rId11"/>
   </p:sldLayoutIdLst>
   <p:txStyles>
     <p:titleStyle>
@@ -3464,42 +3472,6 @@
           </a:prstGeom>
         </p:spPr>
       </p:pic>
-      <p:pic>
-        <p:nvPicPr>
-          <p:cNvPr id="7" name="Imagen 6" descr="Imagen que contiene tabla, interior, persona, niño&#10;&#10;Descripción generada automáticamente">
-            <a:extLst>
-              <a:ext uri="{FF2B5EF4-FFF2-40B4-BE49-F238E27FC236}">
-                <a16:creationId xmlns:a16="http://schemas.microsoft.com/office/drawing/2014/main" id="{A0740C7E-9B22-4A82-8D7C-B74A361065AB}"/>
-              </a:ext>
-            </a:extLst>
-          </p:cNvPr>
-          <p:cNvPicPr>
-            <a:picLocks noChangeAspect="1"/>
-          </p:cNvPicPr>
-          <p:nvPr/>
-        </p:nvPicPr>
-        <p:blipFill>
-          <a:blip r:embed="rId4">
-            <a:extLst>
-              <a:ext uri="{28A0092B-C50C-407E-A947-70E740481C1C}">
-                <a14:useLocalDpi xmlns:a14="http://schemas.microsoft.com/office/drawing/2010/main" val="0"/>
-              </a:ext>
-            </a:extLst>
-          </a:blip>
-          <a:stretch>
-            <a:fillRect/>
-          </a:stretch>
-        </p:blipFill>
-        <p:spPr>
-          <a:xfrm>
-            <a:off x="570926" y="0"/>
-            <a:ext cx="5684732" cy="6857493"/>
-          </a:xfrm>
-          <a:prstGeom prst="rect">
-            <a:avLst/>
-          </a:prstGeom>
-        </p:spPr>
-      </p:pic>
     </p:spTree>
     <p:extLst>
       <p:ext uri="{BB962C8B-B14F-4D97-AF65-F5344CB8AC3E}">
@@ -3530,26 +3502,659 @@
           <a:chExt cx="0" cy="0"/>
         </a:xfrm>
       </p:grpSpPr>
-      <p:sp>
-        <p:nvSpPr>
-          <p:cNvPr id="2" name="Título 1">
-            <a:extLst>
-              <a:ext uri="{FF2B5EF4-FFF2-40B4-BE49-F238E27FC236}">
-                <a16:creationId xmlns:a16="http://schemas.microsoft.com/office/drawing/2014/main" id="{4136ADBF-4626-4BA6-B006-77CB7B0C082E}"/>
-              </a:ext>
-            </a:extLst>
-          </p:cNvPr>
-          <p:cNvSpPr>
-            <a:spLocks noGrp="1"/>
-          </p:cNvSpPr>
-          <p:nvPr>
-            <p:ph type="ctrTitle"/>
-          </p:nvPr>
-        </p:nvSpPr>
+      <p:pic>
+        <p:nvPicPr>
+          <p:cNvPr id="7" name="Imagen 6" descr="Imagen que contiene exterior, nieve, luz, calle&#10;&#10;Descripción generada automáticamente">
+            <a:extLst>
+              <a:ext uri="{FF2B5EF4-FFF2-40B4-BE49-F238E27FC236}">
+                <a16:creationId xmlns:a16="http://schemas.microsoft.com/office/drawing/2014/main" id="{EA5216E4-92E6-4934-B1CF-419D234FD80D}"/>
+              </a:ext>
+            </a:extLst>
+          </p:cNvPr>
+          <p:cNvPicPr>
+            <a:picLocks noChangeAspect="1"/>
+          </p:cNvPicPr>
+          <p:nvPr/>
+        </p:nvPicPr>
+        <p:blipFill>
+          <a:blip r:embed="rId2">
+            <a:extLst>
+              <a:ext uri="{28A0092B-C50C-407E-A947-70E740481C1C}">
+                <a14:useLocalDpi xmlns:a14="http://schemas.microsoft.com/office/drawing/2010/main" val="0"/>
+              </a:ext>
+            </a:extLst>
+          </a:blip>
+          <a:stretch>
+            <a:fillRect/>
+          </a:stretch>
+        </p:blipFill>
         <p:spPr>
           <a:xfrm>
-            <a:off x="35663" y="2388034"/>
-            <a:ext cx="12286966" cy="1545338"/>
+            <a:off x="948856" y="652876"/>
+            <a:ext cx="9525000" cy="6029325"/>
+          </a:xfrm>
+          <a:prstGeom prst="rect">
+            <a:avLst/>
+          </a:prstGeom>
+          <a:ln w="12700">
+            <a:solidFill>
+              <a:schemeClr val="tx1"/>
+            </a:solidFill>
+          </a:ln>
+        </p:spPr>
+      </p:pic>
+    </p:spTree>
+    <p:extLst>
+      <p:ext uri="{BB962C8B-B14F-4D97-AF65-F5344CB8AC3E}">
+        <p14:creationId xmlns:p14="http://schemas.microsoft.com/office/powerpoint/2010/main" val="1816918686"/>
+      </p:ext>
+    </p:extLst>
+  </p:cSld>
+  <p:clrMapOvr>
+    <a:masterClrMapping/>
+  </p:clrMapOvr>
+</p:sld>
+</file>
+
+<file path=ppt/slides/slide3.xml><?xml version="1.0" encoding="utf-8"?>
+<p:sld xmlns:a="http://schemas.openxmlformats.org/drawingml/2006/main" xmlns:r="http://schemas.openxmlformats.org/officeDocument/2006/relationships" xmlns:p="http://schemas.openxmlformats.org/presentationml/2006/main">
+  <p:cSld>
+    <p:spTree>
+      <p:nvGrpSpPr>
+        <p:cNvPr id="1" name=""/>
+        <p:cNvGrpSpPr/>
+        <p:nvPr/>
+      </p:nvGrpSpPr>
+      <p:grpSpPr>
+        <a:xfrm>
+          <a:off x="0" y="0"/>
+          <a:ext cx="0" cy="0"/>
+          <a:chOff x="0" y="0"/>
+          <a:chExt cx="0" cy="0"/>
+        </a:xfrm>
+      </p:grpSpPr>
+      <p:pic>
+        <p:nvPicPr>
+          <p:cNvPr id="10" name="Picture 2">
+            <a:extLst>
+              <a:ext uri="{FF2B5EF4-FFF2-40B4-BE49-F238E27FC236}">
+                <a16:creationId xmlns:a16="http://schemas.microsoft.com/office/drawing/2014/main" id="{7933490F-A339-49EC-8A85-389802374106}"/>
+              </a:ext>
+            </a:extLst>
+          </p:cNvPr>
+          <p:cNvPicPr>
+            <a:picLocks noChangeAspect="1" noChangeArrowheads="1"/>
+          </p:cNvPicPr>
+          <p:nvPr/>
+        </p:nvPicPr>
+        <p:blipFill>
+          <a:blip r:embed="rId2">
+            <a:alphaModFix amt="27000"/>
+            <a:extLst>
+              <a:ext uri="{BEBA8EAE-BF5A-486C-A8C5-ECC9F3942E4B}">
+                <a14:imgProps xmlns:a14="http://schemas.microsoft.com/office/drawing/2010/main">
+                  <a14:imgLayer r:embed="rId3">
+                    <a14:imgEffect>
+                      <a14:backgroundRemoval t="9956" b="97511" l="10000" r="99815">
+                        <a14:foregroundMark x1="14444" y1="93867" x2="88519" y2="94133"/>
+                        <a14:foregroundMark x1="88519" y1="94133" x2="95741" y2="90133"/>
+                        <a14:foregroundMark x1="95741" y1="90133" x2="94630" y2="64533"/>
+                        <a14:foregroundMark x1="94630" y1="64533" x2="96852" y2="73689"/>
+                        <a14:foregroundMark x1="96852" y1="73689" x2="94537" y2="82578"/>
+                        <a14:foregroundMark x1="94537" y1="82578" x2="87037" y2="90578"/>
+                        <a14:foregroundMark x1="87037" y1="90578" x2="13333" y2="98222"/>
+                        <a14:foregroundMark x1="13333" y1="98222" x2="22778" y2="97422"/>
+                        <a14:foregroundMark x1="22778" y1="97422" x2="55185" y2="97422"/>
+                        <a14:foregroundMark x1="55185" y1="97422" x2="68241" y2="96978"/>
+                        <a14:foregroundMark x1="68241" y1="96978" x2="86296" y2="97067"/>
+                        <a14:foregroundMark x1="86296" y1="97067" x2="93333" y2="92178"/>
+                        <a14:foregroundMark x1="93333" y1="92178" x2="93333" y2="66667"/>
+                        <a14:foregroundMark x1="93333" y1="66667" x2="85278" y2="62756"/>
+                        <a14:foregroundMark x1="85278" y1="62756" x2="78241" y2="68000"/>
+                        <a14:foregroundMark x1="78241" y1="68000" x2="69074" y2="86311"/>
+                        <a14:foregroundMark x1="69074" y1="86311" x2="78889" y2="82756"/>
+                        <a14:foregroundMark x1="78889" y1="82756" x2="85370" y2="62844"/>
+                        <a14:foregroundMark x1="85370" y1="62844" x2="93611" y2="47022"/>
+                        <a14:foregroundMark x1="93611" y1="47022" x2="95278" y2="39289"/>
+                        <a14:foregroundMark x1="95278" y1="39289" x2="93796" y2="47378"/>
+                        <a14:foregroundMark x1="93796" y1="47378" x2="82407" y2="58933"/>
+                        <a14:foregroundMark x1="82407" y1="58933" x2="83611" y2="66844"/>
+                        <a14:foregroundMark x1="83611" y1="66844" x2="70370" y2="77600"/>
+                        <a14:foregroundMark x1="70370" y1="77600" x2="76667" y2="85067"/>
+                        <a14:foregroundMark x1="76667" y1="85067" x2="84815" y2="85156"/>
+                        <a14:foregroundMark x1="84815" y1="85156" x2="82685" y2="87556"/>
+                        <a14:foregroundMark x1="59444" y1="69867" x2="46944" y2="87022"/>
+                        <a14:foregroundMark x1="46944" y1="87022" x2="64815" y2="89333"/>
+                        <a14:foregroundMark x1="64815" y1="89333" x2="81944" y2="77956"/>
+                        <a14:foregroundMark x1="81944" y1="77956" x2="72407" y2="79467"/>
+                        <a14:foregroundMark x1="72407" y1="79467" x2="77593" y2="73067"/>
+                        <a14:foregroundMark x1="77593" y1="73067" x2="61574" y2="77867"/>
+                        <a14:foregroundMark x1="61574" y1="77867" x2="76852" y2="70667"/>
+                        <a14:foregroundMark x1="76852" y1="70667" x2="57222" y2="81067"/>
+                        <a14:foregroundMark x1="57222" y1="81067" x2="69722" y2="74933"/>
+                        <a14:foregroundMark x1="69722" y1="74933" x2="53148" y2="80800"/>
+                        <a14:foregroundMark x1="53148" y1="80800" x2="47500" y2="86756"/>
+                        <a14:foregroundMark x1="47500" y1="86756" x2="58796" y2="86756"/>
+                        <a14:foregroundMark x1="58796" y1="86756" x2="80000" y2="80889"/>
+                        <a14:foregroundMark x1="80000" y1="80889" x2="60833" y2="86222"/>
+                        <a14:foregroundMark x1="60833" y1="86222" x2="53889" y2="92267"/>
+                        <a14:foregroundMark x1="53889" y1="92267" x2="75926" y2="87733"/>
+                        <a14:foregroundMark x1="75926" y1="87733" x2="63333" y2="91200"/>
+                        <a14:foregroundMark x1="63333" y1="91200" x2="77593" y2="94133"/>
+                        <a14:foregroundMark x1="77593" y1="94133" x2="87130" y2="92000"/>
+                        <a14:foregroundMark x1="87130" y1="92000" x2="97222" y2="97244"/>
+                        <a14:foregroundMark x1="97222" y1="97244" x2="99444" y2="39822"/>
+                        <a14:foregroundMark x1="99444" y1="39822" x2="82037" y2="56000"/>
+                        <a14:foregroundMark x1="82037" y1="56000" x2="91944" y2="51200"/>
+                        <a14:foregroundMark x1="91944" y1="51200" x2="77870" y2="59556"/>
+                        <a14:foregroundMark x1="77870" y1="59556" x2="94167" y2="49244"/>
+                        <a14:foregroundMark x1="94167" y1="49244" x2="98241" y2="38133"/>
+                        <a14:foregroundMark x1="98241" y1="38133" x2="93148" y2="46311"/>
+                        <a14:foregroundMark x1="93148" y1="46311" x2="61204" y2="76800"/>
+                        <a14:foregroundMark x1="61204" y1="76800" x2="67870" y2="71911"/>
+                        <a14:foregroundMark x1="67870" y1="71911" x2="49630" y2="89956"/>
+                        <a14:foregroundMark x1="49630" y1="89956" x2="59444" y2="86844"/>
+                        <a14:foregroundMark x1="59444" y1="86844" x2="51481" y2="93333"/>
+                        <a14:foregroundMark x1="51481" y1="93333" x2="43333" y2="94489"/>
+                        <a14:foregroundMark x1="43333" y1="94489" x2="55926" y2="97067"/>
+                        <a14:foregroundMark x1="55926" y1="97067" x2="48148" y2="99556"/>
+                        <a14:foregroundMark x1="48148" y1="99556" x2="58981" y2="97511"/>
+                        <a14:foregroundMark x1="58981" y1="97511" x2="82407" y2="98578"/>
+                        <a14:foregroundMark x1="82407" y1="98578" x2="96296" y2="97511"/>
+                        <a14:foregroundMark x1="96296" y1="97511" x2="99815" y2="95644"/>
+                        <a14:foregroundMark x1="36759" y1="73600" x2="33056" y2="82133"/>
+                        <a14:foregroundMark x1="33056" y1="82133" x2="48148" y2="85156"/>
+                        <a14:foregroundMark x1="48148" y1="85156" x2="31481" y2="81067"/>
+                        <a14:foregroundMark x1="31481" y1="81067" x2="43241" y2="81333"/>
+                        <a14:foregroundMark x1="43241" y1="81333" x2="33333" y2="86311"/>
+                        <a14:foregroundMark x1="33333" y1="86311" x2="47222" y2="86044"/>
+                        <a14:foregroundMark x1="47222" y1="86044" x2="37222" y2="87467"/>
+                        <a14:foregroundMark x1="37222" y1="87467" x2="36944" y2="87556"/>
+                        <a14:foregroundMark x1="19630" y1="91467" x2="24907" y2="67289"/>
+                        <a14:foregroundMark x1="24907" y1="67289" x2="19352" y2="74489"/>
+                        <a14:foregroundMark x1="19352" y1="74489" x2="28889" y2="75378"/>
+                        <a14:foregroundMark x1="28889" y1="75378" x2="18519" y2="81333"/>
+                        <a14:foregroundMark x1="18519" y1="81333" x2="28056" y2="81067"/>
+                        <a14:foregroundMark x1="28056" y1="81067" x2="14537" y2="88089"/>
+                        <a14:foregroundMark x1="14537" y1="88089" x2="23426" y2="92800"/>
+                        <a14:foregroundMark x1="23426" y1="92800" x2="37870" y2="88889"/>
+                        <a14:foregroundMark x1="37870" y1="88889" x2="48333" y2="73867"/>
+                        <a14:foregroundMark x1="48333" y1="73867" x2="30463" y2="74844"/>
+                        <a14:foregroundMark x1="30463" y1="74844" x2="42407" y2="75467"/>
+                        <a14:foregroundMark x1="42407" y1="75467" x2="29630" y2="76356"/>
+                        <a14:foregroundMark x1="29630" y1="76356" x2="46389" y2="74667"/>
+                        <a14:foregroundMark x1="46389" y1="74667" x2="37963" y2="68356"/>
+                        <a14:foregroundMark x1="37963" y1="68356" x2="26389" y2="77422"/>
+                        <a14:foregroundMark x1="26389" y1="77422" x2="34167" y2="82489"/>
+                        <a14:foregroundMark x1="34167" y1="82489" x2="52037" y2="77956"/>
+                        <a14:foregroundMark x1="52037" y1="77956" x2="46852" y2="71111"/>
+                        <a14:foregroundMark x1="46852" y1="71111" x2="40556" y2="78044"/>
+                        <a14:foregroundMark x1="40556" y1="78044" x2="51944" y2="80000"/>
+                        <a14:foregroundMark x1="51944" y1="80000" x2="40556" y2="75111"/>
+                        <a14:foregroundMark x1="40556" y1="75111" x2="21481" y2="84178"/>
+                        <a14:foregroundMark x1="21481" y1="84178" x2="32593" y2="87200"/>
+                        <a14:foregroundMark x1="32593" y1="87200" x2="21759" y2="80889"/>
+                        <a14:foregroundMark x1="21759" y1="80889" x2="11389" y2="88000"/>
+                        <a14:foregroundMark x1="11389" y1="88000" x2="24722" y2="90311"/>
+                        <a14:foregroundMark x1="24722" y1="90311" x2="15833" y2="88000"/>
+                        <a14:foregroundMark x1="15833" y1="88000" x2="17130" y2="96444"/>
+                        <a14:foregroundMark x1="17130" y1="96444" x2="26111" y2="90933"/>
+                        <a14:foregroundMark x1="26111" y1="90933" x2="14259" y2="91556"/>
+                        <a14:foregroundMark x1="14259" y1="91556" x2="25741" y2="96533"/>
+                        <a14:foregroundMark x1="25741" y1="96533" x2="48148" y2="86222"/>
+                        <a14:foregroundMark x1="48148" y1="86222" x2="37315" y2="87733"/>
+                        <a14:foregroundMark x1="37315" y1="87733" x2="57963" y2="83378"/>
+                        <a14:foregroundMark x1="57963" y1="83378" x2="67593" y2="76356"/>
+                        <a14:foregroundMark x1="67593" y1="76356" x2="59815" y2="69067"/>
+                        <a14:foregroundMark x1="59815" y1="69067" x2="69444" y2="62400"/>
+                        <a14:foregroundMark x1="69444" y1="62400" x2="55093" y2="65422"/>
+                        <a14:foregroundMark x1="55093" y1="65422" x2="68796" y2="58844"/>
+                        <a14:foregroundMark x1="68796" y1="58844" x2="50278" y2="63200"/>
+                        <a14:foregroundMark x1="50278" y1="63200" x2="63889" y2="60978"/>
+                        <a14:foregroundMark x1="63889" y1="60978" x2="78148" y2="51556"/>
+                        <a14:foregroundMark x1="78148" y1="51556" x2="69722" y2="53778"/>
+                        <a14:foregroundMark x1="69722" y1="53778" x2="76667" y2="49244"/>
+                        <a14:foregroundMark x1="76667" y1="49244" x2="90278" y2="34844"/>
+                        <a14:foregroundMark x1="90278" y1="34844" x2="84167" y2="42667"/>
+                        <a14:foregroundMark x1="84167" y1="42667" x2="93611" y2="33333"/>
+                        <a14:foregroundMark x1="93611" y1="33333" x2="96389" y2="34222"/>
+                        <a14:backgroundMark x1="30370" y1="49511" x2="47963" y2="13333"/>
+                        <a14:backgroundMark x1="47963" y1="13333" x2="25093" y2="25333"/>
+                        <a14:backgroundMark x1="25093" y1="25333" x2="14352" y2="42044"/>
+                        <a14:backgroundMark x1="14352" y1="42044" x2="40185" y2="36533"/>
+                        <a14:backgroundMark x1="40185" y1="36533" x2="45278" y2="29956"/>
+                        <a14:backgroundMark x1="45278" y1="29956" x2="28148" y2="40000"/>
+                        <a14:backgroundMark x1="28148" y1="40000" x2="45000" y2="45244"/>
+                        <a14:backgroundMark x1="45000" y1="45244" x2="60093" y2="37956"/>
+                        <a14:backgroundMark x1="60093" y1="37956" x2="44815" y2="42756"/>
+                        <a14:backgroundMark x1="44815" y1="42756" x2="42500" y2="50400"/>
+                        <a14:backgroundMark x1="42500" y1="50400" x2="62500" y2="49778"/>
+                        <a14:backgroundMark x1="62500" y1="49778" x2="78056" y2="44267"/>
+                        <a14:backgroundMark x1="78056" y1="44267" x2="57870" y2="52533"/>
+                        <a14:backgroundMark x1="57870" y1="52533" x2="74259" y2="49156"/>
+                        <a14:backgroundMark x1="74259" y1="49156" x2="53241" y2="58400"/>
+                        <a14:backgroundMark x1="53241" y1="58400" x2="81343" y2="43541"/>
+                        <a14:backgroundMark x1="81995" y1="42851" x2="65926" y2="47200"/>
+                        <a14:backgroundMark x1="65926" y1="47200" x2="88704" y2="34044"/>
+                        <a14:backgroundMark x1="88704" y1="34044" x2="93796" y2="26933"/>
+                        <a14:backgroundMark x1="93796" y1="26933" x2="82778" y2="33156"/>
+                        <a14:backgroundMark x1="82778" y1="33156" x2="98148" y2="23733"/>
+                        <a14:backgroundMark x1="98148" y1="23733" x2="83333" y2="26933"/>
+                        <a14:backgroundMark x1="83333" y1="26933" x2="94074" y2="19733"/>
+                        <a14:backgroundMark x1="94074" y1="19733" x2="66759" y2="35378"/>
+                        <a14:backgroundMark x1="66759" y1="35378" x2="82222" y2="29511"/>
+                        <a14:backgroundMark x1="82222" y1="29511" x2="89167" y2="24267"/>
+                        <a14:backgroundMark x1="89167" y1="24267" x2="62037" y2="37778"/>
+                        <a14:backgroundMark x1="62037" y1="37778" x2="81111" y2="30756"/>
+                        <a14:backgroundMark x1="81111" y1="30756" x2="45000" y2="51733"/>
+                        <a14:backgroundMark x1="45000" y1="51733" x2="65093" y2="43022"/>
+                        <a14:backgroundMark x1="65093" y1="43022" x2="50741" y2="49333"/>
+                        <a14:backgroundMark x1="50741" y1="49333" x2="59815" y2="45956"/>
+                        <a14:backgroundMark x1="59815" y1="45956" x2="45000" y2="57956"/>
+                        <a14:backgroundMark x1="45000" y1="57956" x2="56759" y2="52444"/>
+                        <a14:backgroundMark x1="56759" y1="52444" x2="45926" y2="52089"/>
+                        <a14:backgroundMark x1="45926" y1="52089" x2="35648" y2="59378"/>
+                        <a14:backgroundMark x1="35648" y1="59378" x2="51111" y2="54311"/>
+                        <a14:backgroundMark x1="51111" y1="54311" x2="38426" y2="58933"/>
+                        <a14:backgroundMark x1="38426" y1="58933" x2="52500" y2="54400"/>
+                        <a14:backgroundMark x1="52500" y1="54400" x2="32685" y2="59200"/>
+                        <a14:backgroundMark x1="32685" y1="59200" x2="53519" y2="47111"/>
+                        <a14:backgroundMark x1="53519" y1="47111" x2="32407" y2="48533"/>
+                        <a14:backgroundMark x1="32407" y1="48533" x2="22870" y2="53422"/>
+                        <a14:backgroundMark x1="22870" y1="53422" x2="55093" y2="41067"/>
+                        <a14:backgroundMark x1="55093" y1="41067" x2="22778" y2="54844"/>
+                        <a14:backgroundMark x1="22778" y1="54844" x2="54167" y2="41511"/>
+                        <a14:backgroundMark x1="54167" y1="41511" x2="28704" y2="51200"/>
+                        <a14:backgroundMark x1="28704" y1="51200" x2="40463" y2="44089"/>
+                        <a14:backgroundMark x1="40463" y1="44089" x2="27407" y2="46222"/>
+                        <a14:backgroundMark x1="27407" y1="46222" x2="49444" y2="30844"/>
+                        <a14:backgroundMark x1="49444" y1="30844" x2="30185" y2="32356"/>
+                        <a14:backgroundMark x1="30185" y1="32356" x2="22222" y2="39200"/>
+                        <a14:backgroundMark x1="22222" y1="39200" x2="44815" y2="23022"/>
+                        <a14:backgroundMark x1="44815" y1="23022" x2="26019" y2="21333"/>
+                        <a14:backgroundMark x1="26019" y1="21333" x2="18981" y2="29067"/>
+                        <a14:backgroundMark x1="18981" y1="29067" x2="31389" y2="23111"/>
+                        <a14:backgroundMark x1="31389" y1="23111" x2="13056" y2="28267"/>
+                        <a14:backgroundMark x1="13056" y1="28267" x2="28981" y2="20000"/>
+                        <a14:backgroundMark x1="28981" y1="20000" x2="15648" y2="30044"/>
+                        <a14:backgroundMark x1="15648" y1="30044" x2="22963" y2="23644"/>
+                        <a14:backgroundMark x1="22963" y1="23644" x2="6759" y2="27111"/>
+                        <a14:backgroundMark x1="6759" y1="27111" x2="17037" y2="25511"/>
+                        <a14:backgroundMark x1="17037" y1="25511" x2="19907" y2="17778"/>
+                        <a14:backgroundMark x1="19907" y1="17778" x2="11389" y2="27644"/>
+                        <a14:backgroundMark x1="11389" y1="27644" x2="23426" y2="22489"/>
+                        <a14:backgroundMark x1="23426" y1="22489" x2="25648" y2="12622"/>
+                        <a14:backgroundMark x1="25648" y1="12622" x2="16481" y2="11556"/>
+                        <a14:backgroundMark x1="16481" y1="11556" x2="9074" y2="20978"/>
+                        <a14:backgroundMark x1="9074" y1="20978" x2="15926" y2="25511"/>
+                        <a14:backgroundMark x1="15926" y1="25511" x2="29815" y2="17067"/>
+                        <a14:backgroundMark x1="29815" y1="17067" x2="18519" y2="14667"/>
+                        <a14:backgroundMark x1="18519" y1="14667" x2="12593" y2="29244"/>
+                        <a14:backgroundMark x1="12593" y1="29244" x2="25093" y2="30756"/>
+                        <a14:backgroundMark x1="25093" y1="30756" x2="36019" y2="18667"/>
+                        <a14:backgroundMark x1="36019" y1="18667" x2="24815" y2="19200"/>
+                        <a14:backgroundMark x1="24815" y1="19200" x2="8889" y2="37689"/>
+                        <a14:backgroundMark x1="8889" y1="37689" x2="22500" y2="39111"/>
+                        <a14:backgroundMark x1="22500" y1="39111" x2="41481" y2="26133"/>
+                        <a14:backgroundMark x1="41481" y1="26133" x2="13333" y2="38222"/>
+                        <a14:backgroundMark x1="13333" y1="38222" x2="22130" y2="45067"/>
+                        <a14:backgroundMark x1="22130" y1="45067" x2="37963" y2="36089"/>
+                        <a14:backgroundMark x1="37963" y1="36089" x2="26389" y2="34044"/>
+                        <a14:backgroundMark x1="26389" y1="34044" x2="17778" y2="46756"/>
+                        <a14:backgroundMark x1="17778" y1="46756" x2="37778" y2="46756"/>
+                        <a14:backgroundMark x1="37778" y1="46756" x2="49907" y2="34133"/>
+                        <a14:backgroundMark x1="49907" y1="34133" x2="30370" y2="37511"/>
+                        <a14:backgroundMark x1="30370" y1="37511" x2="28148" y2="51200"/>
+                        <a14:backgroundMark x1="28148" y1="51200" x2="61111" y2="45778"/>
+                        <a14:backgroundMark x1="61111" y1="45778" x2="46111" y2="46222"/>
+                        <a14:backgroundMark x1="46111" y1="46222" x2="34630" y2="57333"/>
+                        <a14:backgroundMark x1="34630" y1="57333" x2="60370" y2="50400"/>
+                        <a14:backgroundMark x1="60370" y1="50400" x2="32500" y2="58400"/>
+                        <a14:backgroundMark x1="32500" y1="58400" x2="50278" y2="52711"/>
+                        <a14:backgroundMark x1="50278" y1="52711" x2="34907" y2="52533"/>
+                        <a14:backgroundMark x1="34907" y1="52533" x2="23704" y2="64178"/>
+                        <a14:backgroundMark x1="23704" y1="64178" x2="48056" y2="62489"/>
+                        <a14:backgroundMark x1="48056" y1="62489" x2="52037" y2="55467"/>
+                        <a14:backgroundMark x1="52037" y1="55467" x2="38704" y2="58311"/>
+                        <a14:backgroundMark x1="38704" y1="58311" x2="49864" y2="62671"/>
+                        <a14:backgroundMark x1="50884" y1="63975" x2="39167" y2="67911"/>
+                        <a14:backgroundMark x1="39167" y1="67911" x2="49074" y2="64978"/>
+                        <a14:backgroundMark x1="49074" y1="64978" x2="40503" y2="69361"/>
+                        <a14:backgroundMark x1="41148" y1="69844" x2="47963" y2="69156"/>
+                        <a14:backgroundMark x1="41425" y1="71846" x2="38369" y2="73103"/>
+                        <a14:backgroundMark x1="45490" y1="70173" x2="42971" y2="71210"/>
+                        <a14:backgroundMark x1="46322" y1="69831" x2="45703" y2="70086"/>
+                        <a14:backgroundMark x1="47963" y1="69156" x2="46355" y2="69818"/>
+                        <a14:backgroundMark x1="27244" y1="73891" x2="29026" y2="73430"/>
+                        <a14:backgroundMark x1="29920" y1="72729" x2="23742" y2="73523"/>
+                        <a14:backgroundMark x1="16714" y1="82523" x2="14167" y2="83200"/>
+                        <a14:backgroundMark x1="27200" y1="79740" x2="26814" y2="79843"/>
+                        <a14:backgroundMark x1="14167" y1="83200" x2="15456" y2="83386"/>
+                        <a14:backgroundMark x1="29025" y1="84146" x2="31403" y2="82354"/>
+                        <a14:backgroundMark x1="29646" y1="87856" x2="30000" y2="88356"/>
+                        <a14:backgroundMark x1="51042" y1="76006" x2="51204" y2="75911"/>
+                        <a14:backgroundMark x1="48524" y1="77484" x2="50375" y2="76398"/>
+                        <a14:backgroundMark x1="30000" y1="88356" x2="30470" y2="88080"/>
+                        <a14:backgroundMark x1="49760" y1="75586" x2="48015" y2="75193"/>
+                        <a14:backgroundMark x1="51204" y1="75911" x2="50922" y2="75848"/>
+                        <a14:backgroundMark x1="38459" y1="77732" x2="36410" y2="79889"/>
+                        <a14:backgroundMark x1="43755" y1="82870" x2="47963" y2="82844"/>
+                        <a14:backgroundMark x1="47963" y1="82844" x2="49117" y2="81408"/>
+                        <a14:backgroundMark x1="54852" y1="73536" x2="49344" y2="73764"/>
+                        <a14:backgroundMark x1="44030" y1="72003" x2="49352" y2="64444"/>
+                        <a14:backgroundMark x1="49352" y1="64444" x2="33889" y2="66222"/>
+                        <a14:backgroundMark x1="33889" y1="66222" x2="33813" y2="69680"/>
+                        <a14:backgroundMark x1="46601" y1="70143" x2="48148" y2="69600"/>
+                        <a14:backgroundMark x1="45836" y1="70411" x2="46470" y2="70189"/>
+                        <a14:backgroundMark x1="43159" y1="71350" x2="45207" y2="70632"/>
+                        <a14:backgroundMark x1="38127" y1="73116" x2="41528" y2="71923"/>
+                        <a14:backgroundMark x1="50092" y1="61812" x2="50278" y2="61067"/>
+                        <a14:backgroundMark x1="49415" y1="64524" x2="49874" y2="62684"/>
+                        <a14:backgroundMark x1="48148" y1="69600" x2="49364" y2="64726"/>
+                        <a14:backgroundMark x1="50278" y1="61067" x2="39074" y2="67022"/>
+                        <a14:backgroundMark x1="51613" y1="61455" x2="53889" y2="60444"/>
+                        <a14:backgroundMark x1="39074" y1="67022" x2="49609" y2="62345"/>
+                        <a14:backgroundMark x1="53889" y1="60444" x2="43426" y2="56178"/>
+                        <a14:backgroundMark x1="43426" y1="56178" x2="29815" y2="69422"/>
+                        <a14:backgroundMark x1="39900" y1="68909" x2="45556" y2="68622"/>
+                        <a14:backgroundMark x1="29815" y1="69422" x2="34443" y2="69187"/>
+                        <a14:backgroundMark x1="45556" y1="68622" x2="49815" y2="55644"/>
+                        <a14:backgroundMark x1="49815" y1="55644" x2="19259" y2="60978"/>
+                        <a14:backgroundMark x1="19259" y1="60978" x2="33889" y2="69422"/>
+                        <a14:backgroundMark x1="37559" y1="67156" x2="56204" y2="55644"/>
+                        <a14:backgroundMark x1="36976" y1="67516" x2="37438" y2="67231"/>
+                        <a14:backgroundMark x1="33889" y1="69422" x2="35086" y2="68683"/>
+                        <a14:backgroundMark x1="56204" y1="55644" x2="45926" y2="49689"/>
+                        <a14:backgroundMark x1="45926" y1="49689" x2="42407" y2="55644"/>
+                      </a14:backgroundRemoval>
+                    </a14:imgEffect>
+                  </a14:imgLayer>
+                </a14:imgProps>
+              </a:ext>
+              <a:ext uri="{28A0092B-C50C-407E-A947-70E740481C1C}">
+                <a14:useLocalDpi xmlns:a14="http://schemas.microsoft.com/office/drawing/2010/main" val="0"/>
+              </a:ext>
+            </a:extLst>
+          </a:blip>
+          <a:srcRect/>
+          <a:stretch>
+            <a:fillRect/>
+          </a:stretch>
+        </p:blipFill>
+        <p:spPr bwMode="auto">
+          <a:xfrm>
+            <a:off x="948856" y="639546"/>
+            <a:ext cx="5823005" cy="6065923"/>
+          </a:xfrm>
+          <a:prstGeom prst="rect">
+            <a:avLst/>
+          </a:prstGeom>
+          <a:noFill/>
+          <a:extLst>
+            <a:ext uri="{909E8E84-426E-40DD-AFC4-6F175D3DCCD1}">
+              <a14:hiddenFill xmlns:a14="http://schemas.microsoft.com/office/drawing/2010/main">
+                <a:solidFill>
+                  <a:srgbClr val="FFFFFF"/>
+                </a:solidFill>
+              </a14:hiddenFill>
+            </a:ext>
+          </a:extLst>
+        </p:spPr>
+      </p:pic>
+      <p:pic>
+        <p:nvPicPr>
+          <p:cNvPr id="7" name="Imagen 6" descr="Imagen que contiene tabla, interior, persona, niño&#10;&#10;Descripción generada automáticamente">
+            <a:extLst>
+              <a:ext uri="{FF2B5EF4-FFF2-40B4-BE49-F238E27FC236}">
+                <a16:creationId xmlns:a16="http://schemas.microsoft.com/office/drawing/2014/main" id="{BDE39080-D91B-4287-91F9-2B3785D55FDA}"/>
+              </a:ext>
+            </a:extLst>
+          </p:cNvPr>
+          <p:cNvPicPr>
+            <a:picLocks noChangeAspect="1"/>
+          </p:cNvPicPr>
+          <p:nvPr/>
+        </p:nvPicPr>
+        <p:blipFill>
+          <a:blip r:embed="rId4">
+            <a:alphaModFix amt="86000"/>
+            <a:extLst>
+              <a:ext uri="{BEBA8EAE-BF5A-486C-A8C5-ECC9F3942E4B}">
+                <a14:imgProps xmlns:a14="http://schemas.microsoft.com/office/drawing/2010/main">
+                  <a14:imgLayer r:embed="rId5">
+                    <a14:imgEffect>
+                      <a14:backgroundRemoval t="7200" b="99360" l="4589" r="97514">
+                        <a14:foregroundMark x1="21989" y1="89120" x2="39006" y2="78720"/>
+                        <a14:foregroundMark x1="39006" y1="78720" x2="69407" y2="51040"/>
+                        <a14:foregroundMark x1="69407" y1="51040" x2="82027" y2="51520"/>
+                        <a14:foregroundMark x1="82027" y1="51520" x2="88719" y2="66720"/>
+                        <a14:foregroundMark x1="88719" y1="66720" x2="91969" y2="88320"/>
+                        <a14:foregroundMark x1="91969" y1="88320" x2="72275" y2="84320"/>
+                        <a14:foregroundMark x1="72275" y1="84320" x2="63480" y2="74400"/>
+                        <a14:foregroundMark x1="63480" y1="74400" x2="64436" y2="61280"/>
+                        <a14:foregroundMark x1="64436" y1="61280" x2="88719" y2="43680"/>
+                        <a14:foregroundMark x1="88719" y1="43680" x2="92543" y2="20000"/>
+                        <a14:foregroundMark x1="85794" y1="8486" x2="82218" y2="27040"/>
+                        <a14:foregroundMark x1="75526" y1="20960" x2="81644" y2="37760"/>
+                        <a14:foregroundMark x1="81644" y1="37760" x2="81644" y2="37760"/>
+                        <a14:foregroundMark x1="96750" y1="17920" x2="97323" y2="37440"/>
+                        <a14:foregroundMark x1="49904" y1="33600" x2="63671" y2="26080"/>
+                        <a14:foregroundMark x1="44551" y1="38400" x2="87572" y2="40480"/>
+                        <a14:foregroundMark x1="52390" y1="28800" x2="63480" y2="24480"/>
+                        <a14:foregroundMark x1="63480" y1="24480" x2="74570" y2="27840"/>
+                        <a14:foregroundMark x1="74570" y1="27840" x2="79732" y2="39680"/>
+                        <a14:foregroundMark x1="79732" y1="39680" x2="90057" y2="37120"/>
+                        <a14:foregroundMark x1="90057" y1="37120" x2="78967" y2="36320"/>
+                        <a14:foregroundMark x1="78967" y1="36320" x2="88528" y2="41920"/>
+                        <a14:foregroundMark x1="88528" y1="41920" x2="99044" y2="32960"/>
+                        <a14:foregroundMark x1="99044" y1="32960" x2="95985" y2="41280"/>
+                        <a14:foregroundMark x1="95985" y1="41280" x2="96176" y2="28320"/>
+                        <a14:foregroundMark x1="96176" y1="28320" x2="86042" y2="32160"/>
+                        <a14:foregroundMark x1="86042" y1="32160" x2="97323" y2="30080"/>
+                        <a14:foregroundMark x1="97323" y1="30080" x2="65583" y2="32800"/>
+                        <a14:foregroundMark x1="65583" y1="32800" x2="54111" y2="36800"/>
+                        <a14:foregroundMark x1="54111" y1="36800" x2="69216" y2="33600"/>
+                        <a14:foregroundMark x1="69216" y1="33600" x2="60038" y2="29440"/>
+                        <a14:foregroundMark x1="60038" y1="29440" x2="44359" y2="33280"/>
+                        <a14:foregroundMark x1="44359" y1="33280" x2="55832" y2="36800"/>
+                        <a14:foregroundMark x1="55832" y1="36800" x2="47801" y2="32480"/>
+                        <a14:foregroundMark x1="47801" y1="32480" x2="32314" y2="48960"/>
+                        <a14:foregroundMark x1="32314" y1="48960" x2="41300" y2="51520"/>
+                        <a14:foregroundMark x1="41300" y1="51520" x2="21606" y2="62880"/>
+                        <a14:foregroundMark x1="21606" y1="62880" x2="2868" y2="84960"/>
+                        <a14:foregroundMark x1="2868" y1="84960" x2="5927" y2="95360"/>
+                        <a14:foregroundMark x1="5927" y1="95360" x2="17400" y2="94400"/>
+                        <a14:foregroundMark x1="17400" y1="94400" x2="25430" y2="89920"/>
+                        <a14:foregroundMark x1="25430" y1="89920" x2="12237" y2="98400"/>
+                        <a14:foregroundMark x1="12237" y1="98400" x2="34608" y2="92800"/>
+                        <a14:foregroundMark x1="34608" y1="92800" x2="23327" y2="91200"/>
+                        <a14:foregroundMark x1="23327" y1="91200" x2="39388" y2="89440"/>
+                        <a14:foregroundMark x1="39388" y1="89440" x2="29446" y2="92800"/>
+                        <a14:foregroundMark x1="29446" y1="92800" x2="54876" y2="97120"/>
+                        <a14:foregroundMark x1="54876" y1="97120" x2="71128" y2="92000"/>
+                        <a14:foregroundMark x1="71128" y1="92000" x2="84895" y2="90880"/>
+                        <a14:foregroundMark x1="84895" y1="90880" x2="74761" y2="93600"/>
+                        <a14:foregroundMark x1="74761" y1="93600" x2="99809" y2="95520"/>
+                        <a14:foregroundMark x1="99809" y1="95520" x2="53728" y2="92640"/>
+                        <a14:foregroundMark x1="53728" y1="92640" x2="64054" y2="90240"/>
+                        <a14:foregroundMark x1="64054" y1="90240" x2="49331" y2="88960"/>
+                        <a14:foregroundMark x1="49331" y1="88960" x2="28107" y2="92960"/>
+                        <a14:foregroundMark x1="28107" y1="92960" x2="40727" y2="90720"/>
+                        <a14:foregroundMark x1="40727" y1="90720" x2="24665" y2="90720"/>
+                        <a14:foregroundMark x1="24665" y1="90720" x2="34990" y2="90720"/>
+                        <a14:foregroundMark x1="34990" y1="90720" x2="32505" y2="80480"/>
+                        <a14:foregroundMark x1="32505" y1="80480" x2="19694" y2="84960"/>
+                        <a14:foregroundMark x1="19694" y1="84960" x2="31166" y2="78080"/>
+                        <a14:foregroundMark x1="31166" y1="78080" x2="16826" y2="85280"/>
+                        <a14:foregroundMark x1="16826" y1="85280" x2="26960" y2="80800"/>
+                        <a14:foregroundMark x1="26960" y1="80800" x2="14532" y2="78880"/>
+                        <a14:foregroundMark x1="14532" y1="78880" x2="15105" y2="69600"/>
+                        <a14:foregroundMark x1="15105" y1="69600" x2="1912" y2="73280"/>
+                        <a14:foregroundMark x1="1912" y1="73280" x2="13002" y2="66400"/>
+                        <a14:foregroundMark x1="13002" y1="66400" x2="4971" y2="70400"/>
+                        <a14:foregroundMark x1="4971" y1="70400" x2="13958" y2="65120"/>
+                        <a14:foregroundMark x1="13958" y1="65120" x2="15488" y2="56000"/>
+                        <a14:foregroundMark x1="15488" y1="56000" x2="26769" y2="49280"/>
+                        <a14:foregroundMark x1="26769" y1="49280" x2="16635" y2="52320"/>
+                        <a14:foregroundMark x1="16635" y1="52320" x2="59273" y2="23200"/>
+                        <a14:foregroundMark x1="59273" y1="23200" x2="73805" y2="20480"/>
+                        <a14:foregroundMark x1="73805" y1="20480" x2="61568" y2="27200"/>
+                        <a14:foregroundMark x1="61568" y1="27200" x2="74187" y2="20960"/>
+                        <a14:foregroundMark x1="74187" y1="20960" x2="55258" y2="20960"/>
+                        <a14:foregroundMark x1="55258" y1="20960" x2="64245" y2="17920"/>
+                        <a14:foregroundMark x1="64245" y1="17920" x2="52581" y2="24000"/>
+                        <a14:foregroundMark x1="52581" y1="24000" x2="74570" y2="14400"/>
+                        <a14:foregroundMark x1="74570" y1="14400" x2="62141" y2="12320"/>
+                        <a14:foregroundMark x1="62141" y1="12320" x2="72289" y2="10456"/>
+                        <a14:foregroundMark x1="85936" y1="8299" x2="92161" y2="15040"/>
+                        <a14:foregroundMark x1="92161" y1="15040" x2="83556" y2="19840"/>
+                        <a14:foregroundMark x1="83556" y1="19840" x2="68260" y2="18720"/>
+                        <a14:foregroundMark x1="68260" y1="18720" x2="63480" y2="35200"/>
+                        <a14:foregroundMark x1="63480" y1="35200" x2="80880" y2="34240"/>
+                        <a14:foregroundMark x1="80880" y1="34240" x2="74379" y2="41280"/>
+                        <a14:foregroundMark x1="74379" y1="41280" x2="83365" y2="43520"/>
+                        <a14:foregroundMark x1="22180" y1="94880" x2="69598" y2="95040"/>
+                        <a14:foregroundMark x1="69598" y1="95040" x2="17973" y2="98400"/>
+                        <a14:foregroundMark x1="17973" y1="98400" x2="25813" y2="91360"/>
+                        <a14:foregroundMark x1="25813" y1="91360" x2="67686" y2="94880"/>
+                        <a14:foregroundMark x1="67686" y1="94880" x2="89484" y2="94240"/>
+                        <a14:foregroundMark x1="89484" y1="94240" x2="80115" y2="98400"/>
+                        <a14:foregroundMark x1="80115" y1="98400" x2="16826" y2="97600"/>
+                        <a14:foregroundMark x1="27151" y1="95360" x2="54493" y2="99360"/>
+                        <a14:foregroundMark x1="28872" y1="98080" x2="37285" y2="99040"/>
+                        <a14:foregroundMark x1="6501" y1="96960" x2="7839" y2="86720"/>
+                        <a14:foregroundMark x1="50287" y1="15360" x2="75717" y2="15360"/>
+                        <a14:foregroundMark x1="76864" y1="13120" x2="90822" y2="13120"/>
+                        <a14:foregroundMark x1="87189" y1="16960" x2="97514" y2="16160"/>
+                        <a14:foregroundMark x1="17973" y1="42080" x2="30784" y2="35680"/>
+                        <a14:foregroundMark x1="30784" y1="35680" x2="56405" y2="19040"/>
+                        <a14:foregroundMark x1="37667" y1="26560" x2="46845" y2="23360"/>
+                        <a14:foregroundMark x1="46845" y1="23360" x2="37285" y2="26240"/>
+                        <a14:foregroundMark x1="37285" y1="26240" x2="16444" y2="40480"/>
+                        <a14:foregroundMark x1="16444" y1="40480" x2="15105" y2="49440"/>
+                        <a14:foregroundMark x1="15105" y1="49440" x2="7457" y2="67200"/>
+                        <a14:foregroundMark x1="7457" y1="67200" x2="13193" y2="67040"/>
+                        <a14:backgroundMark x1="66730" y1="8160" x2="86042" y2="8160"/>
+                      </a14:backgroundRemoval>
+                    </a14:imgEffect>
+                  </a14:imgLayer>
+                </a14:imgProps>
+              </a:ext>
+              <a:ext uri="{28A0092B-C50C-407E-A947-70E740481C1C}">
+                <a14:useLocalDpi xmlns:a14="http://schemas.microsoft.com/office/drawing/2010/main" val="0"/>
+              </a:ext>
+            </a:extLst>
+          </a:blip>
+          <a:stretch>
+            <a:fillRect/>
+          </a:stretch>
+        </p:blipFill>
+        <p:spPr>
+          <a:xfrm>
+            <a:off x="5456371" y="629608"/>
+            <a:ext cx="5017485" cy="6052593"/>
+          </a:xfrm>
+          <a:prstGeom prst="rect">
+            <a:avLst/>
+          </a:prstGeom>
+        </p:spPr>
+      </p:pic>
+    </p:spTree>
+    <p:extLst>
+      <p:ext uri="{BB962C8B-B14F-4D97-AF65-F5344CB8AC3E}">
+        <p14:creationId xmlns:p14="http://schemas.microsoft.com/office/powerpoint/2010/main" val="3638447409"/>
+      </p:ext>
+    </p:extLst>
+  </p:cSld>
+  <p:clrMapOvr>
+    <a:masterClrMapping/>
+  </p:clrMapOvr>
+</p:sld>
+</file>
+
+<file path=ppt/slides/slide4.xml><?xml version="1.0" encoding="utf-8"?>
+<p:sld xmlns:a="http://schemas.openxmlformats.org/drawingml/2006/main" xmlns:r="http://schemas.openxmlformats.org/officeDocument/2006/relationships" xmlns:p="http://schemas.openxmlformats.org/presentationml/2006/main">
+  <p:cSld>
+    <p:spTree>
+      <p:nvGrpSpPr>
+        <p:cNvPr id="1" name=""/>
+        <p:cNvGrpSpPr/>
+        <p:nvPr/>
+      </p:nvGrpSpPr>
+      <p:grpSpPr>
+        <a:xfrm>
+          <a:off x="0" y="0"/>
+          <a:ext cx="0" cy="0"/>
+          <a:chOff x="0" y="0"/>
+          <a:chExt cx="0" cy="0"/>
+        </a:xfrm>
+      </p:grpSpPr>
+      <p:sp>
+        <p:nvSpPr>
+          <p:cNvPr id="4" name="Rectángulo 3">
+            <a:extLst>
+              <a:ext uri="{FF2B5EF4-FFF2-40B4-BE49-F238E27FC236}">
+                <a16:creationId xmlns:a16="http://schemas.microsoft.com/office/drawing/2014/main" id="{0BE3BBA1-E4A3-4140-A1D1-B32119101174}"/>
+              </a:ext>
+            </a:extLst>
+          </p:cNvPr>
+          <p:cNvSpPr/>
+          <p:nvPr/>
+        </p:nvSpPr>
+        <p:spPr>
+          <a:xfrm>
+            <a:off x="35663" y="0"/>
+            <a:ext cx="11397026" cy="6765166"/>
+          </a:xfrm>
+          <a:prstGeom prst="rect">
+            <a:avLst/>
+          </a:prstGeom>
+        </p:spPr>
+        <p:style>
+          <a:lnRef idx="2">
+            <a:schemeClr val="accent1">
+              <a:shade val="50000"/>
+            </a:schemeClr>
+          </a:lnRef>
+          <a:fillRef idx="1">
+            <a:schemeClr val="accent1"/>
+          </a:fillRef>
+          <a:effectRef idx="0">
+            <a:schemeClr val="accent1"/>
+          </a:effectRef>
+          <a:fontRef idx="minor">
+            <a:schemeClr val="lt1"/>
+          </a:fontRef>
+        </p:style>
+        <p:txBody>
+          <a:bodyPr rtlCol="0" anchor="ctr"/>
+          <a:lstStyle/>
+          <a:p>
+            <a:pPr algn="ctr"/>
+            <a:endParaRPr lang="es-CO"/>
+          </a:p>
+        </p:txBody>
+      </p:sp>
+      <p:sp>
+        <p:nvSpPr>
+          <p:cNvPr id="2" name="Título 1">
+            <a:extLst>
+              <a:ext uri="{FF2B5EF4-FFF2-40B4-BE49-F238E27FC236}">
+                <a16:creationId xmlns:a16="http://schemas.microsoft.com/office/drawing/2014/main" id="{4136ADBF-4626-4BA6-B006-77CB7B0C082E}"/>
+              </a:ext>
+            </a:extLst>
+          </p:cNvPr>
+          <p:cNvSpPr>
+            <a:spLocks noGrp="1"/>
+          </p:cNvSpPr>
+          <p:nvPr>
+            <p:ph type="ctrTitle"/>
+          </p:nvPr>
+        </p:nvSpPr>
+        <p:spPr>
+          <a:xfrm>
+            <a:off x="958736" y="2388034"/>
+            <a:ext cx="10274528" cy="1545338"/>
           </a:xfrm>
         </p:spPr>
         <p:txBody>
@@ -3561,7 +4166,7 @@
             <a:r>
               <a:rPr lang="es-MX" sz="9400" b="1" dirty="0">
                 <a:solidFill>
-                  <a:srgbClr val="FFC000"/>
+                  <a:srgbClr val="FF9E00"/>
                 </a:solidFill>
                 <a:latin typeface="Footlight MT Light" panose="0204060206030A020304" pitchFamily="18" charset="0"/>
               </a:rPr>
@@ -3570,7 +4175,7 @@
             <a:r>
               <a:rPr lang="es-MX" sz="9400" b="1" dirty="0" err="1">
                 <a:solidFill>
-                  <a:srgbClr val="FFC000"/>
+                  <a:srgbClr val="FF9E00"/>
                 </a:solidFill>
                 <a:latin typeface="Footlight MT Light" panose="0204060206030A020304" pitchFamily="18" charset="0"/>
               </a:rPr>
@@ -3579,7 +4184,7 @@
             <a:r>
               <a:rPr lang="es-MX" sz="9400" b="1" dirty="0">
                 <a:solidFill>
-                  <a:srgbClr val="FFC000"/>
+                  <a:srgbClr val="FF9E00"/>
                 </a:solidFill>
                 <a:latin typeface="Footlight MT Light" panose="0204060206030A020304" pitchFamily="18" charset="0"/>
               </a:rPr>
@@ -3625,13 +4230,13 @@
               </a:ext>
             </a:extLst>
           </a:blip>
-          <a:srcRect r="88419"/>
+          <a:srcRect l="182" t="-2961" r="835" b="-1532"/>
           <a:stretch/>
         </p:blipFill>
         <p:spPr>
           <a:xfrm>
-            <a:off x="9768114" y="184593"/>
-            <a:ext cx="1378857" cy="1743075"/>
+            <a:off x="35663" y="566634"/>
+            <a:ext cx="11785276" cy="1821400"/>
           </a:xfrm>
           <a:prstGeom prst="rect">
             <a:avLst/>
@@ -3678,6 +4283,439 @@
     <p:extLst>
       <p:ext uri="{BB962C8B-B14F-4D97-AF65-F5344CB8AC3E}">
         <p14:creationId xmlns:p14="http://schemas.microsoft.com/office/powerpoint/2010/main" val="3313954151"/>
+      </p:ext>
+    </p:extLst>
+  </p:cSld>
+  <p:clrMapOvr>
+    <a:masterClrMapping/>
+  </p:clrMapOvr>
+</p:sld>
+</file>
+
+<file path=ppt/slides/slide5.xml><?xml version="1.0" encoding="utf-8"?>
+<p:sld xmlns:a="http://schemas.openxmlformats.org/drawingml/2006/main" xmlns:r="http://schemas.openxmlformats.org/officeDocument/2006/relationships" xmlns:p="http://schemas.openxmlformats.org/presentationml/2006/main">
+  <p:cSld>
+    <p:spTree>
+      <p:nvGrpSpPr>
+        <p:cNvPr id="1" name=""/>
+        <p:cNvGrpSpPr/>
+        <p:nvPr/>
+      </p:nvGrpSpPr>
+      <p:grpSpPr>
+        <a:xfrm>
+          <a:off x="0" y="0"/>
+          <a:ext cx="0" cy="0"/>
+          <a:chOff x="0" y="0"/>
+          <a:chExt cx="0" cy="0"/>
+        </a:xfrm>
+      </p:grpSpPr>
+      <p:sp>
+        <p:nvSpPr>
+          <p:cNvPr id="15" name="Rectángulo 14">
+            <a:extLst>
+              <a:ext uri="{FF2B5EF4-FFF2-40B4-BE49-F238E27FC236}">
+                <a16:creationId xmlns:a16="http://schemas.microsoft.com/office/drawing/2014/main" id="{05D78DAA-466A-4AD5-BD79-6E90BC557609}"/>
+              </a:ext>
+            </a:extLst>
+          </p:cNvPr>
+          <p:cNvSpPr/>
+          <p:nvPr/>
+        </p:nvSpPr>
+        <p:spPr>
+          <a:xfrm>
+            <a:off x="172122" y="92834"/>
+            <a:ext cx="11397026" cy="6765166"/>
+          </a:xfrm>
+          <a:prstGeom prst="rect">
+            <a:avLst/>
+          </a:prstGeom>
+        </p:spPr>
+        <p:style>
+          <a:lnRef idx="2">
+            <a:schemeClr val="accent1">
+              <a:shade val="50000"/>
+            </a:schemeClr>
+          </a:lnRef>
+          <a:fillRef idx="1">
+            <a:schemeClr val="accent1"/>
+          </a:fillRef>
+          <a:effectRef idx="0">
+            <a:schemeClr val="accent1"/>
+          </a:effectRef>
+          <a:fontRef idx="minor">
+            <a:schemeClr val="lt1"/>
+          </a:fontRef>
+        </p:style>
+        <p:txBody>
+          <a:bodyPr rtlCol="0" anchor="ctr"/>
+          <a:lstStyle/>
+          <a:p>
+            <a:pPr algn="ctr"/>
+            <a:endParaRPr lang="es-CO"/>
+          </a:p>
+        </p:txBody>
+      </p:sp>
+      <p:sp>
+        <p:nvSpPr>
+          <p:cNvPr id="2" name="Título 1">
+            <a:extLst>
+              <a:ext uri="{FF2B5EF4-FFF2-40B4-BE49-F238E27FC236}">
+                <a16:creationId xmlns:a16="http://schemas.microsoft.com/office/drawing/2014/main" id="{C79EDEDE-9B4E-4311-868F-D96CC444A326}"/>
+              </a:ext>
+            </a:extLst>
+          </p:cNvPr>
+          <p:cNvSpPr>
+            <a:spLocks noGrp="1"/>
+          </p:cNvSpPr>
+          <p:nvPr>
+            <p:ph type="title"/>
+          </p:nvPr>
+        </p:nvSpPr>
+        <p:spPr/>
+        <p:txBody>
+          <a:bodyPr/>
+          <a:lstStyle/>
+          <a:p>
+            <a:endParaRPr lang="es-CO"/>
+          </a:p>
+        </p:txBody>
+      </p:sp>
+      <p:sp>
+        <p:nvSpPr>
+          <p:cNvPr id="7" name="Título 1">
+            <a:extLst>
+              <a:ext uri="{FF2B5EF4-FFF2-40B4-BE49-F238E27FC236}">
+                <a16:creationId xmlns:a16="http://schemas.microsoft.com/office/drawing/2014/main" id="{D1D632A5-9A2A-4269-A5AD-FA1C8C9C3E9D}"/>
+              </a:ext>
+            </a:extLst>
+          </p:cNvPr>
+          <p:cNvSpPr txBox="1">
+            <a:spLocks/>
+          </p:cNvSpPr>
+          <p:nvPr/>
+        </p:nvSpPr>
+        <p:spPr>
+          <a:xfrm>
+            <a:off x="1590554" y="2031804"/>
+            <a:ext cx="4956402" cy="1743074"/>
+          </a:xfrm>
+          <a:prstGeom prst="rect">
+            <a:avLst/>
+          </a:prstGeom>
+          <a:noFill/>
+        </p:spPr>
+        <p:txBody>
+          <a:bodyPr vert="horz" lIns="91440" tIns="45720" rIns="91440" bIns="45720" rtlCol="0" anchor="b">
+            <a:normAutofit fontScale="92500" lnSpcReduction="10000"/>
+          </a:bodyPr>
+          <a:lstStyle>
+            <a:lvl1pPr algn="ctr" defTabSz="914400" rtl="0" eaLnBrk="1" latinLnBrk="0" hangingPunct="1">
+              <a:lnSpc>
+                <a:spcPct val="90000"/>
+              </a:lnSpc>
+              <a:spcBef>
+                <a:spcPct val="0"/>
+              </a:spcBef>
+              <a:buNone/>
+              <a:defRPr sz="6000" kern="1200">
+                <a:solidFill>
+                  <a:schemeClr val="tx1"/>
+                </a:solidFill>
+                <a:latin typeface="+mj-lt"/>
+                <a:ea typeface="+mj-ea"/>
+                <a:cs typeface="+mj-cs"/>
+              </a:defRPr>
+            </a:lvl1pPr>
+          </a:lstStyle>
+          <a:p>
+            <a:r>
+              <a:rPr lang="es-MX" sz="6600" b="1" dirty="0">
+                <a:solidFill>
+                  <a:srgbClr val="FF9E00"/>
+                </a:solidFill>
+                <a:latin typeface="Footlight MT Light" panose="0204060206030A020304" pitchFamily="18" charset="0"/>
+              </a:rPr>
+              <a:t>Sales </a:t>
+            </a:r>
+            <a:r>
+              <a:rPr lang="es-MX" sz="6600" b="1" dirty="0" err="1">
+                <a:solidFill>
+                  <a:srgbClr val="FF9E00"/>
+                </a:solidFill>
+                <a:latin typeface="Footlight MT Light" panose="0204060206030A020304" pitchFamily="18" charset="0"/>
+              </a:rPr>
+              <a:t>System</a:t>
+            </a:r>
+            <a:r>
+              <a:rPr lang="es-MX" sz="6600" b="1" dirty="0">
+                <a:solidFill>
+                  <a:srgbClr val="FF9E00"/>
+                </a:solidFill>
+                <a:latin typeface="Footlight MT Light" panose="0204060206030A020304" pitchFamily="18" charset="0"/>
+              </a:rPr>
+              <a:t> </a:t>
+            </a:r>
+          </a:p>
+          <a:p>
+            <a:r>
+              <a:rPr lang="es-MX" sz="7200" b="1" dirty="0">
+                <a:latin typeface="Footlight MT Light" panose="0204060206030A020304" pitchFamily="18" charset="0"/>
+              </a:rPr>
+              <a:t>LIROZ</a:t>
+            </a:r>
+            <a:endParaRPr lang="es-CO" sz="7200" b="1" dirty="0">
+              <a:latin typeface="Footlight MT Light" panose="0204060206030A020304" pitchFamily="18" charset="0"/>
+            </a:endParaRPr>
+          </a:p>
+        </p:txBody>
+      </p:sp>
+      <p:pic>
+        <p:nvPicPr>
+          <p:cNvPr id="8" name="Marcador de contenido 4" descr="Imagen que contiene dibujo&#10;&#10;Descripción generada automáticamente">
+            <a:extLst>
+              <a:ext uri="{FF2B5EF4-FFF2-40B4-BE49-F238E27FC236}">
+                <a16:creationId xmlns:a16="http://schemas.microsoft.com/office/drawing/2014/main" id="{52D38ACC-A6FD-4E1E-907F-29CB11CAFCF8}"/>
+              </a:ext>
+            </a:extLst>
+          </p:cNvPr>
+          <p:cNvPicPr>
+            <a:picLocks noChangeAspect="1"/>
+          </p:cNvPicPr>
+          <p:nvPr/>
+        </p:nvPicPr>
+        <p:blipFill rotWithShape="1">
+          <a:blip r:embed="rId2">
+            <a:extLst>
+              <a:ext uri="{28A0092B-C50C-407E-A947-70E740481C1C}">
+                <a14:useLocalDpi xmlns:a14="http://schemas.microsoft.com/office/drawing/2010/main" val="0"/>
+              </a:ext>
+            </a:extLst>
+          </a:blip>
+          <a:srcRect r="1137"/>
+          <a:stretch/>
+        </p:blipFill>
+        <p:spPr>
+          <a:xfrm>
+            <a:off x="6551829" y="2066096"/>
+            <a:ext cx="4708383" cy="1743075"/>
+          </a:xfrm>
+          <a:prstGeom prst="rect">
+            <a:avLst/>
+          </a:prstGeom>
+        </p:spPr>
+      </p:pic>
+      <p:pic>
+        <p:nvPicPr>
+          <p:cNvPr id="5" name="Marcador de contenido 4" descr="Imagen que contiene dibujo&#10;&#10;Descripción generada automáticamente">
+            <a:extLst>
+              <a:ext uri="{FF2B5EF4-FFF2-40B4-BE49-F238E27FC236}">
+                <a16:creationId xmlns:a16="http://schemas.microsoft.com/office/drawing/2014/main" id="{EB56BF27-BE65-46BE-9BA4-EC26455EB552}"/>
+              </a:ext>
+            </a:extLst>
+          </p:cNvPr>
+          <p:cNvPicPr>
+            <a:picLocks noGrp="1" noChangeAspect="1"/>
+          </p:cNvPicPr>
+          <p:nvPr>
+            <p:ph idx="1"/>
+          </p:nvPr>
+        </p:nvPicPr>
+        <p:blipFill rotWithShape="1">
+          <a:blip r:embed="rId2">
+            <a:extLst>
+              <a:ext uri="{28A0092B-C50C-407E-A947-70E740481C1C}">
+                <a14:useLocalDpi xmlns:a14="http://schemas.microsoft.com/office/drawing/2010/main" val="0"/>
+              </a:ext>
+            </a:extLst>
+          </a:blip>
+          <a:srcRect r="71662"/>
+          <a:stretch/>
+        </p:blipFill>
+        <p:spPr>
+          <a:xfrm>
+            <a:off x="623078" y="1928686"/>
+            <a:ext cx="1349619" cy="1743075"/>
+          </a:xfrm>
+        </p:spPr>
+      </p:pic>
+      <p:pic>
+        <p:nvPicPr>
+          <p:cNvPr id="10" name="Imagen 9" descr="Imagen que contiene plato, dibujo&#10;&#10;Descripción generada automáticamente">
+            <a:extLst>
+              <a:ext uri="{FF2B5EF4-FFF2-40B4-BE49-F238E27FC236}">
+                <a16:creationId xmlns:a16="http://schemas.microsoft.com/office/drawing/2014/main" id="{935BB4A5-B5BC-4154-A5D0-5535A62B43A0}"/>
+              </a:ext>
+            </a:extLst>
+          </p:cNvPr>
+          <p:cNvPicPr>
+            <a:picLocks noChangeAspect="1"/>
+          </p:cNvPicPr>
+          <p:nvPr/>
+        </p:nvPicPr>
+        <p:blipFill>
+          <a:blip r:embed="rId3">
+            <a:extLst>
+              <a:ext uri="{28A0092B-C50C-407E-A947-70E740481C1C}">
+                <a14:useLocalDpi xmlns:a14="http://schemas.microsoft.com/office/drawing/2010/main" val="0"/>
+              </a:ext>
+            </a:extLst>
+          </a:blip>
+          <a:stretch>
+            <a:fillRect/>
+          </a:stretch>
+        </p:blipFill>
+        <p:spPr>
+          <a:xfrm>
+            <a:off x="6497712" y="4260534"/>
+            <a:ext cx="4762500" cy="1743075"/>
+          </a:xfrm>
+          <a:prstGeom prst="rect">
+            <a:avLst/>
+          </a:prstGeom>
+        </p:spPr>
+      </p:pic>
+      <p:sp>
+        <p:nvSpPr>
+          <p:cNvPr id="16" name="Título 1">
+            <a:extLst>
+              <a:ext uri="{FF2B5EF4-FFF2-40B4-BE49-F238E27FC236}">
+                <a16:creationId xmlns:a16="http://schemas.microsoft.com/office/drawing/2014/main" id="{9835548C-2695-4F29-A202-1495DFCDAF1C}"/>
+              </a:ext>
+            </a:extLst>
+          </p:cNvPr>
+          <p:cNvSpPr txBox="1">
+            <a:spLocks/>
+          </p:cNvSpPr>
+          <p:nvPr/>
+        </p:nvSpPr>
+        <p:spPr>
+          <a:xfrm>
+            <a:off x="931368" y="4250086"/>
+            <a:ext cx="5811393" cy="1598890"/>
+          </a:xfrm>
+          <a:prstGeom prst="rect">
+            <a:avLst/>
+          </a:prstGeom>
+        </p:spPr>
+        <p:txBody>
+          <a:bodyPr vert="horz" lIns="91440" tIns="45720" rIns="91440" bIns="45720" rtlCol="0" anchor="ctr">
+            <a:noAutofit/>
+          </a:bodyPr>
+          <a:lstStyle>
+            <a:lvl1pPr algn="l" defTabSz="914400" rtl="0" eaLnBrk="1" latinLnBrk="0" hangingPunct="1">
+              <a:lnSpc>
+                <a:spcPct val="90000"/>
+              </a:lnSpc>
+              <a:spcBef>
+                <a:spcPct val="0"/>
+              </a:spcBef>
+              <a:buNone/>
+              <a:defRPr sz="4400" kern="1200">
+                <a:solidFill>
+                  <a:schemeClr val="tx1"/>
+                </a:solidFill>
+                <a:latin typeface="+mj-lt"/>
+                <a:ea typeface="+mj-ea"/>
+                <a:cs typeface="+mj-cs"/>
+              </a:defRPr>
+            </a:lvl1pPr>
+          </a:lstStyle>
+          <a:p>
+            <a:pPr algn="ctr"/>
+            <a:r>
+              <a:rPr lang="es-MX" sz="6100" b="1" dirty="0">
+                <a:solidFill>
+                  <a:srgbClr val="FF9E00"/>
+                </a:solidFill>
+                <a:latin typeface="Footlight MT Light" panose="0204060206030A020304" pitchFamily="18" charset="0"/>
+              </a:rPr>
+              <a:t>Sales </a:t>
+            </a:r>
+            <a:r>
+              <a:rPr lang="es-MX" sz="6100" b="1" dirty="0" err="1">
+                <a:solidFill>
+                  <a:srgbClr val="FF9E00"/>
+                </a:solidFill>
+                <a:latin typeface="Footlight MT Light" panose="0204060206030A020304" pitchFamily="18" charset="0"/>
+              </a:rPr>
+              <a:t>System</a:t>
+            </a:r>
+            <a:endParaRPr lang="es-MX" sz="6100" b="1" dirty="0">
+              <a:solidFill>
+                <a:srgbClr val="FF9E00"/>
+              </a:solidFill>
+              <a:latin typeface="Footlight MT Light" panose="0204060206030A020304" pitchFamily="18" charset="0"/>
+            </a:endParaRPr>
+          </a:p>
+          <a:p>
+            <a:pPr algn="ctr"/>
+            <a:r>
+              <a:rPr lang="es-MX" sz="6100" b="1" dirty="0">
+                <a:solidFill>
+                  <a:srgbClr val="FFC000"/>
+                </a:solidFill>
+                <a:latin typeface="Footlight MT Light" panose="0204060206030A020304" pitchFamily="18" charset="0"/>
+              </a:rPr>
+              <a:t> </a:t>
+            </a:r>
+            <a:r>
+              <a:rPr lang="es-MX" sz="6700" b="1" dirty="0">
+                <a:solidFill>
+                  <a:schemeClr val="bg1"/>
+                </a:solidFill>
+                <a:latin typeface="Footlight MT Light" panose="0204060206030A020304" pitchFamily="18" charset="0"/>
+              </a:rPr>
+              <a:t>LIROZ</a:t>
+            </a:r>
+            <a:endParaRPr lang="es-CO" sz="6700" b="1" dirty="0">
+              <a:solidFill>
+                <a:schemeClr val="bg1"/>
+              </a:solidFill>
+              <a:latin typeface="Footlight MT Light" panose="0204060206030A020304" pitchFamily="18" charset="0"/>
+            </a:endParaRPr>
+          </a:p>
+        </p:txBody>
+      </p:sp>
+      <p:pic>
+        <p:nvPicPr>
+          <p:cNvPr id="17" name="Imagen 16" descr="Imagen que contiene dibujo&#10;&#10;Descripción generada automáticamente">
+            <a:extLst>
+              <a:ext uri="{FF2B5EF4-FFF2-40B4-BE49-F238E27FC236}">
+                <a16:creationId xmlns:a16="http://schemas.microsoft.com/office/drawing/2014/main" id="{3423137C-D816-4DCB-8166-3E9C87F9F3BE}"/>
+              </a:ext>
+            </a:extLst>
+          </p:cNvPr>
+          <p:cNvPicPr>
+            <a:picLocks noChangeAspect="1"/>
+          </p:cNvPicPr>
+          <p:nvPr/>
+        </p:nvPicPr>
+        <p:blipFill>
+          <a:blip r:embed="rId4">
+            <a:extLst>
+              <a:ext uri="{28A0092B-C50C-407E-A947-70E740481C1C}">
+                <a14:useLocalDpi xmlns:a14="http://schemas.microsoft.com/office/drawing/2010/main" val="0"/>
+              </a:ext>
+            </a:extLst>
+          </a:blip>
+          <a:stretch>
+            <a:fillRect/>
+          </a:stretch>
+        </p:blipFill>
+        <p:spPr>
+          <a:xfrm>
+            <a:off x="622852" y="4279750"/>
+            <a:ext cx="1381318" cy="1743318"/>
+          </a:xfrm>
+          <a:prstGeom prst="rect">
+            <a:avLst/>
+          </a:prstGeom>
+        </p:spPr>
+      </p:pic>
+    </p:spTree>
+    <p:extLst>
+      <p:ext uri="{BB962C8B-B14F-4D97-AF65-F5344CB8AC3E}">
+        <p14:creationId xmlns:p14="http://schemas.microsoft.com/office/powerpoint/2010/main" val="2794390190"/>
       </p:ext>
     </p:extLst>
   </p:cSld>

</xml_diff>

<commit_message>
cambio de las imagenes, logo responsivo
</commit_message>
<xml_diff>
--- a/views/img/Presentación de iconos.pptx
+++ b/views/img/Presentación de iconos.pptx
@@ -10,6 +10,7 @@
     <p:sldId id="260" r:id="rId4"/>
     <p:sldId id="257" r:id="rId5"/>
     <p:sldId id="258" r:id="rId6"/>
+    <p:sldId id="261" r:id="rId7"/>
   </p:sldIdLst>
   <p:sldSz cx="12192000" cy="6858000"/>
   <p:notesSz cx="6858000" cy="9144000"/>
@@ -266,7 +267,7 @@
             <a:fld id="{32637B58-87C1-446D-BDA9-B06F4BCF7782}" type="datetimeFigureOut">
               <a:rPr lang="en-US" smtClean="0"/>
               <a:pPr/>
-              <a:t>9/11/2020</a:t>
+              <a:t>9/14/2020</a:t>
             </a:fld>
             <a:endParaRPr lang="en-US"/>
           </a:p>
@@ -468,7 +469,7 @@
             <a:fld id="{32637B58-87C1-446D-BDA9-B06F4BCF7782}" type="datetimeFigureOut">
               <a:rPr lang="en-US" smtClean="0"/>
               <a:pPr/>
-              <a:t>9/11/2020</a:t>
+              <a:t>9/14/2020</a:t>
             </a:fld>
             <a:endParaRPr lang="en-US"/>
           </a:p>
@@ -680,7 +681,7 @@
             <a:fld id="{32637B58-87C1-446D-BDA9-B06F4BCF7782}" type="datetimeFigureOut">
               <a:rPr lang="en-US" smtClean="0"/>
               <a:pPr/>
-              <a:t>9/11/2020</a:t>
+              <a:t>9/14/2020</a:t>
             </a:fld>
             <a:endParaRPr lang="en-US"/>
           </a:p>
@@ -882,7 +883,7 @@
             <a:fld id="{32637B58-87C1-446D-BDA9-B06F4BCF7782}" type="datetimeFigureOut">
               <a:rPr lang="en-US" smtClean="0"/>
               <a:pPr/>
-              <a:t>9/11/2020</a:t>
+              <a:t>9/14/2020</a:t>
             </a:fld>
             <a:endParaRPr lang="en-US"/>
           </a:p>
@@ -1160,7 +1161,7 @@
             <a:fld id="{32637B58-87C1-446D-BDA9-B06F4BCF7782}" type="datetimeFigureOut">
               <a:rPr lang="en-US" smtClean="0"/>
               <a:pPr/>
-              <a:t>9/11/2020</a:t>
+              <a:t>9/14/2020</a:t>
             </a:fld>
             <a:endParaRPr lang="en-US"/>
           </a:p>
@@ -1430,7 +1431,7 @@
             <a:fld id="{32637B58-87C1-446D-BDA9-B06F4BCF7782}" type="datetimeFigureOut">
               <a:rPr lang="en-US" smtClean="0"/>
               <a:pPr/>
-              <a:t>9/11/2020</a:t>
+              <a:t>9/14/2020</a:t>
             </a:fld>
             <a:endParaRPr lang="en-US"/>
           </a:p>
@@ -1847,7 +1848,7 @@
             <a:fld id="{32637B58-87C1-446D-BDA9-B06F4BCF7782}" type="datetimeFigureOut">
               <a:rPr lang="en-US" smtClean="0"/>
               <a:pPr/>
-              <a:t>9/11/2020</a:t>
+              <a:t>9/14/2020</a:t>
             </a:fld>
             <a:endParaRPr lang="en-US"/>
           </a:p>
@@ -1991,7 +1992,7 @@
             <a:fld id="{32637B58-87C1-446D-BDA9-B06F4BCF7782}" type="datetimeFigureOut">
               <a:rPr lang="en-US" smtClean="0"/>
               <a:pPr/>
-              <a:t>9/11/2020</a:t>
+              <a:t>9/14/2020</a:t>
             </a:fld>
             <a:endParaRPr lang="en-US"/>
           </a:p>
@@ -2106,7 +2107,7 @@
             <a:fld id="{32637B58-87C1-446D-BDA9-B06F4BCF7782}" type="datetimeFigureOut">
               <a:rPr lang="en-US" smtClean="0"/>
               <a:pPr/>
-              <a:t>9/11/2020</a:t>
+              <a:t>9/14/2020</a:t>
             </a:fld>
             <a:endParaRPr lang="en-US"/>
           </a:p>
@@ -2421,7 +2422,7 @@
             <a:fld id="{32637B58-87C1-446D-BDA9-B06F4BCF7782}" type="datetimeFigureOut">
               <a:rPr lang="en-US" smtClean="0"/>
               <a:pPr/>
-              <a:t>9/11/2020</a:t>
+              <a:t>9/14/2020</a:t>
             </a:fld>
             <a:endParaRPr lang="en-US"/>
           </a:p>
@@ -2712,7 +2713,7 @@
             <a:fld id="{32637B58-87C1-446D-BDA9-B06F4BCF7782}" type="datetimeFigureOut">
               <a:rPr lang="en-US" smtClean="0"/>
               <a:pPr/>
-              <a:t>9/11/2020</a:t>
+              <a:t>9/14/2020</a:t>
             </a:fld>
             <a:endParaRPr lang="en-US"/>
           </a:p>
@@ -2957,7 +2958,7 @@
             <a:fld id="{32637B58-87C1-446D-BDA9-B06F4BCF7782}" type="datetimeFigureOut">
               <a:rPr lang="en-US" smtClean="0"/>
               <a:pPr/>
-              <a:t>9/11/2020</a:t>
+              <a:t>9/14/2020</a:t>
             </a:fld>
             <a:endParaRPr lang="en-US"/>
           </a:p>
@@ -4725,6 +4726,83 @@
 </p:sld>
 </file>
 
+<file path=ppt/slides/slide6.xml><?xml version="1.0" encoding="utf-8"?>
+<p:sld xmlns:a="http://schemas.openxmlformats.org/drawingml/2006/main" xmlns:r="http://schemas.openxmlformats.org/officeDocument/2006/relationships" xmlns:p="http://schemas.openxmlformats.org/presentationml/2006/main">
+  <p:cSld>
+    <p:spTree>
+      <p:nvGrpSpPr>
+        <p:cNvPr id="1" name=""/>
+        <p:cNvGrpSpPr/>
+        <p:nvPr/>
+      </p:nvGrpSpPr>
+      <p:grpSpPr>
+        <a:xfrm>
+          <a:off x="0" y="0"/>
+          <a:ext cx="0" cy="0"/>
+          <a:chOff x="0" y="0"/>
+          <a:chExt cx="0" cy="0"/>
+        </a:xfrm>
+      </p:grpSpPr>
+      <p:pic>
+        <p:nvPicPr>
+          <p:cNvPr id="5" name="Picture 2">
+            <a:extLst>
+              <a:ext uri="{FF2B5EF4-FFF2-40B4-BE49-F238E27FC236}">
+                <a16:creationId xmlns:a16="http://schemas.microsoft.com/office/drawing/2014/main" id="{5E1AC909-2BF0-4921-AB92-CCFE5935F993}"/>
+              </a:ext>
+            </a:extLst>
+          </p:cNvPr>
+          <p:cNvPicPr>
+            <a:picLocks noChangeAspect="1" noChangeArrowheads="1"/>
+          </p:cNvPicPr>
+          <p:nvPr/>
+        </p:nvPicPr>
+        <p:blipFill>
+          <a:blip r:embed="rId2">
+            <a:extLst>
+              <a:ext uri="{28A0092B-C50C-407E-A947-70E740481C1C}">
+                <a14:useLocalDpi xmlns:a14="http://schemas.microsoft.com/office/drawing/2010/main" val="0"/>
+              </a:ext>
+            </a:extLst>
+          </a:blip>
+          <a:srcRect/>
+          <a:stretch>
+            <a:fillRect/>
+          </a:stretch>
+        </p:blipFill>
+        <p:spPr bwMode="auto">
+          <a:xfrm>
+            <a:off x="1147763" y="438150"/>
+            <a:ext cx="9896475" cy="5981700"/>
+          </a:xfrm>
+          <a:prstGeom prst="rect">
+            <a:avLst/>
+          </a:prstGeom>
+          <a:noFill/>
+          <a:extLst>
+            <a:ext uri="{909E8E84-426E-40DD-AFC4-6F175D3DCCD1}">
+              <a14:hiddenFill xmlns:a14="http://schemas.microsoft.com/office/drawing/2010/main">
+                <a:solidFill>
+                  <a:srgbClr val="FFFFFF"/>
+                </a:solidFill>
+              </a14:hiddenFill>
+            </a:ext>
+          </a:extLst>
+        </p:spPr>
+      </p:pic>
+    </p:spTree>
+    <p:extLst>
+      <p:ext uri="{BB962C8B-B14F-4D97-AF65-F5344CB8AC3E}">
+        <p14:creationId xmlns:p14="http://schemas.microsoft.com/office/powerpoint/2010/main" val="1897687695"/>
+      </p:ext>
+    </p:extLst>
+  </p:cSld>
+  <p:clrMapOvr>
+    <a:masterClrMapping/>
+  </p:clrMapOvr>
+</p:sld>
+</file>
+
 <file path=ppt/theme/theme1.xml><?xml version="1.0" encoding="utf-8"?>
 <a:theme xmlns:a="http://schemas.openxmlformats.org/drawingml/2006/main" name="Tema de Office">
   <a:themeElements>

</xml_diff>

<commit_message>
Exportacion de la BD.
</commit_message>
<xml_diff>
--- a/views/img/Presentación de iconos.pptx
+++ b/views/img/Presentación de iconos.pptx
@@ -10,7 +10,8 @@
     <p:sldId id="260" r:id="rId4"/>
     <p:sldId id="257" r:id="rId5"/>
     <p:sldId id="258" r:id="rId6"/>
-    <p:sldId id="261" r:id="rId7"/>
+    <p:sldId id="262" r:id="rId7"/>
+    <p:sldId id="261" r:id="rId8"/>
   </p:sldIdLst>
   <p:sldSz cx="12192000" cy="6858000"/>
   <p:notesSz cx="6858000" cy="9144000"/>
@@ -267,7 +268,7 @@
             <a:fld id="{32637B58-87C1-446D-BDA9-B06F4BCF7782}" type="datetimeFigureOut">
               <a:rPr lang="en-US" smtClean="0"/>
               <a:pPr/>
-              <a:t>9/14/2020</a:t>
+              <a:t>10/20/2020</a:t>
             </a:fld>
             <a:endParaRPr lang="en-US"/>
           </a:p>
@@ -469,7 +470,7 @@
             <a:fld id="{32637B58-87C1-446D-BDA9-B06F4BCF7782}" type="datetimeFigureOut">
               <a:rPr lang="en-US" smtClean="0"/>
               <a:pPr/>
-              <a:t>9/14/2020</a:t>
+              <a:t>10/20/2020</a:t>
             </a:fld>
             <a:endParaRPr lang="en-US"/>
           </a:p>
@@ -681,7 +682,7 @@
             <a:fld id="{32637B58-87C1-446D-BDA9-B06F4BCF7782}" type="datetimeFigureOut">
               <a:rPr lang="en-US" smtClean="0"/>
               <a:pPr/>
-              <a:t>9/14/2020</a:t>
+              <a:t>10/20/2020</a:t>
             </a:fld>
             <a:endParaRPr lang="en-US"/>
           </a:p>
@@ -883,7 +884,7 @@
             <a:fld id="{32637B58-87C1-446D-BDA9-B06F4BCF7782}" type="datetimeFigureOut">
               <a:rPr lang="en-US" smtClean="0"/>
               <a:pPr/>
-              <a:t>9/14/2020</a:t>
+              <a:t>10/20/2020</a:t>
             </a:fld>
             <a:endParaRPr lang="en-US"/>
           </a:p>
@@ -1161,7 +1162,7 @@
             <a:fld id="{32637B58-87C1-446D-BDA9-B06F4BCF7782}" type="datetimeFigureOut">
               <a:rPr lang="en-US" smtClean="0"/>
               <a:pPr/>
-              <a:t>9/14/2020</a:t>
+              <a:t>10/20/2020</a:t>
             </a:fld>
             <a:endParaRPr lang="en-US"/>
           </a:p>
@@ -1431,7 +1432,7 @@
             <a:fld id="{32637B58-87C1-446D-BDA9-B06F4BCF7782}" type="datetimeFigureOut">
               <a:rPr lang="en-US" smtClean="0"/>
               <a:pPr/>
-              <a:t>9/14/2020</a:t>
+              <a:t>10/20/2020</a:t>
             </a:fld>
             <a:endParaRPr lang="en-US"/>
           </a:p>
@@ -1848,7 +1849,7 @@
             <a:fld id="{32637B58-87C1-446D-BDA9-B06F4BCF7782}" type="datetimeFigureOut">
               <a:rPr lang="en-US" smtClean="0"/>
               <a:pPr/>
-              <a:t>9/14/2020</a:t>
+              <a:t>10/20/2020</a:t>
             </a:fld>
             <a:endParaRPr lang="en-US"/>
           </a:p>
@@ -1992,7 +1993,7 @@
             <a:fld id="{32637B58-87C1-446D-BDA9-B06F4BCF7782}" type="datetimeFigureOut">
               <a:rPr lang="en-US" smtClean="0"/>
               <a:pPr/>
-              <a:t>9/14/2020</a:t>
+              <a:t>10/20/2020</a:t>
             </a:fld>
             <a:endParaRPr lang="en-US"/>
           </a:p>
@@ -2107,7 +2108,7 @@
             <a:fld id="{32637B58-87C1-446D-BDA9-B06F4BCF7782}" type="datetimeFigureOut">
               <a:rPr lang="en-US" smtClean="0"/>
               <a:pPr/>
-              <a:t>9/14/2020</a:t>
+              <a:t>10/20/2020</a:t>
             </a:fld>
             <a:endParaRPr lang="en-US"/>
           </a:p>
@@ -2422,7 +2423,7 @@
             <a:fld id="{32637B58-87C1-446D-BDA9-B06F4BCF7782}" type="datetimeFigureOut">
               <a:rPr lang="en-US" smtClean="0"/>
               <a:pPr/>
-              <a:t>9/14/2020</a:t>
+              <a:t>10/20/2020</a:t>
             </a:fld>
             <a:endParaRPr lang="en-US"/>
           </a:p>
@@ -2713,7 +2714,7 @@
             <a:fld id="{32637B58-87C1-446D-BDA9-B06F4BCF7782}" type="datetimeFigureOut">
               <a:rPr lang="en-US" smtClean="0"/>
               <a:pPr/>
-              <a:t>9/14/2020</a:t>
+              <a:t>10/20/2020</a:t>
             </a:fld>
             <a:endParaRPr lang="en-US"/>
           </a:p>
@@ -2958,7 +2959,7 @@
             <a:fld id="{32637B58-87C1-446D-BDA9-B06F4BCF7782}" type="datetimeFigureOut">
               <a:rPr lang="en-US" smtClean="0"/>
               <a:pPr/>
-              <a:t>9/14/2020</a:t>
+              <a:t>10/20/2020</a:t>
             </a:fld>
             <a:endParaRPr lang="en-US"/>
           </a:p>
@@ -4377,6 +4378,569 @@
           <a:bodyPr/>
           <a:lstStyle/>
           <a:p>
+            <a:endParaRPr lang="es-CO" dirty="0"/>
+          </a:p>
+        </p:txBody>
+      </p:sp>
+      <p:pic>
+        <p:nvPicPr>
+          <p:cNvPr id="8" name="Marcador de contenido 4" descr="Imagen que contiene dibujo&#10;&#10;Descripción generada automáticamente">
+            <a:extLst>
+              <a:ext uri="{FF2B5EF4-FFF2-40B4-BE49-F238E27FC236}">
+                <a16:creationId xmlns:a16="http://schemas.microsoft.com/office/drawing/2014/main" id="{52D38ACC-A6FD-4E1E-907F-29CB11CAFCF8}"/>
+              </a:ext>
+            </a:extLst>
+          </p:cNvPr>
+          <p:cNvPicPr>
+            <a:picLocks noChangeAspect="1"/>
+          </p:cNvPicPr>
+          <p:nvPr/>
+        </p:nvPicPr>
+        <p:blipFill rotWithShape="1">
+          <a:blip r:embed="rId2">
+            <a:extLst>
+              <a:ext uri="{28A0092B-C50C-407E-A947-70E740481C1C}">
+                <a14:useLocalDpi xmlns:a14="http://schemas.microsoft.com/office/drawing/2010/main" val="0"/>
+              </a:ext>
+            </a:extLst>
+          </a:blip>
+          <a:srcRect r="1137"/>
+          <a:stretch/>
+        </p:blipFill>
+        <p:spPr>
+          <a:xfrm>
+            <a:off x="6551829" y="2066096"/>
+            <a:ext cx="4708383" cy="1743075"/>
+          </a:xfrm>
+          <a:prstGeom prst="rect">
+            <a:avLst/>
+          </a:prstGeom>
+          <a:ln>
+            <a:solidFill>
+              <a:schemeClr val="tx1"/>
+            </a:solidFill>
+          </a:ln>
+        </p:spPr>
+      </p:pic>
+      <p:pic>
+        <p:nvPicPr>
+          <p:cNvPr id="10" name="Imagen 9" descr="Imagen que contiene plato, dibujo&#10;&#10;Descripción generada automáticamente">
+            <a:extLst>
+              <a:ext uri="{FF2B5EF4-FFF2-40B4-BE49-F238E27FC236}">
+                <a16:creationId xmlns:a16="http://schemas.microsoft.com/office/drawing/2014/main" id="{935BB4A5-B5BC-4154-A5D0-5535A62B43A0}"/>
+              </a:ext>
+            </a:extLst>
+          </p:cNvPr>
+          <p:cNvPicPr>
+            <a:picLocks noChangeAspect="1"/>
+          </p:cNvPicPr>
+          <p:nvPr/>
+        </p:nvPicPr>
+        <p:blipFill>
+          <a:blip r:embed="rId3">
+            <a:extLst>
+              <a:ext uri="{28A0092B-C50C-407E-A947-70E740481C1C}">
+                <a14:useLocalDpi xmlns:a14="http://schemas.microsoft.com/office/drawing/2010/main" val="0"/>
+              </a:ext>
+            </a:extLst>
+          </a:blip>
+          <a:stretch>
+            <a:fillRect/>
+          </a:stretch>
+        </p:blipFill>
+        <p:spPr>
+          <a:xfrm>
+            <a:off x="6497712" y="4260534"/>
+            <a:ext cx="4762500" cy="1743075"/>
+          </a:xfrm>
+          <a:prstGeom prst="rect">
+            <a:avLst/>
+          </a:prstGeom>
+        </p:spPr>
+      </p:pic>
+      <p:sp>
+        <p:nvSpPr>
+          <p:cNvPr id="16" name="Título 1">
+            <a:extLst>
+              <a:ext uri="{FF2B5EF4-FFF2-40B4-BE49-F238E27FC236}">
+                <a16:creationId xmlns:a16="http://schemas.microsoft.com/office/drawing/2014/main" id="{9835548C-2695-4F29-A202-1495DFCDAF1C}"/>
+              </a:ext>
+            </a:extLst>
+          </p:cNvPr>
+          <p:cNvSpPr txBox="1">
+            <a:spLocks/>
+          </p:cNvSpPr>
+          <p:nvPr/>
+        </p:nvSpPr>
+        <p:spPr>
+          <a:xfrm>
+            <a:off x="931368" y="4250086"/>
+            <a:ext cx="5811393" cy="1598890"/>
+          </a:xfrm>
+          <a:prstGeom prst="rect">
+            <a:avLst/>
+          </a:prstGeom>
+        </p:spPr>
+        <p:txBody>
+          <a:bodyPr vert="horz" lIns="91440" tIns="45720" rIns="91440" bIns="45720" rtlCol="0" anchor="ctr">
+            <a:noAutofit/>
+          </a:bodyPr>
+          <a:lstStyle>
+            <a:lvl1pPr algn="l" defTabSz="914400" rtl="0" eaLnBrk="1" latinLnBrk="0" hangingPunct="1">
+              <a:lnSpc>
+                <a:spcPct val="90000"/>
+              </a:lnSpc>
+              <a:spcBef>
+                <a:spcPct val="0"/>
+              </a:spcBef>
+              <a:buNone/>
+              <a:defRPr sz="4400" kern="1200">
+                <a:solidFill>
+                  <a:schemeClr val="tx1"/>
+                </a:solidFill>
+                <a:latin typeface="+mj-lt"/>
+                <a:ea typeface="+mj-ea"/>
+                <a:cs typeface="+mj-cs"/>
+              </a:defRPr>
+            </a:lvl1pPr>
+          </a:lstStyle>
+          <a:p>
+            <a:pPr algn="ctr"/>
+            <a:r>
+              <a:rPr lang="es-MX" sz="6100" b="1" dirty="0">
+                <a:solidFill>
+                  <a:srgbClr val="FF9E00"/>
+                </a:solidFill>
+                <a:latin typeface="Footlight MT Light" panose="0204060206030A020304" pitchFamily="18" charset="0"/>
+              </a:rPr>
+              <a:t>Sales </a:t>
+            </a:r>
+            <a:r>
+              <a:rPr lang="es-MX" sz="6100" b="1" dirty="0" err="1">
+                <a:solidFill>
+                  <a:srgbClr val="FF9E00"/>
+                </a:solidFill>
+                <a:latin typeface="Footlight MT Light" panose="0204060206030A020304" pitchFamily="18" charset="0"/>
+              </a:rPr>
+              <a:t>System</a:t>
+            </a:r>
+            <a:endParaRPr lang="es-MX" sz="6100" b="1" dirty="0">
+              <a:solidFill>
+                <a:srgbClr val="FF9E00"/>
+              </a:solidFill>
+              <a:latin typeface="Footlight MT Light" panose="0204060206030A020304" pitchFamily="18" charset="0"/>
+            </a:endParaRPr>
+          </a:p>
+          <a:p>
+            <a:pPr algn="ctr"/>
+            <a:r>
+              <a:rPr lang="es-MX" sz="6100" b="1" dirty="0">
+                <a:solidFill>
+                  <a:srgbClr val="FFC000"/>
+                </a:solidFill>
+                <a:latin typeface="Footlight MT Light" panose="0204060206030A020304" pitchFamily="18" charset="0"/>
+              </a:rPr>
+              <a:t> </a:t>
+            </a:r>
+            <a:r>
+              <a:rPr lang="es-MX" sz="6700" b="1" dirty="0">
+                <a:solidFill>
+                  <a:schemeClr val="bg1"/>
+                </a:solidFill>
+                <a:latin typeface="Footlight MT Light" panose="0204060206030A020304" pitchFamily="18" charset="0"/>
+              </a:rPr>
+              <a:t>LIROZ</a:t>
+            </a:r>
+            <a:endParaRPr lang="es-CO" sz="6700" b="1" dirty="0">
+              <a:solidFill>
+                <a:schemeClr val="bg1"/>
+              </a:solidFill>
+              <a:latin typeface="Footlight MT Light" panose="0204060206030A020304" pitchFamily="18" charset="0"/>
+            </a:endParaRPr>
+          </a:p>
+        </p:txBody>
+      </p:sp>
+      <p:pic>
+        <p:nvPicPr>
+          <p:cNvPr id="17" name="Imagen 16" descr="Imagen que contiene dibujo&#10;&#10;Descripción generada automáticamente">
+            <a:extLst>
+              <a:ext uri="{FF2B5EF4-FFF2-40B4-BE49-F238E27FC236}">
+                <a16:creationId xmlns:a16="http://schemas.microsoft.com/office/drawing/2014/main" id="{3423137C-D816-4DCB-8166-3E9C87F9F3BE}"/>
+              </a:ext>
+            </a:extLst>
+          </p:cNvPr>
+          <p:cNvPicPr>
+            <a:picLocks noChangeAspect="1"/>
+          </p:cNvPicPr>
+          <p:nvPr/>
+        </p:nvPicPr>
+        <p:blipFill>
+          <a:blip r:embed="rId4">
+            <a:extLst>
+              <a:ext uri="{28A0092B-C50C-407E-A947-70E740481C1C}">
+                <a14:useLocalDpi xmlns:a14="http://schemas.microsoft.com/office/drawing/2010/main" val="0"/>
+              </a:ext>
+            </a:extLst>
+          </a:blip>
+          <a:stretch>
+            <a:fillRect/>
+          </a:stretch>
+        </p:blipFill>
+        <p:spPr>
+          <a:xfrm>
+            <a:off x="622852" y="4279750"/>
+            <a:ext cx="1381318" cy="1743318"/>
+          </a:xfrm>
+          <a:prstGeom prst="rect">
+            <a:avLst/>
+          </a:prstGeom>
+        </p:spPr>
+      </p:pic>
+      <p:grpSp>
+        <p:nvGrpSpPr>
+          <p:cNvPr id="18" name="Grupo 17">
+            <a:extLst>
+              <a:ext uri="{FF2B5EF4-FFF2-40B4-BE49-F238E27FC236}">
+                <a16:creationId xmlns:a16="http://schemas.microsoft.com/office/drawing/2014/main" id="{6D43A633-5988-41A8-856A-E37DBE435C2B}"/>
+              </a:ext>
+            </a:extLst>
+          </p:cNvPr>
+          <p:cNvGrpSpPr/>
+          <p:nvPr/>
+        </p:nvGrpSpPr>
+        <p:grpSpPr>
+          <a:xfrm>
+            <a:off x="931368" y="2243945"/>
+            <a:ext cx="5164632" cy="1387376"/>
+            <a:chOff x="931368" y="2243945"/>
+            <a:chExt cx="5164632" cy="1387376"/>
+          </a:xfrm>
+        </p:grpSpPr>
+        <p:sp>
+          <p:nvSpPr>
+            <p:cNvPr id="7" name="Título 1">
+              <a:extLst>
+                <a:ext uri="{FF2B5EF4-FFF2-40B4-BE49-F238E27FC236}">
+                  <a16:creationId xmlns:a16="http://schemas.microsoft.com/office/drawing/2014/main" id="{D1D632A5-9A2A-4269-A5AD-FA1C8C9C3E9D}"/>
+                </a:ext>
+              </a:extLst>
+            </p:cNvPr>
+            <p:cNvSpPr txBox="1">
+              <a:spLocks/>
+            </p:cNvSpPr>
+            <p:nvPr/>
+          </p:nvSpPr>
+          <p:spPr>
+            <a:xfrm>
+              <a:off x="2123295" y="2243945"/>
+              <a:ext cx="3972705" cy="1387376"/>
+            </a:xfrm>
+            <a:prstGeom prst="rect">
+              <a:avLst/>
+            </a:prstGeom>
+            <a:noFill/>
+            <a:ln>
+              <a:noFill/>
+            </a:ln>
+          </p:spPr>
+          <p:txBody>
+            <a:bodyPr vert="horz" lIns="91440" tIns="45720" rIns="91440" bIns="45720" rtlCol="0" anchor="b">
+              <a:normAutofit fontScale="85000" lnSpcReduction="20000"/>
+            </a:bodyPr>
+            <a:lstStyle>
+              <a:lvl1pPr algn="ctr" defTabSz="914400" rtl="0" eaLnBrk="1" latinLnBrk="0" hangingPunct="1">
+                <a:lnSpc>
+                  <a:spcPct val="90000"/>
+                </a:lnSpc>
+                <a:spcBef>
+                  <a:spcPct val="0"/>
+                </a:spcBef>
+                <a:buNone/>
+                <a:defRPr sz="6000" kern="1200">
+                  <a:solidFill>
+                    <a:schemeClr val="tx1"/>
+                  </a:solidFill>
+                  <a:latin typeface="+mj-lt"/>
+                  <a:ea typeface="+mj-ea"/>
+                  <a:cs typeface="+mj-cs"/>
+                </a:defRPr>
+              </a:lvl1pPr>
+            </a:lstStyle>
+            <a:p>
+              <a:r>
+                <a:rPr lang="es-MX" sz="6600" b="1" dirty="0">
+                  <a:solidFill>
+                    <a:srgbClr val="6A1A26"/>
+                  </a:solidFill>
+                  <a:latin typeface="Footlight MT Light" panose="0204060206030A020304" pitchFamily="18" charset="0"/>
+                </a:rPr>
+                <a:t>Sales </a:t>
+              </a:r>
+              <a:r>
+                <a:rPr lang="es-MX" sz="6600" b="1" dirty="0" err="1">
+                  <a:solidFill>
+                    <a:srgbClr val="6A1A26"/>
+                  </a:solidFill>
+                  <a:latin typeface="Footlight MT Light" panose="0204060206030A020304" pitchFamily="18" charset="0"/>
+                </a:rPr>
+                <a:t>System</a:t>
+              </a:r>
+              <a:r>
+                <a:rPr lang="es-MX" sz="6600" b="1" dirty="0">
+                  <a:solidFill>
+                    <a:srgbClr val="6A1A26"/>
+                  </a:solidFill>
+                  <a:latin typeface="Footlight MT Light" panose="0204060206030A020304" pitchFamily="18" charset="0"/>
+                </a:rPr>
+                <a:t> </a:t>
+              </a:r>
+            </a:p>
+            <a:p>
+              <a:r>
+                <a:rPr lang="es-MX" sz="6500" b="1" dirty="0">
+                  <a:latin typeface="Angsana New" panose="020B0502040204020203" pitchFamily="18" charset="-34"/>
+                  <a:cs typeface="Angsana New" panose="020B0502040204020203" pitchFamily="18" charset="-34"/>
+                </a:rPr>
+                <a:t>LIROZ</a:t>
+              </a:r>
+              <a:endParaRPr lang="es-CO" sz="6500" b="1" dirty="0">
+                <a:latin typeface="Angsana New" panose="020B0502040204020203" pitchFamily="18" charset="-34"/>
+                <a:cs typeface="Angsana New" panose="020B0502040204020203" pitchFamily="18" charset="-34"/>
+              </a:endParaRPr>
+            </a:p>
+          </p:txBody>
+        </p:sp>
+        <p:pic>
+          <p:nvPicPr>
+            <p:cNvPr id="1026" name="Picture 2" descr="Gift sign flat black icon in white circle Vector Image">
+              <a:extLst>
+                <a:ext uri="{FF2B5EF4-FFF2-40B4-BE49-F238E27FC236}">
+                  <a16:creationId xmlns:a16="http://schemas.microsoft.com/office/drawing/2014/main" id="{25A46A40-AFAF-4ECB-B7F3-CFE9FD2354BD}"/>
+                </a:ext>
+              </a:extLst>
+            </p:cNvPr>
+            <p:cNvPicPr>
+              <a:picLocks noChangeAspect="1" noChangeArrowheads="1"/>
+            </p:cNvPicPr>
+            <p:nvPr/>
+          </p:nvPicPr>
+          <p:blipFill rotWithShape="1">
+            <a:blip r:embed="rId5">
+              <a:extLst>
+                <a:ext uri="{BEBA8EAE-BF5A-486C-A8C5-ECC9F3942E4B}">
+                  <a14:imgProps xmlns:a14="http://schemas.microsoft.com/office/drawing/2010/main">
+                    <a14:imgLayer r:embed="rId6">
+                      <a14:imgEffect>
+                        <a14:backgroundRemoval t="10000" b="90000" l="10000" r="90900">
+                          <a14:foregroundMark x1="34300" y1="74259" x2="34300" y2="74259"/>
+                          <a14:foregroundMark x1="76500" y1="27407" x2="76500" y2="27407"/>
+                          <a14:foregroundMark x1="45900" y1="46852" x2="45900" y2="53333"/>
+                          <a14:foregroundMark x1="58800" y1="43889" x2="59000" y2="53056"/>
+                          <a14:foregroundMark x1="40300" y1="35278" x2="45700" y2="35278"/>
+                          <a14:foregroundMark x1="55100" y1="36019" x2="60400" y2="36019"/>
+                          <a14:backgroundMark x1="28000" y1="39722" x2="26700" y2="49444"/>
+                          <a14:backgroundMark x1="50000" y1="35648" x2="50000" y2="35648"/>
+                          <a14:backgroundMark x1="50000" y1="32778" x2="50000" y2="32778"/>
+                          <a14:backgroundMark x1="49900" y1="44722" x2="49900" y2="44722"/>
+                          <a14:backgroundMark x1="50000" y1="55833" x2="50000" y2="55833"/>
+                          <a14:backgroundMark x1="50000" y1="59444" x2="50000" y2="59444"/>
+                          <a14:backgroundMark x1="49600" y1="47500" x2="49600" y2="47500"/>
+                          <a14:backgroundMark x1="50000" y1="48889" x2="50000" y2="48889"/>
+                          <a14:backgroundMark x1="45300" y1="28056" x2="45300" y2="28056"/>
+                          <a14:backgroundMark x1="50200" y1="26944" x2="50200" y2="26944"/>
+                          <a14:backgroundMark x1="55400" y1="27870" x2="55400" y2="27870"/>
+                          <a14:backgroundMark x1="71800" y1="73519" x2="71800" y2="73519"/>
+                          <a14:backgroundMark x1="87900" y1="52037" x2="82700" y2="66667"/>
+                          <a14:backgroundMark x1="82700" y1="66667" x2="78300" y2="70370"/>
+                          <a14:backgroundMark x1="91500" y1="44907" x2="89400" y2="58889"/>
+                          <a14:backgroundMark x1="77700" y1="27130" x2="81100" y2="31296"/>
+                          <a14:backgroundMark x1="76900" y1="27130" x2="76900" y2="27130"/>
+                          <a14:backgroundMark x1="33200" y1="73981" x2="33200" y2="73981"/>
+                          <a14:backgroundMark x1="32000" y1="72870" x2="34000" y2="73611"/>
+                          <a14:backgroundMark x1="33800" y1="74259" x2="33800" y2="74259"/>
+                          <a14:backgroundMark x1="34400" y1="74352" x2="34400" y2="74352"/>
+                          <a14:backgroundMark x1="34000" y1="74259" x2="34000" y2="74259"/>
+                          <a14:backgroundMark x1="34200" y1="74444" x2="34200" y2="74444"/>
+                          <a14:backgroundMark x1="34300" y1="74537" x2="34300" y2="74537"/>
+                          <a14:backgroundMark x1="38600" y1="69444" x2="49300" y2="69444"/>
+                        </a14:backgroundRemoval>
+                      </a14:imgEffect>
+                    </a14:imgLayer>
+                  </a14:imgProps>
+                </a:ext>
+                <a:ext uri="{28A0092B-C50C-407E-A947-70E740481C1C}">
+                  <a14:useLocalDpi xmlns:a14="http://schemas.microsoft.com/office/drawing/2010/main" val="0"/>
+                </a:ext>
+              </a:extLst>
+            </a:blip>
+            <a:srcRect l="15452" t="14530" r="15517" b="21983"/>
+            <a:stretch/>
+          </p:blipFill>
+          <p:spPr bwMode="auto">
+            <a:xfrm>
+              <a:off x="931368" y="2259312"/>
+              <a:ext cx="1381318" cy="1372009"/>
+            </a:xfrm>
+            <a:prstGeom prst="rect">
+              <a:avLst/>
+            </a:prstGeom>
+            <a:noFill/>
+            <a:extLst>
+              <a:ext uri="{909E8E84-426E-40DD-AFC4-6F175D3DCCD1}">
+                <a14:hiddenFill xmlns:a14="http://schemas.microsoft.com/office/drawing/2010/main">
+                  <a:solidFill>
+                    <a:srgbClr val="FFFFFF"/>
+                  </a:solidFill>
+                </a14:hiddenFill>
+              </a:ext>
+            </a:extLst>
+          </p:spPr>
+        </p:pic>
+      </p:grpSp>
+      <p:pic>
+        <p:nvPicPr>
+          <p:cNvPr id="19" name="Picture 2">
+            <a:extLst>
+              <a:ext uri="{FF2B5EF4-FFF2-40B4-BE49-F238E27FC236}">
+                <a16:creationId xmlns:a16="http://schemas.microsoft.com/office/drawing/2014/main" id="{AE1938E8-5540-42F8-8A6D-DD07381A8F5E}"/>
+              </a:ext>
+            </a:extLst>
+          </p:cNvPr>
+          <p:cNvPicPr>
+            <a:picLocks noChangeAspect="1" noChangeArrowheads="1"/>
+          </p:cNvPicPr>
+          <p:nvPr/>
+        </p:nvPicPr>
+        <p:blipFill>
+          <a:blip r:embed="rId7">
+            <a:extLst>
+              <a:ext uri="{28A0092B-C50C-407E-A947-70E740481C1C}">
+                <a14:useLocalDpi xmlns:a14="http://schemas.microsoft.com/office/drawing/2010/main" val="0"/>
+              </a:ext>
+            </a:extLst>
+          </a:blip>
+          <a:srcRect/>
+          <a:stretch>
+            <a:fillRect/>
+          </a:stretch>
+        </p:blipFill>
+        <p:spPr bwMode="auto">
+          <a:xfrm>
+            <a:off x="1838422" y="3840630"/>
+            <a:ext cx="9896475" cy="5981700"/>
+          </a:xfrm>
+          <a:prstGeom prst="rect">
+            <a:avLst/>
+          </a:prstGeom>
+          <a:noFill/>
+          <a:extLst>
+            <a:ext uri="{909E8E84-426E-40DD-AFC4-6F175D3DCCD1}">
+              <a14:hiddenFill xmlns:a14="http://schemas.microsoft.com/office/drawing/2010/main">
+                <a:solidFill>
+                  <a:srgbClr val="FFFFFF"/>
+                </a:solidFill>
+              </a14:hiddenFill>
+            </a:ext>
+          </a:extLst>
+        </p:spPr>
+      </p:pic>
+    </p:spTree>
+    <p:extLst>
+      <p:ext uri="{BB962C8B-B14F-4D97-AF65-F5344CB8AC3E}">
+        <p14:creationId xmlns:p14="http://schemas.microsoft.com/office/powerpoint/2010/main" val="2794390190"/>
+      </p:ext>
+    </p:extLst>
+  </p:cSld>
+  <p:clrMapOvr>
+    <a:masterClrMapping/>
+  </p:clrMapOvr>
+</p:sld>
+</file>
+
+<file path=ppt/slides/slide6.xml><?xml version="1.0" encoding="utf-8"?>
+<p:sld xmlns:a="http://schemas.openxmlformats.org/drawingml/2006/main" xmlns:r="http://schemas.openxmlformats.org/officeDocument/2006/relationships" xmlns:p="http://schemas.openxmlformats.org/presentationml/2006/main">
+  <p:cSld>
+    <p:spTree>
+      <p:nvGrpSpPr>
+        <p:cNvPr id="1" name=""/>
+        <p:cNvGrpSpPr/>
+        <p:nvPr/>
+      </p:nvGrpSpPr>
+      <p:grpSpPr>
+        <a:xfrm>
+          <a:off x="0" y="0"/>
+          <a:ext cx="0" cy="0"/>
+          <a:chOff x="0" y="0"/>
+          <a:chExt cx="0" cy="0"/>
+        </a:xfrm>
+      </p:grpSpPr>
+      <p:sp>
+        <p:nvSpPr>
+          <p:cNvPr id="15" name="Rectángulo 14">
+            <a:extLst>
+              <a:ext uri="{FF2B5EF4-FFF2-40B4-BE49-F238E27FC236}">
+                <a16:creationId xmlns:a16="http://schemas.microsoft.com/office/drawing/2014/main" id="{05D78DAA-466A-4AD5-BD79-6E90BC557609}"/>
+              </a:ext>
+            </a:extLst>
+          </p:cNvPr>
+          <p:cNvSpPr/>
+          <p:nvPr/>
+        </p:nvSpPr>
+        <p:spPr>
+          <a:xfrm>
+            <a:off x="172122" y="92834"/>
+            <a:ext cx="11397026" cy="6765166"/>
+          </a:xfrm>
+          <a:prstGeom prst="rect">
+            <a:avLst/>
+          </a:prstGeom>
+        </p:spPr>
+        <p:style>
+          <a:lnRef idx="2">
+            <a:schemeClr val="accent1">
+              <a:shade val="50000"/>
+            </a:schemeClr>
+          </a:lnRef>
+          <a:fillRef idx="1">
+            <a:schemeClr val="accent1"/>
+          </a:fillRef>
+          <a:effectRef idx="0">
+            <a:schemeClr val="accent1"/>
+          </a:effectRef>
+          <a:fontRef idx="minor">
+            <a:schemeClr val="lt1"/>
+          </a:fontRef>
+        </p:style>
+        <p:txBody>
+          <a:bodyPr rtlCol="0" anchor="ctr"/>
+          <a:lstStyle/>
+          <a:p>
+            <a:pPr algn="ctr"/>
+            <a:endParaRPr lang="es-CO"/>
+          </a:p>
+        </p:txBody>
+      </p:sp>
+      <p:sp>
+        <p:nvSpPr>
+          <p:cNvPr id="2" name="Título 1">
+            <a:extLst>
+              <a:ext uri="{FF2B5EF4-FFF2-40B4-BE49-F238E27FC236}">
+                <a16:creationId xmlns:a16="http://schemas.microsoft.com/office/drawing/2014/main" id="{C79EDEDE-9B4E-4311-868F-D96CC444A326}"/>
+              </a:ext>
+            </a:extLst>
+          </p:cNvPr>
+          <p:cNvSpPr>
+            <a:spLocks noGrp="1"/>
+          </p:cNvSpPr>
+          <p:nvPr>
+            <p:ph type="title"/>
+          </p:nvPr>
+        </p:nvSpPr>
+        <p:spPr/>
+        <p:txBody>
+          <a:bodyPr/>
+          <a:lstStyle/>
+          <a:p>
             <a:endParaRPr lang="es-CO"/>
           </a:p>
         </p:txBody>
@@ -4716,7 +5280,7 @@
     </p:spTree>
     <p:extLst>
       <p:ext uri="{BB962C8B-B14F-4D97-AF65-F5344CB8AC3E}">
-        <p14:creationId xmlns:p14="http://schemas.microsoft.com/office/powerpoint/2010/main" val="2794390190"/>
+        <p14:creationId xmlns:p14="http://schemas.microsoft.com/office/powerpoint/2010/main" val="499370943"/>
       </p:ext>
     </p:extLst>
   </p:cSld>
@@ -4726,7 +5290,7 @@
 </p:sld>
 </file>
 
-<file path=ppt/slides/slide6.xml><?xml version="1.0" encoding="utf-8"?>
+<file path=ppt/slides/slide7.xml><?xml version="1.0" encoding="utf-8"?>
 <p:sld xmlns:a="http://schemas.openxmlformats.org/drawingml/2006/main" xmlns:r="http://schemas.openxmlformats.org/officeDocument/2006/relationships" xmlns:p="http://schemas.openxmlformats.org/presentationml/2006/main">
   <p:cSld>
     <p:spTree>

</xml_diff>

<commit_message>
Descargara reporte de ventas en formato .xls Excel.
</commit_message>
<xml_diff>
--- a/views/img/Presentación de iconos.pptx
+++ b/views/img/Presentación de iconos.pptx
@@ -268,7 +268,7 @@
             <a:fld id="{32637B58-87C1-446D-BDA9-B06F4BCF7782}" type="datetimeFigureOut">
               <a:rPr lang="en-US" smtClean="0"/>
               <a:pPr/>
-              <a:t>10/20/2020</a:t>
+              <a:t>10/23/2020</a:t>
             </a:fld>
             <a:endParaRPr lang="en-US"/>
           </a:p>
@@ -470,7 +470,7 @@
             <a:fld id="{32637B58-87C1-446D-BDA9-B06F4BCF7782}" type="datetimeFigureOut">
               <a:rPr lang="en-US" smtClean="0"/>
               <a:pPr/>
-              <a:t>10/20/2020</a:t>
+              <a:t>10/23/2020</a:t>
             </a:fld>
             <a:endParaRPr lang="en-US"/>
           </a:p>
@@ -682,7 +682,7 @@
             <a:fld id="{32637B58-87C1-446D-BDA9-B06F4BCF7782}" type="datetimeFigureOut">
               <a:rPr lang="en-US" smtClean="0"/>
               <a:pPr/>
-              <a:t>10/20/2020</a:t>
+              <a:t>10/23/2020</a:t>
             </a:fld>
             <a:endParaRPr lang="en-US"/>
           </a:p>
@@ -884,7 +884,7 @@
             <a:fld id="{32637B58-87C1-446D-BDA9-B06F4BCF7782}" type="datetimeFigureOut">
               <a:rPr lang="en-US" smtClean="0"/>
               <a:pPr/>
-              <a:t>10/20/2020</a:t>
+              <a:t>10/23/2020</a:t>
             </a:fld>
             <a:endParaRPr lang="en-US"/>
           </a:p>
@@ -1162,7 +1162,7 @@
             <a:fld id="{32637B58-87C1-446D-BDA9-B06F4BCF7782}" type="datetimeFigureOut">
               <a:rPr lang="en-US" smtClean="0"/>
               <a:pPr/>
-              <a:t>10/20/2020</a:t>
+              <a:t>10/23/2020</a:t>
             </a:fld>
             <a:endParaRPr lang="en-US"/>
           </a:p>
@@ -1432,7 +1432,7 @@
             <a:fld id="{32637B58-87C1-446D-BDA9-B06F4BCF7782}" type="datetimeFigureOut">
               <a:rPr lang="en-US" smtClean="0"/>
               <a:pPr/>
-              <a:t>10/20/2020</a:t>
+              <a:t>10/23/2020</a:t>
             </a:fld>
             <a:endParaRPr lang="en-US"/>
           </a:p>
@@ -1849,7 +1849,7 @@
             <a:fld id="{32637B58-87C1-446D-BDA9-B06F4BCF7782}" type="datetimeFigureOut">
               <a:rPr lang="en-US" smtClean="0"/>
               <a:pPr/>
-              <a:t>10/20/2020</a:t>
+              <a:t>10/23/2020</a:t>
             </a:fld>
             <a:endParaRPr lang="en-US"/>
           </a:p>
@@ -1993,7 +1993,7 @@
             <a:fld id="{32637B58-87C1-446D-BDA9-B06F4BCF7782}" type="datetimeFigureOut">
               <a:rPr lang="en-US" smtClean="0"/>
               <a:pPr/>
-              <a:t>10/20/2020</a:t>
+              <a:t>10/23/2020</a:t>
             </a:fld>
             <a:endParaRPr lang="en-US"/>
           </a:p>
@@ -2108,7 +2108,7 @@
             <a:fld id="{32637B58-87C1-446D-BDA9-B06F4BCF7782}" type="datetimeFigureOut">
               <a:rPr lang="en-US" smtClean="0"/>
               <a:pPr/>
-              <a:t>10/20/2020</a:t>
+              <a:t>10/23/2020</a:t>
             </a:fld>
             <a:endParaRPr lang="en-US"/>
           </a:p>
@@ -2423,7 +2423,7 @@
             <a:fld id="{32637B58-87C1-446D-BDA9-B06F4BCF7782}" type="datetimeFigureOut">
               <a:rPr lang="en-US" smtClean="0"/>
               <a:pPr/>
-              <a:t>10/20/2020</a:t>
+              <a:t>10/23/2020</a:t>
             </a:fld>
             <a:endParaRPr lang="en-US"/>
           </a:p>
@@ -2714,7 +2714,7 @@
             <a:fld id="{32637B58-87C1-446D-BDA9-B06F4BCF7782}" type="datetimeFigureOut">
               <a:rPr lang="en-US" smtClean="0"/>
               <a:pPr/>
-              <a:t>10/20/2020</a:t>
+              <a:t>10/23/2020</a:t>
             </a:fld>
             <a:endParaRPr lang="en-US"/>
           </a:p>
@@ -2959,7 +2959,7 @@
             <a:fld id="{32637B58-87C1-446D-BDA9-B06F4BCF7782}" type="datetimeFigureOut">
               <a:rPr lang="en-US" smtClean="0"/>
               <a:pPr/>
-              <a:t>10/20/2020</a:t>
+              <a:t>10/23/2020</a:t>
             </a:fld>
             <a:endParaRPr lang="en-US"/>
           </a:p>
@@ -4281,6 +4281,231 @@
           </a:prstGeom>
         </p:spPr>
       </p:pic>
+      <p:grpSp>
+        <p:nvGrpSpPr>
+          <p:cNvPr id="6" name="Grupo 5">
+            <a:extLst>
+              <a:ext uri="{FF2B5EF4-FFF2-40B4-BE49-F238E27FC236}">
+                <a16:creationId xmlns:a16="http://schemas.microsoft.com/office/drawing/2014/main" id="{17AB2AB0-EE11-40B9-9909-CDBCE5CF0EE5}"/>
+              </a:ext>
+            </a:extLst>
+          </p:cNvPr>
+          <p:cNvGrpSpPr/>
+          <p:nvPr/>
+        </p:nvGrpSpPr>
+        <p:grpSpPr>
+          <a:xfrm>
+            <a:off x="135557" y="4975901"/>
+            <a:ext cx="1381318" cy="1372009"/>
+            <a:chOff x="7720754" y="552388"/>
+            <a:chExt cx="1381318" cy="1372009"/>
+          </a:xfrm>
+        </p:grpSpPr>
+        <p:pic>
+          <p:nvPicPr>
+            <p:cNvPr id="7" name="Picture 4" descr="Signo De Regalo Vector. Icono Blanco En Círculo Rojo Sobre Fondo Blanco.  Aislado. Ilustraciones Vectoriales, Clip Art Vectorizado Libre De Derechos.  Image 73081540.">
+              <a:extLst>
+                <a:ext uri="{FF2B5EF4-FFF2-40B4-BE49-F238E27FC236}">
+                  <a16:creationId xmlns:a16="http://schemas.microsoft.com/office/drawing/2014/main" id="{3511D4C0-2549-4C73-B372-499919EC8BD5}"/>
+                </a:ext>
+              </a:extLst>
+            </p:cNvPr>
+            <p:cNvPicPr>
+              <a:picLocks noChangeAspect="1" noChangeArrowheads="1"/>
+            </p:cNvPicPr>
+            <p:nvPr/>
+          </p:nvPicPr>
+          <p:blipFill rotWithShape="1">
+            <a:blip r:embed="rId4">
+              <a:extLst>
+                <a:ext uri="{BEBA8EAE-BF5A-486C-A8C5-ECC9F3942E4B}">
+                  <a14:imgProps xmlns:a14="http://schemas.microsoft.com/office/drawing/2010/main">
+                    <a14:imgLayer r:embed="rId5">
+                      <a14:imgEffect>
+                        <a14:backgroundRemoval t="10000" b="90000" l="10000" r="90000">
+                          <a14:foregroundMark x1="41077" y1="55615" x2="43615" y2="65692"/>
+                          <a14:foregroundMark x1="60846" y1="49462" x2="61769" y2="59308"/>
+                        </a14:backgroundRemoval>
+                      </a14:imgEffect>
+                    </a14:imgLayer>
+                  </a14:imgProps>
+                </a:ext>
+                <a:ext uri="{28A0092B-C50C-407E-A947-70E740481C1C}">
+                  <a14:useLocalDpi xmlns:a14="http://schemas.microsoft.com/office/drawing/2010/main" val="0"/>
+                </a:ext>
+              </a:extLst>
+            </a:blip>
+            <a:srcRect l="16083" t="10241" r="15261" b="14712"/>
+            <a:stretch/>
+          </p:blipFill>
+          <p:spPr bwMode="auto">
+            <a:xfrm>
+              <a:off x="7983935" y="743390"/>
+              <a:ext cx="881460" cy="963502"/>
+            </a:xfrm>
+            <a:prstGeom prst="rect">
+              <a:avLst/>
+            </a:prstGeom>
+            <a:noFill/>
+            <a:extLst>
+              <a:ext uri="{909E8E84-426E-40DD-AFC4-6F175D3DCCD1}">
+                <a14:hiddenFill xmlns:a14="http://schemas.microsoft.com/office/drawing/2010/main">
+                  <a:solidFill>
+                    <a:srgbClr val="FFFFFF"/>
+                  </a:solidFill>
+                </a14:hiddenFill>
+              </a:ext>
+            </a:extLst>
+          </p:spPr>
+        </p:pic>
+        <p:sp>
+          <p:nvSpPr>
+            <p:cNvPr id="8" name="Elipse 7">
+              <a:extLst>
+                <a:ext uri="{FF2B5EF4-FFF2-40B4-BE49-F238E27FC236}">
+                  <a16:creationId xmlns:a16="http://schemas.microsoft.com/office/drawing/2014/main" id="{BDD82F4A-8096-4DB7-B9BB-FF0551A2D05A}"/>
+                </a:ext>
+              </a:extLst>
+            </p:cNvPr>
+            <p:cNvSpPr/>
+            <p:nvPr/>
+          </p:nvSpPr>
+          <p:spPr>
+            <a:xfrm>
+              <a:off x="7720754" y="552388"/>
+              <a:ext cx="1381318" cy="1372009"/>
+            </a:xfrm>
+            <a:prstGeom prst="ellipse">
+              <a:avLst/>
+            </a:prstGeom>
+            <a:noFill/>
+            <a:ln w="57150">
+              <a:solidFill>
+                <a:schemeClr val="bg1"/>
+              </a:solidFill>
+            </a:ln>
+          </p:spPr>
+          <p:style>
+            <a:lnRef idx="2">
+              <a:schemeClr val="accent1">
+                <a:shade val="50000"/>
+              </a:schemeClr>
+            </a:lnRef>
+            <a:fillRef idx="1">
+              <a:schemeClr val="accent1"/>
+            </a:fillRef>
+            <a:effectRef idx="0">
+              <a:schemeClr val="accent1"/>
+            </a:effectRef>
+            <a:fontRef idx="minor">
+              <a:schemeClr val="lt1"/>
+            </a:fontRef>
+          </p:style>
+          <p:txBody>
+            <a:bodyPr rtlCol="0" anchor="ctr"/>
+            <a:lstStyle/>
+            <a:p>
+              <a:pPr algn="ctr"/>
+              <a:endParaRPr lang="es-MX"/>
+            </a:p>
+          </p:txBody>
+        </p:sp>
+      </p:grpSp>
+      <p:sp>
+        <p:nvSpPr>
+          <p:cNvPr id="12" name="Título 1">
+            <a:extLst>
+              <a:ext uri="{FF2B5EF4-FFF2-40B4-BE49-F238E27FC236}">
+                <a16:creationId xmlns:a16="http://schemas.microsoft.com/office/drawing/2014/main" id="{46E6A152-606A-42F9-A57E-84C5C87A8C97}"/>
+              </a:ext>
+            </a:extLst>
+          </p:cNvPr>
+          <p:cNvSpPr txBox="1">
+            <a:spLocks/>
+          </p:cNvSpPr>
+          <p:nvPr/>
+        </p:nvSpPr>
+        <p:spPr>
+          <a:xfrm>
+            <a:off x="1109606" y="4877621"/>
+            <a:ext cx="10274528" cy="1545338"/>
+          </a:xfrm>
+          <a:prstGeom prst="rect">
+            <a:avLst/>
+          </a:prstGeom>
+          <a:ln>
+            <a:noFill/>
+          </a:ln>
+        </p:spPr>
+        <p:txBody>
+          <a:bodyPr vert="horz" lIns="91440" tIns="45720" rIns="91440" bIns="45720" rtlCol="0" anchor="b">
+            <a:normAutofit/>
+          </a:bodyPr>
+          <a:lstStyle>
+            <a:lvl1pPr algn="ctr" defTabSz="914400" rtl="0" eaLnBrk="1" latinLnBrk="0" hangingPunct="1">
+              <a:lnSpc>
+                <a:spcPct val="90000"/>
+              </a:lnSpc>
+              <a:spcBef>
+                <a:spcPct val="0"/>
+              </a:spcBef>
+              <a:buNone/>
+              <a:defRPr sz="6000" kern="1200">
+                <a:solidFill>
+                  <a:schemeClr val="tx1"/>
+                </a:solidFill>
+                <a:latin typeface="+mj-lt"/>
+                <a:ea typeface="+mj-ea"/>
+                <a:cs typeface="+mj-cs"/>
+              </a:defRPr>
+            </a:lvl1pPr>
+          </a:lstStyle>
+          <a:p>
+            <a:r>
+              <a:rPr lang="es-MX" sz="9400" b="1" dirty="0">
+                <a:solidFill>
+                  <a:srgbClr val="FF9E00"/>
+                </a:solidFill>
+                <a:latin typeface="Footlight MT Light" panose="0204060206030A020304" pitchFamily="18" charset="0"/>
+              </a:rPr>
+              <a:t>Sales </a:t>
+            </a:r>
+            <a:r>
+              <a:rPr lang="es-MX" sz="9400" b="1" dirty="0" err="1">
+                <a:solidFill>
+                  <a:srgbClr val="FF9E00"/>
+                </a:solidFill>
+                <a:latin typeface="Footlight MT Light" panose="0204060206030A020304" pitchFamily="18" charset="0"/>
+              </a:rPr>
+              <a:t>System</a:t>
+            </a:r>
+            <a:r>
+              <a:rPr lang="es-MX" sz="9400" b="1" dirty="0">
+                <a:solidFill>
+                  <a:srgbClr val="FF9E00"/>
+                </a:solidFill>
+                <a:latin typeface="Footlight MT Light" panose="0204060206030A020304" pitchFamily="18" charset="0"/>
+              </a:rPr>
+              <a:t> </a:t>
+            </a:r>
+            <a:r>
+              <a:rPr lang="es-MX" sz="9400" b="1" dirty="0">
+                <a:solidFill>
+                  <a:schemeClr val="bg1"/>
+                </a:solidFill>
+                <a:latin typeface="Footlight MT Light" panose="0204060206030A020304" pitchFamily="18" charset="0"/>
+              </a:rPr>
+              <a:t>LIROZ</a:t>
+            </a:r>
+            <a:endParaRPr lang="es-CO" sz="9400" b="1" dirty="0">
+              <a:solidFill>
+                <a:schemeClr val="bg1"/>
+              </a:solidFill>
+              <a:latin typeface="Footlight MT Light" panose="0204060206030A020304" pitchFamily="18" charset="0"/>
+            </a:endParaRPr>
+          </a:p>
+        </p:txBody>
+      </p:sp>
     </p:spTree>
     <p:extLst>
       <p:ext uri="{BB962C8B-B14F-4D97-AF65-F5344CB8AC3E}">
@@ -4357,31 +4582,6 @@
           </a:p>
         </p:txBody>
       </p:sp>
-      <p:sp>
-        <p:nvSpPr>
-          <p:cNvPr id="2" name="Título 1">
-            <a:extLst>
-              <a:ext uri="{FF2B5EF4-FFF2-40B4-BE49-F238E27FC236}">
-                <a16:creationId xmlns:a16="http://schemas.microsoft.com/office/drawing/2014/main" id="{C79EDEDE-9B4E-4311-868F-D96CC444A326}"/>
-              </a:ext>
-            </a:extLst>
-          </p:cNvPr>
-          <p:cNvSpPr>
-            <a:spLocks noGrp="1"/>
-          </p:cNvSpPr>
-          <p:nvPr>
-            <p:ph type="title"/>
-          </p:nvPr>
-        </p:nvSpPr>
-        <p:spPr/>
-        <p:txBody>
-          <a:bodyPr/>
-          <a:lstStyle/>
-          <a:p>
-            <a:endParaRPr lang="es-CO" dirty="0"/>
-          </a:p>
-        </p:txBody>
-      </p:sp>
       <p:pic>
         <p:nvPicPr>
           <p:cNvPr id="8" name="Marcador de contenido 4" descr="Imagen que contiene dibujo&#10;&#10;Descripción generada automáticamente">
@@ -4610,7 +4810,7 @@
         </p:nvGrpSpPr>
         <p:grpSpPr>
           <a:xfrm>
-            <a:off x="931368" y="2243945"/>
+            <a:off x="547237" y="406562"/>
             <a:ext cx="5164632" cy="1387376"/>
             <a:chOff x="931368" y="2243945"/>
             <a:chExt cx="5164632" cy="1387376"/>
@@ -4670,7 +4870,7 @@
               <a:r>
                 <a:rPr lang="es-MX" sz="6600" b="1" dirty="0">
                   <a:solidFill>
-                    <a:srgbClr val="6A1A26"/>
+                    <a:srgbClr val="FF9E00"/>
                   </a:solidFill>
                   <a:latin typeface="Footlight MT Light" panose="0204060206030A020304" pitchFamily="18" charset="0"/>
                 </a:rPr>
@@ -4679,7 +4879,7 @@
               <a:r>
                 <a:rPr lang="es-MX" sz="6600" b="1" dirty="0" err="1">
                   <a:solidFill>
-                    <a:srgbClr val="6A1A26"/>
+                    <a:srgbClr val="FF9E00"/>
                   </a:solidFill>
                   <a:latin typeface="Footlight MT Light" panose="0204060206030A020304" pitchFamily="18" charset="0"/>
                 </a:rPr>
@@ -4688,7 +4888,7 @@
               <a:r>
                 <a:rPr lang="es-MX" sz="6600" b="1" dirty="0">
                   <a:solidFill>
-                    <a:srgbClr val="6A1A26"/>
+                    <a:srgbClr val="FF9E00"/>
                   </a:solidFill>
                   <a:latin typeface="Footlight MT Light" panose="0204060206030A020304" pitchFamily="18" charset="0"/>
                 </a:rPr>
@@ -4799,10 +4999,10 @@
       </p:grpSp>
       <p:pic>
         <p:nvPicPr>
-          <p:cNvPr id="19" name="Picture 2">
-            <a:extLst>
-              <a:ext uri="{FF2B5EF4-FFF2-40B4-BE49-F238E27FC236}">
-                <a16:creationId xmlns:a16="http://schemas.microsoft.com/office/drawing/2014/main" id="{AE1938E8-5540-42F8-8A6D-DD07381A8F5E}"/>
+          <p:cNvPr id="11" name="Picture 2" descr="Gift sign flat black icon in white circle Vector Image">
+            <a:extLst>
+              <a:ext uri="{FF2B5EF4-FFF2-40B4-BE49-F238E27FC236}">
+                <a16:creationId xmlns:a16="http://schemas.microsoft.com/office/drawing/2014/main" id="{3E04F093-4063-40C4-BC56-62C357BDD0E1}"/>
               </a:ext>
             </a:extLst>
           </p:cNvPr>
@@ -4811,23 +5011,62 @@
           </p:cNvPicPr>
           <p:nvPr/>
         </p:nvPicPr>
-        <p:blipFill>
-          <a:blip r:embed="rId7">
-            <a:extLst>
+        <p:blipFill rotWithShape="1">
+          <a:blip r:embed="rId5">
+            <a:extLst>
+              <a:ext uri="{BEBA8EAE-BF5A-486C-A8C5-ECC9F3942E4B}">
+                <a14:imgProps xmlns:a14="http://schemas.microsoft.com/office/drawing/2010/main">
+                  <a14:imgLayer r:embed="rId6">
+                    <a14:imgEffect>
+                      <a14:backgroundRemoval t="10000" b="90000" l="10000" r="90900">
+                        <a14:foregroundMark x1="34300" y1="74259" x2="34300" y2="74259"/>
+                        <a14:foregroundMark x1="76500" y1="27407" x2="76500" y2="27407"/>
+                        <a14:foregroundMark x1="45900" y1="46852" x2="45900" y2="53333"/>
+                        <a14:foregroundMark x1="58800" y1="43889" x2="59000" y2="53056"/>
+                        <a14:foregroundMark x1="40300" y1="35278" x2="45700" y2="35278"/>
+                        <a14:foregroundMark x1="55100" y1="36019" x2="60400" y2="36019"/>
+                        <a14:backgroundMark x1="28000" y1="39722" x2="26700" y2="49444"/>
+                        <a14:backgroundMark x1="50000" y1="35648" x2="50000" y2="35648"/>
+                        <a14:backgroundMark x1="50000" y1="32778" x2="50000" y2="32778"/>
+                        <a14:backgroundMark x1="49900" y1="44722" x2="49900" y2="44722"/>
+                        <a14:backgroundMark x1="50000" y1="55833" x2="50000" y2="55833"/>
+                        <a14:backgroundMark x1="50000" y1="59444" x2="50000" y2="59444"/>
+                        <a14:backgroundMark x1="49600" y1="47500" x2="49600" y2="47500"/>
+                        <a14:backgroundMark x1="50000" y1="48889" x2="50000" y2="48889"/>
+                        <a14:backgroundMark x1="45300" y1="28056" x2="45300" y2="28056"/>
+                        <a14:backgroundMark x1="50200" y1="26944" x2="50200" y2="26944"/>
+                        <a14:backgroundMark x1="55400" y1="27870" x2="55400" y2="27870"/>
+                        <a14:backgroundMark x1="71800" y1="73519" x2="71800" y2="73519"/>
+                        <a14:backgroundMark x1="87900" y1="52037" x2="82700" y2="66667"/>
+                        <a14:backgroundMark x1="82700" y1="66667" x2="78300" y2="70370"/>
+                        <a14:backgroundMark x1="91500" y1="44907" x2="89400" y2="58889"/>
+                        <a14:backgroundMark x1="77700" y1="27130" x2="81100" y2="31296"/>
+                        <a14:backgroundMark x1="76900" y1="27130" x2="76900" y2="27130"/>
+                        <a14:backgroundMark x1="33200" y1="73981" x2="33200" y2="73981"/>
+                        <a14:backgroundMark x1="32000" y1="72870" x2="34000" y2="73611"/>
+                        <a14:backgroundMark x1="33800" y1="74259" x2="33800" y2="74259"/>
+                        <a14:backgroundMark x1="34400" y1="74352" x2="34400" y2="74352"/>
+                        <a14:backgroundMark x1="34000" y1="74259" x2="34000" y2="74259"/>
+                        <a14:backgroundMark x1="34200" y1="74444" x2="34200" y2="74444"/>
+                        <a14:backgroundMark x1="34300" y1="74537" x2="34300" y2="74537"/>
+                        <a14:backgroundMark x1="38600" y1="69444" x2="49300" y2="69444"/>
+                      </a14:backgroundRemoval>
+                    </a14:imgEffect>
+                  </a14:imgLayer>
+                </a14:imgProps>
+              </a:ext>
               <a:ext uri="{28A0092B-C50C-407E-A947-70E740481C1C}">
                 <a14:useLocalDpi xmlns:a14="http://schemas.microsoft.com/office/drawing/2010/main" val="0"/>
               </a:ext>
             </a:extLst>
           </a:blip>
-          <a:srcRect/>
-          <a:stretch>
-            <a:fillRect/>
-          </a:stretch>
+          <a:srcRect l="15452" t="14530" r="15517" b="21983"/>
+          <a:stretch/>
         </p:blipFill>
         <p:spPr bwMode="auto">
           <a:xfrm>
-            <a:off x="1838422" y="3840630"/>
-            <a:ext cx="9896475" cy="5981700"/>
+            <a:off x="9729639" y="345497"/>
+            <a:ext cx="1381318" cy="1372009"/>
           </a:xfrm>
           <a:prstGeom prst="rect">
             <a:avLst/>
@@ -4844,6 +5083,387 @@
           </a:extLst>
         </p:spPr>
       </p:pic>
+      <p:grpSp>
+        <p:nvGrpSpPr>
+          <p:cNvPr id="12" name="Grupo 11">
+            <a:extLst>
+              <a:ext uri="{FF2B5EF4-FFF2-40B4-BE49-F238E27FC236}">
+                <a16:creationId xmlns:a16="http://schemas.microsoft.com/office/drawing/2014/main" id="{B31D9774-6871-490A-B027-4FDE84BAC961}"/>
+              </a:ext>
+            </a:extLst>
+          </p:cNvPr>
+          <p:cNvGrpSpPr/>
+          <p:nvPr/>
+        </p:nvGrpSpPr>
+        <p:grpSpPr>
+          <a:xfrm>
+            <a:off x="533985" y="2256914"/>
+            <a:ext cx="5177884" cy="1387376"/>
+            <a:chOff x="533985" y="2256914"/>
+            <a:chExt cx="5177884" cy="1387376"/>
+          </a:xfrm>
+        </p:grpSpPr>
+        <p:grpSp>
+          <p:nvGrpSpPr>
+            <p:cNvPr id="9" name="Grupo 8">
+              <a:extLst>
+                <a:ext uri="{FF2B5EF4-FFF2-40B4-BE49-F238E27FC236}">
+                  <a16:creationId xmlns:a16="http://schemas.microsoft.com/office/drawing/2014/main" id="{34DF92FE-9952-4474-BD05-7810F66E1629}"/>
+                </a:ext>
+              </a:extLst>
+            </p:cNvPr>
+            <p:cNvGrpSpPr/>
+            <p:nvPr/>
+          </p:nvGrpSpPr>
+          <p:grpSpPr>
+            <a:xfrm>
+              <a:off x="533985" y="2262325"/>
+              <a:ext cx="1381318" cy="1372009"/>
+              <a:chOff x="7720754" y="552388"/>
+              <a:chExt cx="1381318" cy="1372009"/>
+            </a:xfrm>
+          </p:grpSpPr>
+          <p:pic>
+            <p:nvPicPr>
+              <p:cNvPr id="5" name="Picture 4" descr="Signo De Regalo Vector. Icono Blanco En Círculo Rojo Sobre Fondo Blanco.  Aislado. Ilustraciones Vectoriales, Clip Art Vectorizado Libre De Derechos.  Image 73081540.">
+                <a:extLst>
+                  <a:ext uri="{FF2B5EF4-FFF2-40B4-BE49-F238E27FC236}">
+                    <a16:creationId xmlns:a16="http://schemas.microsoft.com/office/drawing/2014/main" id="{FEC8D690-8616-4DCE-97E1-C27374376FAF}"/>
+                  </a:ext>
+                </a:extLst>
+              </p:cNvPr>
+              <p:cNvPicPr>
+                <a:picLocks noChangeAspect="1" noChangeArrowheads="1"/>
+              </p:cNvPicPr>
+              <p:nvPr/>
+            </p:nvPicPr>
+            <p:blipFill rotWithShape="1">
+              <a:blip r:embed="rId7">
+                <a:extLst>
+                  <a:ext uri="{BEBA8EAE-BF5A-486C-A8C5-ECC9F3942E4B}">
+                    <a14:imgProps xmlns:a14="http://schemas.microsoft.com/office/drawing/2010/main">
+                      <a14:imgLayer r:embed="rId8">
+                        <a14:imgEffect>
+                          <a14:backgroundRemoval t="10000" b="90000" l="10000" r="90000">
+                            <a14:foregroundMark x1="41077" y1="55615" x2="43615" y2="65692"/>
+                            <a14:foregroundMark x1="60846" y1="49462" x2="61769" y2="59308"/>
+                          </a14:backgroundRemoval>
+                        </a14:imgEffect>
+                      </a14:imgLayer>
+                    </a14:imgProps>
+                  </a:ext>
+                  <a:ext uri="{28A0092B-C50C-407E-A947-70E740481C1C}">
+                    <a14:useLocalDpi xmlns:a14="http://schemas.microsoft.com/office/drawing/2010/main" val="0"/>
+                  </a:ext>
+                </a:extLst>
+              </a:blip>
+              <a:srcRect l="16083" t="10241" r="15261" b="14712"/>
+              <a:stretch/>
+            </p:blipFill>
+            <p:spPr bwMode="auto">
+              <a:xfrm>
+                <a:off x="7983935" y="743390"/>
+                <a:ext cx="881460" cy="963502"/>
+              </a:xfrm>
+              <a:prstGeom prst="rect">
+                <a:avLst/>
+              </a:prstGeom>
+              <a:noFill/>
+              <a:extLst>
+                <a:ext uri="{909E8E84-426E-40DD-AFC4-6F175D3DCCD1}">
+                  <a14:hiddenFill xmlns:a14="http://schemas.microsoft.com/office/drawing/2010/main">
+                    <a:solidFill>
+                      <a:srgbClr val="FFFFFF"/>
+                    </a:solidFill>
+                  </a14:hiddenFill>
+                </a:ext>
+              </a:extLst>
+            </p:spPr>
+          </p:pic>
+          <p:sp>
+            <p:nvSpPr>
+              <p:cNvPr id="6" name="Elipse 5">
+                <a:extLst>
+                  <a:ext uri="{FF2B5EF4-FFF2-40B4-BE49-F238E27FC236}">
+                    <a16:creationId xmlns:a16="http://schemas.microsoft.com/office/drawing/2014/main" id="{D7B62510-657A-4410-AC84-16E3FDF9115F}"/>
+                  </a:ext>
+                </a:extLst>
+              </p:cNvPr>
+              <p:cNvSpPr/>
+              <p:nvPr/>
+            </p:nvSpPr>
+            <p:spPr>
+              <a:xfrm>
+                <a:off x="7720754" y="552388"/>
+                <a:ext cx="1381318" cy="1372009"/>
+              </a:xfrm>
+              <a:prstGeom prst="ellipse">
+                <a:avLst/>
+              </a:prstGeom>
+              <a:noFill/>
+              <a:ln w="57150">
+                <a:solidFill>
+                  <a:schemeClr val="bg1"/>
+                </a:solidFill>
+              </a:ln>
+            </p:spPr>
+            <p:style>
+              <a:lnRef idx="2">
+                <a:schemeClr val="accent1">
+                  <a:shade val="50000"/>
+                </a:schemeClr>
+              </a:lnRef>
+              <a:fillRef idx="1">
+                <a:schemeClr val="accent1"/>
+              </a:fillRef>
+              <a:effectRef idx="0">
+                <a:schemeClr val="accent1"/>
+              </a:effectRef>
+              <a:fontRef idx="minor">
+                <a:schemeClr val="lt1"/>
+              </a:fontRef>
+            </p:style>
+            <p:txBody>
+              <a:bodyPr rtlCol="0" anchor="ctr"/>
+              <a:lstStyle/>
+              <a:p>
+                <a:pPr algn="ctr"/>
+                <a:endParaRPr lang="es-MX"/>
+              </a:p>
+            </p:txBody>
+          </p:sp>
+        </p:grpSp>
+        <p:sp>
+          <p:nvSpPr>
+            <p:cNvPr id="24" name="Título 1">
+              <a:extLst>
+                <a:ext uri="{FF2B5EF4-FFF2-40B4-BE49-F238E27FC236}">
+                  <a16:creationId xmlns:a16="http://schemas.microsoft.com/office/drawing/2014/main" id="{1689C645-EB3D-4873-91F3-B35856644BC9}"/>
+                </a:ext>
+              </a:extLst>
+            </p:cNvPr>
+            <p:cNvSpPr txBox="1">
+              <a:spLocks/>
+            </p:cNvSpPr>
+            <p:nvPr/>
+          </p:nvSpPr>
+          <p:spPr>
+            <a:xfrm>
+              <a:off x="1739164" y="2256914"/>
+              <a:ext cx="3972705" cy="1387376"/>
+            </a:xfrm>
+            <a:prstGeom prst="rect">
+              <a:avLst/>
+            </a:prstGeom>
+            <a:noFill/>
+            <a:ln>
+              <a:noFill/>
+            </a:ln>
+          </p:spPr>
+          <p:txBody>
+            <a:bodyPr vert="horz" lIns="91440" tIns="45720" rIns="91440" bIns="45720" rtlCol="0" anchor="b">
+              <a:normAutofit fontScale="85000" lnSpcReduction="20000"/>
+            </a:bodyPr>
+            <a:lstStyle>
+              <a:lvl1pPr algn="ctr" defTabSz="914400" rtl="0" eaLnBrk="1" latinLnBrk="0" hangingPunct="1">
+                <a:lnSpc>
+                  <a:spcPct val="90000"/>
+                </a:lnSpc>
+                <a:spcBef>
+                  <a:spcPct val="0"/>
+                </a:spcBef>
+                <a:buNone/>
+                <a:defRPr sz="6000" kern="1200">
+                  <a:solidFill>
+                    <a:schemeClr val="tx1"/>
+                  </a:solidFill>
+                  <a:latin typeface="+mj-lt"/>
+                  <a:ea typeface="+mj-ea"/>
+                  <a:cs typeface="+mj-cs"/>
+                </a:defRPr>
+              </a:lvl1pPr>
+            </a:lstStyle>
+            <a:p>
+              <a:r>
+                <a:rPr lang="es-MX" sz="6600" b="1" dirty="0">
+                  <a:solidFill>
+                    <a:srgbClr val="FF9E00"/>
+                  </a:solidFill>
+                  <a:latin typeface="Footlight MT Light" panose="0204060206030A020304" pitchFamily="18" charset="0"/>
+                </a:rPr>
+                <a:t>Sales </a:t>
+              </a:r>
+              <a:r>
+                <a:rPr lang="es-MX" sz="6600" b="1" dirty="0" err="1">
+                  <a:solidFill>
+                    <a:srgbClr val="FF9E00"/>
+                  </a:solidFill>
+                  <a:latin typeface="Footlight MT Light" panose="0204060206030A020304" pitchFamily="18" charset="0"/>
+                </a:rPr>
+                <a:t>System</a:t>
+              </a:r>
+              <a:r>
+                <a:rPr lang="es-MX" sz="6600" b="1" dirty="0">
+                  <a:solidFill>
+                    <a:srgbClr val="FF9E00"/>
+                  </a:solidFill>
+                  <a:latin typeface="Footlight MT Light" panose="0204060206030A020304" pitchFamily="18" charset="0"/>
+                </a:rPr>
+                <a:t> </a:t>
+              </a:r>
+            </a:p>
+            <a:p>
+              <a:r>
+                <a:rPr lang="es-MX" sz="6500" b="1" dirty="0">
+                  <a:solidFill>
+                    <a:schemeClr val="bg1"/>
+                  </a:solidFill>
+                  <a:latin typeface="Angsana New" panose="020B0502040204020203" pitchFamily="18" charset="-34"/>
+                  <a:cs typeface="Angsana New" panose="020B0502040204020203" pitchFamily="18" charset="-34"/>
+                </a:rPr>
+                <a:t>LIROZ</a:t>
+              </a:r>
+              <a:endParaRPr lang="es-CO" sz="6500" b="1" dirty="0">
+                <a:solidFill>
+                  <a:schemeClr val="bg1"/>
+                </a:solidFill>
+                <a:latin typeface="Angsana New" panose="020B0502040204020203" pitchFamily="18" charset="-34"/>
+                <a:cs typeface="Angsana New" panose="020B0502040204020203" pitchFamily="18" charset="-34"/>
+              </a:endParaRPr>
+            </a:p>
+          </p:txBody>
+        </p:sp>
+      </p:grpSp>
+      <p:grpSp>
+        <p:nvGrpSpPr>
+          <p:cNvPr id="26" name="Grupo 25">
+            <a:extLst>
+              <a:ext uri="{FF2B5EF4-FFF2-40B4-BE49-F238E27FC236}">
+                <a16:creationId xmlns:a16="http://schemas.microsoft.com/office/drawing/2014/main" id="{E06B0B7D-3B21-4ECE-9E73-FC5501EB1BE8}"/>
+              </a:ext>
+            </a:extLst>
+          </p:cNvPr>
+          <p:cNvGrpSpPr/>
+          <p:nvPr/>
+        </p:nvGrpSpPr>
+        <p:grpSpPr>
+          <a:xfrm>
+            <a:off x="7873154" y="704788"/>
+            <a:ext cx="1381318" cy="1372009"/>
+            <a:chOff x="7720754" y="552388"/>
+            <a:chExt cx="1381318" cy="1372009"/>
+          </a:xfrm>
+        </p:grpSpPr>
+        <p:pic>
+          <p:nvPicPr>
+            <p:cNvPr id="27" name="Picture 4" descr="Signo De Regalo Vector. Icono Blanco En Círculo Rojo Sobre Fondo Blanco.  Aislado. Ilustraciones Vectoriales, Clip Art Vectorizado Libre De Derechos.  Image 73081540.">
+              <a:extLst>
+                <a:ext uri="{FF2B5EF4-FFF2-40B4-BE49-F238E27FC236}">
+                  <a16:creationId xmlns:a16="http://schemas.microsoft.com/office/drawing/2014/main" id="{6697CF5A-2BF3-45C0-A147-D7D2610F9CBB}"/>
+                </a:ext>
+              </a:extLst>
+            </p:cNvPr>
+            <p:cNvPicPr>
+              <a:picLocks noChangeAspect="1" noChangeArrowheads="1"/>
+            </p:cNvPicPr>
+            <p:nvPr/>
+          </p:nvPicPr>
+          <p:blipFill rotWithShape="1">
+            <a:blip r:embed="rId7">
+              <a:extLst>
+                <a:ext uri="{BEBA8EAE-BF5A-486C-A8C5-ECC9F3942E4B}">
+                  <a14:imgProps xmlns:a14="http://schemas.microsoft.com/office/drawing/2010/main">
+                    <a14:imgLayer r:embed="rId8">
+                      <a14:imgEffect>
+                        <a14:backgroundRemoval t="10000" b="90000" l="10000" r="90000">
+                          <a14:foregroundMark x1="41077" y1="55615" x2="43615" y2="65692"/>
+                          <a14:foregroundMark x1="60846" y1="49462" x2="61769" y2="59308"/>
+                        </a14:backgroundRemoval>
+                      </a14:imgEffect>
+                    </a14:imgLayer>
+                  </a14:imgProps>
+                </a:ext>
+                <a:ext uri="{28A0092B-C50C-407E-A947-70E740481C1C}">
+                  <a14:useLocalDpi xmlns:a14="http://schemas.microsoft.com/office/drawing/2010/main" val="0"/>
+                </a:ext>
+              </a:extLst>
+            </a:blip>
+            <a:srcRect l="16083" t="10241" r="15261" b="14712"/>
+            <a:stretch/>
+          </p:blipFill>
+          <p:spPr bwMode="auto">
+            <a:xfrm>
+              <a:off x="7983935" y="743390"/>
+              <a:ext cx="881460" cy="963502"/>
+            </a:xfrm>
+            <a:prstGeom prst="rect">
+              <a:avLst/>
+            </a:prstGeom>
+            <a:noFill/>
+            <a:extLst>
+              <a:ext uri="{909E8E84-426E-40DD-AFC4-6F175D3DCCD1}">
+                <a14:hiddenFill xmlns:a14="http://schemas.microsoft.com/office/drawing/2010/main">
+                  <a:solidFill>
+                    <a:srgbClr val="FFFFFF"/>
+                  </a:solidFill>
+                </a14:hiddenFill>
+              </a:ext>
+            </a:extLst>
+          </p:spPr>
+        </p:pic>
+        <p:sp>
+          <p:nvSpPr>
+            <p:cNvPr id="28" name="Elipse 27">
+              <a:extLst>
+                <a:ext uri="{FF2B5EF4-FFF2-40B4-BE49-F238E27FC236}">
+                  <a16:creationId xmlns:a16="http://schemas.microsoft.com/office/drawing/2014/main" id="{0F87278E-D0DA-4859-84BA-9508BB8FAABE}"/>
+                </a:ext>
+              </a:extLst>
+            </p:cNvPr>
+            <p:cNvSpPr/>
+            <p:nvPr/>
+          </p:nvSpPr>
+          <p:spPr>
+            <a:xfrm>
+              <a:off x="7720754" y="552388"/>
+              <a:ext cx="1381318" cy="1372009"/>
+            </a:xfrm>
+            <a:prstGeom prst="ellipse">
+              <a:avLst/>
+            </a:prstGeom>
+            <a:noFill/>
+            <a:ln w="57150">
+              <a:solidFill>
+                <a:schemeClr val="bg1"/>
+              </a:solidFill>
+            </a:ln>
+          </p:spPr>
+          <p:style>
+            <a:lnRef idx="2">
+              <a:schemeClr val="accent1">
+                <a:shade val="50000"/>
+              </a:schemeClr>
+            </a:lnRef>
+            <a:fillRef idx="1">
+              <a:schemeClr val="accent1"/>
+            </a:fillRef>
+            <a:effectRef idx="0">
+              <a:schemeClr val="accent1"/>
+            </a:effectRef>
+            <a:fontRef idx="minor">
+              <a:schemeClr val="lt1"/>
+            </a:fontRef>
+          </p:style>
+          <p:txBody>
+            <a:bodyPr rtlCol="0" anchor="ctr"/>
+            <a:lstStyle/>
+            <a:p>
+              <a:pPr algn="ctr"/>
+              <a:endParaRPr lang="es-MX"/>
+            </a:p>
+          </p:txBody>
+        </p:sp>
+      </p:grpSp>
     </p:spTree>
     <p:extLst>
       <p:ext uri="{BB962C8B-B14F-4D97-AF65-F5344CB8AC3E}">

</xml_diff>